<commit_message>
up to dual learning step
</commit_message>
<xml_diff>
--- a/Figures.pptx
+++ b/Figures.pptx
@@ -203,7 +203,7 @@
           <a:p>
             <a:fld id="{75754C70-6453-4EC1-893C-AA2644B807D6}" type="datetimeFigureOut">
               <a:rPr lang="en-US" smtClean="0"/>
-              <a:t>8/27/2021</a:t>
+              <a:t>8/28/2021</a:t>
             </a:fld>
             <a:endParaRPr lang="en-US" dirty="0"/>
           </a:p>
@@ -617,7 +617,7 @@
           <a:p>
             <a:fld id="{FF5E1AB6-45CD-421A-B6C0-E4D4EAFC2CDC}" type="datetimeFigureOut">
               <a:rPr lang="en-US" smtClean="0"/>
-              <a:t>8/27/2021</a:t>
+              <a:t>8/28/2021</a:t>
             </a:fld>
             <a:endParaRPr lang="en-US" dirty="0"/>
           </a:p>
@@ -815,7 +815,7 @@
           <a:p>
             <a:fld id="{FF5E1AB6-45CD-421A-B6C0-E4D4EAFC2CDC}" type="datetimeFigureOut">
               <a:rPr lang="en-US" smtClean="0"/>
-              <a:t>8/27/2021</a:t>
+              <a:t>8/28/2021</a:t>
             </a:fld>
             <a:endParaRPr lang="en-US" dirty="0"/>
           </a:p>
@@ -1023,7 +1023,7 @@
           <a:p>
             <a:fld id="{FF5E1AB6-45CD-421A-B6C0-E4D4EAFC2CDC}" type="datetimeFigureOut">
               <a:rPr lang="en-US" smtClean="0"/>
-              <a:t>8/27/2021</a:t>
+              <a:t>8/28/2021</a:t>
             </a:fld>
             <a:endParaRPr lang="en-US" dirty="0"/>
           </a:p>
@@ -1221,7 +1221,7 @@
           <a:p>
             <a:fld id="{FF5E1AB6-45CD-421A-B6C0-E4D4EAFC2CDC}" type="datetimeFigureOut">
               <a:rPr lang="en-US" smtClean="0"/>
-              <a:t>8/27/2021</a:t>
+              <a:t>8/28/2021</a:t>
             </a:fld>
             <a:endParaRPr lang="en-US" dirty="0"/>
           </a:p>
@@ -1496,7 +1496,7 @@
           <a:p>
             <a:fld id="{FF5E1AB6-45CD-421A-B6C0-E4D4EAFC2CDC}" type="datetimeFigureOut">
               <a:rPr lang="en-US" smtClean="0"/>
-              <a:t>8/27/2021</a:t>
+              <a:t>8/28/2021</a:t>
             </a:fld>
             <a:endParaRPr lang="en-US" dirty="0"/>
           </a:p>
@@ -1761,7 +1761,7 @@
           <a:p>
             <a:fld id="{FF5E1AB6-45CD-421A-B6C0-E4D4EAFC2CDC}" type="datetimeFigureOut">
               <a:rPr lang="en-US" smtClean="0"/>
-              <a:t>8/27/2021</a:t>
+              <a:t>8/28/2021</a:t>
             </a:fld>
             <a:endParaRPr lang="en-US" dirty="0"/>
           </a:p>
@@ -2173,7 +2173,7 @@
           <a:p>
             <a:fld id="{FF5E1AB6-45CD-421A-B6C0-E4D4EAFC2CDC}" type="datetimeFigureOut">
               <a:rPr lang="en-US" smtClean="0"/>
-              <a:t>8/27/2021</a:t>
+              <a:t>8/28/2021</a:t>
             </a:fld>
             <a:endParaRPr lang="en-US" dirty="0"/>
           </a:p>
@@ -2314,7 +2314,7 @@
           <a:p>
             <a:fld id="{FF5E1AB6-45CD-421A-B6C0-E4D4EAFC2CDC}" type="datetimeFigureOut">
               <a:rPr lang="en-US" smtClean="0"/>
-              <a:t>8/27/2021</a:t>
+              <a:t>8/28/2021</a:t>
             </a:fld>
             <a:endParaRPr lang="en-US" dirty="0"/>
           </a:p>
@@ -2427,7 +2427,7 @@
           <a:p>
             <a:fld id="{FF5E1AB6-45CD-421A-B6C0-E4D4EAFC2CDC}" type="datetimeFigureOut">
               <a:rPr lang="en-US" smtClean="0"/>
-              <a:t>8/27/2021</a:t>
+              <a:t>8/28/2021</a:t>
             </a:fld>
             <a:endParaRPr lang="en-US" dirty="0"/>
           </a:p>
@@ -2738,7 +2738,7 @@
           <a:p>
             <a:fld id="{FF5E1AB6-45CD-421A-B6C0-E4D4EAFC2CDC}" type="datetimeFigureOut">
               <a:rPr lang="en-US" smtClean="0"/>
-              <a:t>8/27/2021</a:t>
+              <a:t>8/28/2021</a:t>
             </a:fld>
             <a:endParaRPr lang="en-US" dirty="0"/>
           </a:p>
@@ -3026,7 +3026,7 @@
           <a:p>
             <a:fld id="{FF5E1AB6-45CD-421A-B6C0-E4D4EAFC2CDC}" type="datetimeFigureOut">
               <a:rPr lang="en-US" smtClean="0"/>
-              <a:t>8/27/2021</a:t>
+              <a:t>8/28/2021</a:t>
             </a:fld>
             <a:endParaRPr lang="en-US" dirty="0"/>
           </a:p>
@@ -3267,7 +3267,7 @@
           <a:p>
             <a:fld id="{FF5E1AB6-45CD-421A-B6C0-E4D4EAFC2CDC}" type="datetimeFigureOut">
               <a:rPr lang="en-US" smtClean="0"/>
-              <a:t>8/27/2021</a:t>
+              <a:t>8/28/2021</a:t>
             </a:fld>
             <a:endParaRPr lang="en-US" dirty="0"/>
           </a:p>
@@ -18243,6 +18243,286 @@
           </a:p>
         </p:txBody>
       </p:sp>
+      <p:sp>
+        <p:nvSpPr>
+          <p:cNvPr id="73" name="TextBox 72">
+            <a:extLst>
+              <a:ext uri="{FF2B5EF4-FFF2-40B4-BE49-F238E27FC236}">
+                <a16:creationId xmlns:a16="http://schemas.microsoft.com/office/drawing/2014/main" id="{39C74687-5125-4677-B2BC-5B417C5E086F}"/>
+              </a:ext>
+            </a:extLst>
+          </p:cNvPr>
+          <p:cNvSpPr txBox="1"/>
+          <p:nvPr/>
+        </p:nvSpPr>
+        <p:spPr>
+          <a:xfrm>
+            <a:off x="7185540" y="1635776"/>
+            <a:ext cx="502894" cy="369332"/>
+          </a:xfrm>
+          <a:prstGeom prst="rect">
+            <a:avLst/>
+          </a:prstGeom>
+          <a:noFill/>
+        </p:spPr>
+        <p:txBody>
+          <a:bodyPr wrap="square" rtlCol="0">
+            <a:spAutoFit/>
+          </a:bodyPr>
+          <a:lstStyle/>
+          <a:p>
+            <a:r>
+              <a:rPr lang="en-US" dirty="0"/>
+              <a:t>V1</a:t>
+            </a:r>
+          </a:p>
+        </p:txBody>
+      </p:sp>
+      <p:sp>
+        <p:nvSpPr>
+          <p:cNvPr id="74" name="TextBox 73">
+            <a:extLst>
+              <a:ext uri="{FF2B5EF4-FFF2-40B4-BE49-F238E27FC236}">
+                <a16:creationId xmlns:a16="http://schemas.microsoft.com/office/drawing/2014/main" id="{2104C349-3198-4C0C-9383-9D24D86E0F4C}"/>
+              </a:ext>
+            </a:extLst>
+          </p:cNvPr>
+          <p:cNvSpPr txBox="1"/>
+          <p:nvPr/>
+        </p:nvSpPr>
+        <p:spPr>
+          <a:xfrm>
+            <a:off x="7331143" y="2275640"/>
+            <a:ext cx="502894" cy="369332"/>
+          </a:xfrm>
+          <a:prstGeom prst="rect">
+            <a:avLst/>
+          </a:prstGeom>
+          <a:noFill/>
+        </p:spPr>
+        <p:txBody>
+          <a:bodyPr wrap="square" rtlCol="0">
+            <a:spAutoFit/>
+          </a:bodyPr>
+          <a:lstStyle/>
+          <a:p>
+            <a:r>
+              <a:rPr lang="en-US" dirty="0"/>
+              <a:t>V2</a:t>
+            </a:r>
+          </a:p>
+        </p:txBody>
+      </p:sp>
+      <p:sp>
+        <p:nvSpPr>
+          <p:cNvPr id="77" name="TextBox 76">
+            <a:extLst>
+              <a:ext uri="{FF2B5EF4-FFF2-40B4-BE49-F238E27FC236}">
+                <a16:creationId xmlns:a16="http://schemas.microsoft.com/office/drawing/2014/main" id="{CED4A8A1-C7AF-4F31-A68D-420B8E020DF5}"/>
+              </a:ext>
+            </a:extLst>
+          </p:cNvPr>
+          <p:cNvSpPr txBox="1"/>
+          <p:nvPr/>
+        </p:nvSpPr>
+        <p:spPr>
+          <a:xfrm>
+            <a:off x="8114288" y="2182284"/>
+            <a:ext cx="502894" cy="369332"/>
+          </a:xfrm>
+          <a:prstGeom prst="rect">
+            <a:avLst/>
+          </a:prstGeom>
+          <a:noFill/>
+        </p:spPr>
+        <p:txBody>
+          <a:bodyPr wrap="square" rtlCol="0">
+            <a:spAutoFit/>
+          </a:bodyPr>
+          <a:lstStyle/>
+          <a:p>
+            <a:r>
+              <a:rPr lang="en-US" dirty="0"/>
+              <a:t>V’3</a:t>
+            </a:r>
+          </a:p>
+        </p:txBody>
+      </p:sp>
+      <p:sp>
+        <p:nvSpPr>
+          <p:cNvPr id="79" name="TextBox 78">
+            <a:extLst>
+              <a:ext uri="{FF2B5EF4-FFF2-40B4-BE49-F238E27FC236}">
+                <a16:creationId xmlns:a16="http://schemas.microsoft.com/office/drawing/2014/main" id="{6DBC50EA-3271-4E57-88C2-7A7FC5D7DD92}"/>
+              </a:ext>
+            </a:extLst>
+          </p:cNvPr>
+          <p:cNvSpPr txBox="1"/>
+          <p:nvPr/>
+        </p:nvSpPr>
+        <p:spPr>
+          <a:xfrm>
+            <a:off x="7761420" y="2692154"/>
+            <a:ext cx="502894" cy="369332"/>
+          </a:xfrm>
+          <a:prstGeom prst="rect">
+            <a:avLst/>
+          </a:prstGeom>
+          <a:noFill/>
+        </p:spPr>
+        <p:txBody>
+          <a:bodyPr wrap="square" rtlCol="0">
+            <a:spAutoFit/>
+          </a:bodyPr>
+          <a:lstStyle/>
+          <a:p>
+            <a:r>
+              <a:rPr lang="en-US" dirty="0"/>
+              <a:t>V4</a:t>
+            </a:r>
+          </a:p>
+        </p:txBody>
+      </p:sp>
+      <p:sp>
+        <p:nvSpPr>
+          <p:cNvPr id="81" name="TextBox 80">
+            <a:extLst>
+              <a:ext uri="{FF2B5EF4-FFF2-40B4-BE49-F238E27FC236}">
+                <a16:creationId xmlns:a16="http://schemas.microsoft.com/office/drawing/2014/main" id="{BEE5486B-7259-4159-8304-F2A8886E5712}"/>
+              </a:ext>
+            </a:extLst>
+          </p:cNvPr>
+          <p:cNvSpPr txBox="1"/>
+          <p:nvPr/>
+        </p:nvSpPr>
+        <p:spPr>
+          <a:xfrm>
+            <a:off x="8203367" y="2872772"/>
+            <a:ext cx="502894" cy="369332"/>
+          </a:xfrm>
+          <a:prstGeom prst="rect">
+            <a:avLst/>
+          </a:prstGeom>
+          <a:noFill/>
+        </p:spPr>
+        <p:txBody>
+          <a:bodyPr wrap="square" rtlCol="0">
+            <a:spAutoFit/>
+          </a:bodyPr>
+          <a:lstStyle/>
+          <a:p>
+            <a:r>
+              <a:rPr lang="en-US" dirty="0"/>
+              <a:t>V’5</a:t>
+            </a:r>
+          </a:p>
+        </p:txBody>
+      </p:sp>
+      <p:sp>
+        <p:nvSpPr>
+          <p:cNvPr id="82" name="TextBox 81">
+            <a:extLst>
+              <a:ext uri="{FF2B5EF4-FFF2-40B4-BE49-F238E27FC236}">
+                <a16:creationId xmlns:a16="http://schemas.microsoft.com/office/drawing/2014/main" id="{5E9C1373-0FA7-4F30-AEE6-37B9DFF23206}"/>
+              </a:ext>
+            </a:extLst>
+          </p:cNvPr>
+          <p:cNvSpPr txBox="1"/>
+          <p:nvPr/>
+        </p:nvSpPr>
+        <p:spPr>
+          <a:xfrm>
+            <a:off x="8059244" y="3211424"/>
+            <a:ext cx="502894" cy="369332"/>
+          </a:xfrm>
+          <a:prstGeom prst="rect">
+            <a:avLst/>
+          </a:prstGeom>
+          <a:noFill/>
+        </p:spPr>
+        <p:txBody>
+          <a:bodyPr wrap="square" rtlCol="0">
+            <a:spAutoFit/>
+          </a:bodyPr>
+          <a:lstStyle/>
+          <a:p>
+            <a:r>
+              <a:rPr lang="en-US" dirty="0"/>
+              <a:t>V’3</a:t>
+            </a:r>
+          </a:p>
+        </p:txBody>
+      </p:sp>
+      <p:sp>
+        <p:nvSpPr>
+          <p:cNvPr id="83" name="TextBox 82">
+            <a:extLst>
+              <a:ext uri="{FF2B5EF4-FFF2-40B4-BE49-F238E27FC236}">
+                <a16:creationId xmlns:a16="http://schemas.microsoft.com/office/drawing/2014/main" id="{48458C72-3C00-444E-B08F-1042EBA075C9}"/>
+              </a:ext>
+            </a:extLst>
+          </p:cNvPr>
+          <p:cNvSpPr txBox="1"/>
+          <p:nvPr/>
+        </p:nvSpPr>
+        <p:spPr>
+          <a:xfrm>
+            <a:off x="7694068" y="3747931"/>
+            <a:ext cx="502894" cy="369332"/>
+          </a:xfrm>
+          <a:prstGeom prst="rect">
+            <a:avLst/>
+          </a:prstGeom>
+          <a:noFill/>
+        </p:spPr>
+        <p:txBody>
+          <a:bodyPr wrap="square" rtlCol="0">
+            <a:spAutoFit/>
+          </a:bodyPr>
+          <a:lstStyle/>
+          <a:p>
+            <a:r>
+              <a:rPr lang="en-US" dirty="0"/>
+              <a:t>V4</a:t>
+            </a:r>
+          </a:p>
+        </p:txBody>
+      </p:sp>
+      <p:sp>
+        <p:nvSpPr>
+          <p:cNvPr id="84" name="TextBox 83">
+            <a:extLst>
+              <a:ext uri="{FF2B5EF4-FFF2-40B4-BE49-F238E27FC236}">
+                <a16:creationId xmlns:a16="http://schemas.microsoft.com/office/drawing/2014/main" id="{FBA1FEDE-EDB8-4403-9610-0375B6DBC8A0}"/>
+              </a:ext>
+            </a:extLst>
+          </p:cNvPr>
+          <p:cNvSpPr txBox="1"/>
+          <p:nvPr/>
+        </p:nvSpPr>
+        <p:spPr>
+          <a:xfrm>
+            <a:off x="8214813" y="3534331"/>
+            <a:ext cx="502894" cy="369332"/>
+          </a:xfrm>
+          <a:prstGeom prst="rect">
+            <a:avLst/>
+          </a:prstGeom>
+          <a:noFill/>
+        </p:spPr>
+        <p:txBody>
+          <a:bodyPr wrap="square" rtlCol="0">
+            <a:spAutoFit/>
+          </a:bodyPr>
+          <a:lstStyle/>
+          <a:p>
+            <a:r>
+              <a:rPr lang="en-US" dirty="0"/>
+              <a:t>V’5</a:t>
+            </a:r>
+          </a:p>
+        </p:txBody>
+      </p:sp>
     </p:spTree>
     <p:extLst>
       <p:ext uri="{BB962C8B-B14F-4D97-AF65-F5344CB8AC3E}">

</xml_diff>

<commit_message>
done with cross-stitch unit
</commit_message>
<xml_diff>
--- a/Figures.pptx
+++ b/Figures.pptx
@@ -5,7 +5,7 @@
     <p:sldMasterId id="2147483648" r:id="rId1"/>
   </p:sldMasterIdLst>
   <p:notesMasterIdLst>
-    <p:notesMasterId r:id="rId9"/>
+    <p:notesMasterId r:id="rId11"/>
   </p:notesMasterIdLst>
   <p:sldIdLst>
     <p:sldId id="256" r:id="rId2"/>
@@ -15,6 +15,8 @@
     <p:sldId id="261" r:id="rId6"/>
     <p:sldId id="260" r:id="rId7"/>
     <p:sldId id="262" r:id="rId8"/>
+    <p:sldId id="263" r:id="rId9"/>
+    <p:sldId id="264" r:id="rId10"/>
   </p:sldIdLst>
   <p:sldSz cx="12192000" cy="6858000"/>
   <p:notesSz cx="6858000" cy="9144000"/>
@@ -21422,6 +21424,3054 @@
 </p:sld>
 </file>
 
+<file path=ppt/slides/slide8.xml><?xml version="1.0" encoding="utf-8"?>
+<p:sld xmlns:a="http://schemas.openxmlformats.org/drawingml/2006/main" xmlns:r="http://schemas.openxmlformats.org/officeDocument/2006/relationships" xmlns:p="http://schemas.openxmlformats.org/presentationml/2006/main">
+  <p:cSld>
+    <p:spTree>
+      <p:nvGrpSpPr>
+        <p:cNvPr id="1" name=""/>
+        <p:cNvGrpSpPr/>
+        <p:nvPr/>
+      </p:nvGrpSpPr>
+      <p:grpSpPr>
+        <a:xfrm>
+          <a:off x="0" y="0"/>
+          <a:ext cx="0" cy="0"/>
+          <a:chOff x="0" y="0"/>
+          <a:chExt cx="0" cy="0"/>
+        </a:xfrm>
+      </p:grpSpPr>
+      <p:sp>
+        <p:nvSpPr>
+          <p:cNvPr id="4" name="Rectangle: Rounded Corners 3">
+            <a:extLst>
+              <a:ext uri="{FF2B5EF4-FFF2-40B4-BE49-F238E27FC236}">
+                <a16:creationId xmlns:a16="http://schemas.microsoft.com/office/drawing/2014/main" id="{9721ACFC-6E6F-490B-BCBA-1E25BC5934F0}"/>
+              </a:ext>
+            </a:extLst>
+          </p:cNvPr>
+          <p:cNvSpPr/>
+          <p:nvPr/>
+        </p:nvSpPr>
+        <p:spPr>
+          <a:xfrm>
+            <a:off x="433697" y="2036135"/>
+            <a:ext cx="1912032" cy="802049"/>
+          </a:xfrm>
+          <a:prstGeom prst="roundRect">
+            <a:avLst/>
+          </a:prstGeom>
+          <a:solidFill>
+            <a:schemeClr val="accent2">
+              <a:lumMod val="20000"/>
+              <a:lumOff val="80000"/>
+            </a:schemeClr>
+          </a:solidFill>
+          <a:ln w="25400">
+            <a:solidFill>
+              <a:schemeClr val="accent2">
+                <a:lumMod val="75000"/>
+              </a:schemeClr>
+            </a:solidFill>
+          </a:ln>
+        </p:spPr>
+        <p:style>
+          <a:lnRef idx="2">
+            <a:schemeClr val="accent1">
+              <a:shade val="50000"/>
+            </a:schemeClr>
+          </a:lnRef>
+          <a:fillRef idx="1">
+            <a:schemeClr val="accent1"/>
+          </a:fillRef>
+          <a:effectRef idx="0">
+            <a:schemeClr val="accent1"/>
+          </a:effectRef>
+          <a:fontRef idx="minor">
+            <a:schemeClr val="lt1"/>
+          </a:fontRef>
+        </p:style>
+        <p:txBody>
+          <a:bodyPr rtlCol="0" anchor="ctr"/>
+          <a:lstStyle/>
+          <a:p>
+            <a:pPr algn="ctr"/>
+            <a:r>
+              <a:rPr lang="en-US" dirty="0">
+                <a:solidFill>
+                  <a:schemeClr val="tx1"/>
+                </a:solidFill>
+              </a:rPr>
+              <a:t>Tree Context Learning (CCL)</a:t>
+            </a:r>
+          </a:p>
+        </p:txBody>
+      </p:sp>
+      <p:sp>
+        <p:nvSpPr>
+          <p:cNvPr id="5" name="Rectangle: Rounded Corners 4">
+            <a:extLst>
+              <a:ext uri="{FF2B5EF4-FFF2-40B4-BE49-F238E27FC236}">
+                <a16:creationId xmlns:a16="http://schemas.microsoft.com/office/drawing/2014/main" id="{A5AB1D63-C4AC-41E2-8654-0DCA65874562}"/>
+              </a:ext>
+            </a:extLst>
+          </p:cNvPr>
+          <p:cNvSpPr/>
+          <p:nvPr/>
+        </p:nvSpPr>
+        <p:spPr>
+          <a:xfrm>
+            <a:off x="433696" y="3701996"/>
+            <a:ext cx="1909735" cy="902896"/>
+          </a:xfrm>
+          <a:prstGeom prst="roundRect">
+            <a:avLst/>
+          </a:prstGeom>
+          <a:solidFill>
+            <a:schemeClr val="accent2">
+              <a:lumMod val="20000"/>
+              <a:lumOff val="80000"/>
+            </a:schemeClr>
+          </a:solidFill>
+          <a:ln w="25400">
+            <a:solidFill>
+              <a:schemeClr val="accent2">
+                <a:lumMod val="75000"/>
+              </a:schemeClr>
+            </a:solidFill>
+          </a:ln>
+        </p:spPr>
+        <p:style>
+          <a:lnRef idx="2">
+            <a:schemeClr val="accent1">
+              <a:shade val="50000"/>
+            </a:schemeClr>
+          </a:lnRef>
+          <a:fillRef idx="1">
+            <a:schemeClr val="accent1"/>
+          </a:fillRef>
+          <a:effectRef idx="0">
+            <a:schemeClr val="accent1"/>
+          </a:effectRef>
+          <a:fontRef idx="minor">
+            <a:schemeClr val="lt1"/>
+          </a:fontRef>
+        </p:style>
+        <p:txBody>
+          <a:bodyPr rtlCol="0" anchor="ctr"/>
+          <a:lstStyle/>
+          <a:p>
+            <a:pPr algn="ctr"/>
+            <a:r>
+              <a:rPr lang="en-US" dirty="0">
+                <a:solidFill>
+                  <a:schemeClr val="tx1"/>
+                </a:solidFill>
+              </a:rPr>
+              <a:t>Tree-based Transformation Learning (CTL)</a:t>
+            </a:r>
+          </a:p>
+        </p:txBody>
+      </p:sp>
+      <p:sp>
+        <p:nvSpPr>
+          <p:cNvPr id="53" name="Rectangle 52">
+            <a:extLst>
+              <a:ext uri="{FF2B5EF4-FFF2-40B4-BE49-F238E27FC236}">
+                <a16:creationId xmlns:a16="http://schemas.microsoft.com/office/drawing/2014/main" id="{E1665B6E-40CB-43DE-A520-AD656F631686}"/>
+              </a:ext>
+            </a:extLst>
+          </p:cNvPr>
+          <p:cNvSpPr/>
+          <p:nvPr/>
+        </p:nvSpPr>
+        <p:spPr>
+          <a:xfrm>
+            <a:off x="3001778" y="2029853"/>
+            <a:ext cx="1966947" cy="2568757"/>
+          </a:xfrm>
+          <a:prstGeom prst="rect">
+            <a:avLst/>
+          </a:prstGeom>
+          <a:solidFill>
+            <a:schemeClr val="accent6">
+              <a:lumMod val="20000"/>
+              <a:lumOff val="80000"/>
+            </a:schemeClr>
+          </a:solidFill>
+          <a:ln>
+            <a:noFill/>
+          </a:ln>
+        </p:spPr>
+        <p:style>
+          <a:lnRef idx="2">
+            <a:schemeClr val="accent1">
+              <a:shade val="50000"/>
+            </a:schemeClr>
+          </a:lnRef>
+          <a:fillRef idx="1">
+            <a:schemeClr val="accent1"/>
+          </a:fillRef>
+          <a:effectRef idx="0">
+            <a:schemeClr val="accent1"/>
+          </a:effectRef>
+          <a:fontRef idx="minor">
+            <a:schemeClr val="lt1"/>
+          </a:fontRef>
+        </p:style>
+        <p:txBody>
+          <a:bodyPr rtlCol="0" anchor="ctr"/>
+          <a:lstStyle/>
+          <a:p>
+            <a:pPr algn="ctr"/>
+            <a:endParaRPr lang="en-US" dirty="0">
+              <a:solidFill>
+                <a:schemeClr val="tx1"/>
+              </a:solidFill>
+            </a:endParaRPr>
+          </a:p>
+        </p:txBody>
+      </p:sp>
+      <p:grpSp>
+        <p:nvGrpSpPr>
+          <p:cNvPr id="54" name="Group 53">
+            <a:extLst>
+              <a:ext uri="{FF2B5EF4-FFF2-40B4-BE49-F238E27FC236}">
+                <a16:creationId xmlns:a16="http://schemas.microsoft.com/office/drawing/2014/main" id="{A5D6F1AB-B2A5-45E6-8B0E-21FAB7651827}"/>
+              </a:ext>
+            </a:extLst>
+          </p:cNvPr>
+          <p:cNvGrpSpPr/>
+          <p:nvPr/>
+        </p:nvGrpSpPr>
+        <p:grpSpPr>
+          <a:xfrm>
+            <a:off x="3167806" y="2095613"/>
+            <a:ext cx="1684421" cy="683091"/>
+            <a:chOff x="5275847" y="1329489"/>
+            <a:chExt cx="1684421" cy="759633"/>
+          </a:xfrm>
+        </p:grpSpPr>
+        <p:sp>
+          <p:nvSpPr>
+            <p:cNvPr id="55" name="TextBox 54">
+              <a:extLst>
+                <a:ext uri="{FF2B5EF4-FFF2-40B4-BE49-F238E27FC236}">
+                  <a16:creationId xmlns:a16="http://schemas.microsoft.com/office/drawing/2014/main" id="{E5F44324-E09F-4BAF-BD7F-50CC990381D0}"/>
+                </a:ext>
+              </a:extLst>
+            </p:cNvPr>
+            <p:cNvSpPr txBox="1"/>
+            <p:nvPr/>
+          </p:nvSpPr>
+          <p:spPr>
+            <a:xfrm flipH="1">
+              <a:off x="5333597" y="1329489"/>
+              <a:ext cx="1386039" cy="650300"/>
+            </a:xfrm>
+            <a:prstGeom prst="rect">
+              <a:avLst/>
+            </a:prstGeom>
+            <a:noFill/>
+          </p:spPr>
+          <p:txBody>
+            <a:bodyPr wrap="square" rtlCol="0">
+              <a:spAutoFit/>
+            </a:bodyPr>
+            <a:lstStyle/>
+            <a:p>
+              <a:r>
+                <a:rPr lang="el-GR" sz="3200" i="1" dirty="0"/>
+                <a:t>α</a:t>
+              </a:r>
+              <a:r>
+                <a:rPr lang="en-US" sz="3200" dirty="0"/>
+                <a:t>      </a:t>
+              </a:r>
+              <a:r>
+                <a:rPr lang="el-GR" sz="3200" i="1" dirty="0"/>
+                <a:t>α</a:t>
+              </a:r>
+              <a:endParaRPr lang="en-US" sz="3200" i="1" dirty="0"/>
+            </a:p>
+          </p:txBody>
+        </p:sp>
+        <p:sp>
+          <p:nvSpPr>
+            <p:cNvPr id="56" name="TextBox 55">
+              <a:extLst>
+                <a:ext uri="{FF2B5EF4-FFF2-40B4-BE49-F238E27FC236}">
+                  <a16:creationId xmlns:a16="http://schemas.microsoft.com/office/drawing/2014/main" id="{2655F21F-BB43-4A58-A1D1-53651842BC14}"/>
+                </a:ext>
+              </a:extLst>
+            </p:cNvPr>
+            <p:cNvSpPr txBox="1"/>
+            <p:nvPr/>
+          </p:nvSpPr>
+          <p:spPr>
+            <a:xfrm>
+              <a:off x="5588668" y="1678405"/>
+              <a:ext cx="431528" cy="410717"/>
+            </a:xfrm>
+            <a:prstGeom prst="rect">
+              <a:avLst/>
+            </a:prstGeom>
+            <a:noFill/>
+          </p:spPr>
+          <p:txBody>
+            <a:bodyPr wrap="none" rtlCol="0">
+              <a:spAutoFit/>
+            </a:bodyPr>
+            <a:lstStyle/>
+            <a:p>
+              <a:r>
+                <a:rPr lang="en-US" dirty="0"/>
+                <a:t>CC</a:t>
+              </a:r>
+            </a:p>
+          </p:txBody>
+        </p:sp>
+        <p:sp>
+          <p:nvSpPr>
+            <p:cNvPr id="57" name="TextBox 56">
+              <a:extLst>
+                <a:ext uri="{FF2B5EF4-FFF2-40B4-BE49-F238E27FC236}">
+                  <a16:creationId xmlns:a16="http://schemas.microsoft.com/office/drawing/2014/main" id="{F79FB679-702B-4584-BBDD-065524E252D5}"/>
+                </a:ext>
+              </a:extLst>
+            </p:cNvPr>
+            <p:cNvSpPr txBox="1"/>
+            <p:nvPr/>
+          </p:nvSpPr>
+          <p:spPr>
+            <a:xfrm>
+              <a:off x="6430133" y="1670747"/>
+              <a:ext cx="415563" cy="410717"/>
+            </a:xfrm>
+            <a:prstGeom prst="rect">
+              <a:avLst/>
+            </a:prstGeom>
+            <a:noFill/>
+          </p:spPr>
+          <p:txBody>
+            <a:bodyPr wrap="none" rtlCol="0">
+              <a:spAutoFit/>
+            </a:bodyPr>
+            <a:lstStyle/>
+            <a:p>
+              <a:r>
+                <a:rPr lang="en-US" dirty="0"/>
+                <a:t>TC</a:t>
+              </a:r>
+            </a:p>
+          </p:txBody>
+        </p:sp>
+        <p:sp>
+          <p:nvSpPr>
+            <p:cNvPr id="58" name="Rectangle 57">
+              <a:extLst>
+                <a:ext uri="{FF2B5EF4-FFF2-40B4-BE49-F238E27FC236}">
+                  <a16:creationId xmlns:a16="http://schemas.microsoft.com/office/drawing/2014/main" id="{48165556-36B0-456A-9D42-6B14F2138900}"/>
+                </a:ext>
+              </a:extLst>
+            </p:cNvPr>
+            <p:cNvSpPr/>
+            <p:nvPr/>
+          </p:nvSpPr>
+          <p:spPr>
+            <a:xfrm>
+              <a:off x="5275847" y="1383632"/>
+              <a:ext cx="1684421" cy="664105"/>
+            </a:xfrm>
+            <a:prstGeom prst="rect">
+              <a:avLst/>
+            </a:prstGeom>
+            <a:noFill/>
+            <a:ln>
+              <a:prstDash val="solid"/>
+            </a:ln>
+          </p:spPr>
+          <p:style>
+            <a:lnRef idx="2">
+              <a:schemeClr val="accent1">
+                <a:shade val="50000"/>
+              </a:schemeClr>
+            </a:lnRef>
+            <a:fillRef idx="1">
+              <a:schemeClr val="accent1"/>
+            </a:fillRef>
+            <a:effectRef idx="0">
+              <a:schemeClr val="accent1"/>
+            </a:effectRef>
+            <a:fontRef idx="minor">
+              <a:schemeClr val="lt1"/>
+            </a:fontRef>
+          </p:style>
+          <p:txBody>
+            <a:bodyPr rtlCol="0" anchor="ctr"/>
+            <a:lstStyle/>
+            <a:p>
+              <a:pPr algn="ctr"/>
+              <a:endParaRPr lang="en-US"/>
+            </a:p>
+          </p:txBody>
+        </p:sp>
+      </p:grpSp>
+      <p:grpSp>
+        <p:nvGrpSpPr>
+          <p:cNvPr id="59" name="Group 58">
+            <a:extLst>
+              <a:ext uri="{FF2B5EF4-FFF2-40B4-BE49-F238E27FC236}">
+                <a16:creationId xmlns:a16="http://schemas.microsoft.com/office/drawing/2014/main" id="{EC888CD9-0FBC-4E94-A6F1-02366318F3CF}"/>
+              </a:ext>
+            </a:extLst>
+          </p:cNvPr>
+          <p:cNvGrpSpPr/>
+          <p:nvPr/>
+        </p:nvGrpSpPr>
+        <p:grpSpPr>
+          <a:xfrm>
+            <a:off x="3135831" y="3811899"/>
+            <a:ext cx="1751933" cy="683091"/>
+            <a:chOff x="5300949" y="2047737"/>
+            <a:chExt cx="1684421" cy="759633"/>
+          </a:xfrm>
+        </p:grpSpPr>
+        <p:sp>
+          <p:nvSpPr>
+            <p:cNvPr id="60" name="TextBox 59">
+              <a:extLst>
+                <a:ext uri="{FF2B5EF4-FFF2-40B4-BE49-F238E27FC236}">
+                  <a16:creationId xmlns:a16="http://schemas.microsoft.com/office/drawing/2014/main" id="{B12FB0EF-B7FD-4835-A2EC-FA1488CBAEC6}"/>
+                </a:ext>
+              </a:extLst>
+            </p:cNvPr>
+            <p:cNvSpPr txBox="1"/>
+            <p:nvPr/>
+          </p:nvSpPr>
+          <p:spPr>
+            <a:xfrm flipH="1">
+              <a:off x="5343662" y="2047737"/>
+              <a:ext cx="1386039" cy="650300"/>
+            </a:xfrm>
+            <a:prstGeom prst="rect">
+              <a:avLst/>
+            </a:prstGeom>
+            <a:noFill/>
+          </p:spPr>
+          <p:txBody>
+            <a:bodyPr wrap="square" rtlCol="0">
+              <a:spAutoFit/>
+            </a:bodyPr>
+            <a:lstStyle/>
+            <a:p>
+              <a:r>
+                <a:rPr lang="el-GR" sz="3200" i="1" dirty="0"/>
+                <a:t>α</a:t>
+              </a:r>
+              <a:r>
+                <a:rPr lang="en-US" sz="3200" dirty="0"/>
+                <a:t>      </a:t>
+              </a:r>
+              <a:r>
+                <a:rPr lang="el-GR" sz="3200" dirty="0"/>
+                <a:t>α</a:t>
+              </a:r>
+              <a:endParaRPr lang="en-US" sz="3200" dirty="0"/>
+            </a:p>
+          </p:txBody>
+        </p:sp>
+        <p:sp>
+          <p:nvSpPr>
+            <p:cNvPr id="61" name="TextBox 60">
+              <a:extLst>
+                <a:ext uri="{FF2B5EF4-FFF2-40B4-BE49-F238E27FC236}">
+                  <a16:creationId xmlns:a16="http://schemas.microsoft.com/office/drawing/2014/main" id="{A9928BDC-96C2-4FF5-925B-8FC2D644D4CD}"/>
+                </a:ext>
+              </a:extLst>
+            </p:cNvPr>
+            <p:cNvSpPr txBox="1"/>
+            <p:nvPr/>
+          </p:nvSpPr>
+          <p:spPr>
+            <a:xfrm>
+              <a:off x="5588668" y="2396653"/>
+              <a:ext cx="412229" cy="410717"/>
+            </a:xfrm>
+            <a:prstGeom prst="rect">
+              <a:avLst/>
+            </a:prstGeom>
+            <a:noFill/>
+          </p:spPr>
+          <p:txBody>
+            <a:bodyPr wrap="none" rtlCol="0">
+              <a:spAutoFit/>
+            </a:bodyPr>
+            <a:lstStyle/>
+            <a:p>
+              <a:r>
+                <a:rPr lang="en-US" dirty="0"/>
+                <a:t>TT</a:t>
+              </a:r>
+            </a:p>
+          </p:txBody>
+        </p:sp>
+        <p:sp>
+          <p:nvSpPr>
+            <p:cNvPr id="62" name="TextBox 61">
+              <a:extLst>
+                <a:ext uri="{FF2B5EF4-FFF2-40B4-BE49-F238E27FC236}">
+                  <a16:creationId xmlns:a16="http://schemas.microsoft.com/office/drawing/2014/main" id="{655EA603-1167-4478-BB02-27BDAC0C83D8}"/>
+                </a:ext>
+              </a:extLst>
+            </p:cNvPr>
+            <p:cNvSpPr txBox="1"/>
+            <p:nvPr/>
+          </p:nvSpPr>
+          <p:spPr>
+            <a:xfrm>
+              <a:off x="6430133" y="2388995"/>
+              <a:ext cx="421462" cy="410717"/>
+            </a:xfrm>
+            <a:prstGeom prst="rect">
+              <a:avLst/>
+            </a:prstGeom>
+            <a:noFill/>
+          </p:spPr>
+          <p:txBody>
+            <a:bodyPr wrap="none" rtlCol="0">
+              <a:spAutoFit/>
+            </a:bodyPr>
+            <a:lstStyle/>
+            <a:p>
+              <a:r>
+                <a:rPr lang="en-US" dirty="0"/>
+                <a:t>CT</a:t>
+              </a:r>
+            </a:p>
+          </p:txBody>
+        </p:sp>
+        <p:sp>
+          <p:nvSpPr>
+            <p:cNvPr id="63" name="Rectangle 62">
+              <a:extLst>
+                <a:ext uri="{FF2B5EF4-FFF2-40B4-BE49-F238E27FC236}">
+                  <a16:creationId xmlns:a16="http://schemas.microsoft.com/office/drawing/2014/main" id="{1A714CFB-C358-4B01-A79D-F298707B30A8}"/>
+                </a:ext>
+              </a:extLst>
+            </p:cNvPr>
+            <p:cNvSpPr/>
+            <p:nvPr/>
+          </p:nvSpPr>
+          <p:spPr>
+            <a:xfrm>
+              <a:off x="5300949" y="2101880"/>
+              <a:ext cx="1684421" cy="664105"/>
+            </a:xfrm>
+            <a:prstGeom prst="rect">
+              <a:avLst/>
+            </a:prstGeom>
+            <a:noFill/>
+            <a:ln>
+              <a:prstDash val="solid"/>
+            </a:ln>
+          </p:spPr>
+          <p:style>
+            <a:lnRef idx="2">
+              <a:schemeClr val="accent1">
+                <a:shade val="50000"/>
+              </a:schemeClr>
+            </a:lnRef>
+            <a:fillRef idx="1">
+              <a:schemeClr val="accent1"/>
+            </a:fillRef>
+            <a:effectRef idx="0">
+              <a:schemeClr val="accent1"/>
+            </a:effectRef>
+            <a:fontRef idx="minor">
+              <a:schemeClr val="lt1"/>
+            </a:fontRef>
+          </p:style>
+          <p:txBody>
+            <a:bodyPr rtlCol="0" anchor="ctr"/>
+            <a:lstStyle/>
+            <a:p>
+              <a:pPr algn="ctr"/>
+              <a:endParaRPr lang="en-US"/>
+            </a:p>
+          </p:txBody>
+        </p:sp>
+      </p:grpSp>
+      <p:cxnSp>
+        <p:nvCxnSpPr>
+          <p:cNvPr id="66" name="Straight Arrow Connector 65">
+            <a:extLst>
+              <a:ext uri="{FF2B5EF4-FFF2-40B4-BE49-F238E27FC236}">
+                <a16:creationId xmlns:a16="http://schemas.microsoft.com/office/drawing/2014/main" id="{D769D996-F748-4A39-9124-5F71BAE327A9}"/>
+              </a:ext>
+            </a:extLst>
+          </p:cNvPr>
+          <p:cNvCxnSpPr>
+            <a:cxnSpLocks/>
+          </p:cNvCxnSpPr>
+          <p:nvPr/>
+        </p:nvCxnSpPr>
+        <p:spPr>
+          <a:xfrm flipV="1">
+            <a:off x="2345729" y="2446882"/>
+            <a:ext cx="834527" cy="1"/>
+          </a:xfrm>
+          <a:prstGeom prst="straightConnector1">
+            <a:avLst/>
+          </a:prstGeom>
+          <a:ln w="38100">
+            <a:tailEnd type="triangle"/>
+          </a:ln>
+        </p:spPr>
+        <p:style>
+          <a:lnRef idx="1">
+            <a:schemeClr val="accent1"/>
+          </a:lnRef>
+          <a:fillRef idx="0">
+            <a:schemeClr val="accent1"/>
+          </a:fillRef>
+          <a:effectRef idx="0">
+            <a:schemeClr val="accent1"/>
+          </a:effectRef>
+          <a:fontRef idx="minor">
+            <a:schemeClr val="tx1"/>
+          </a:fontRef>
+        </p:style>
+      </p:cxnSp>
+      <p:cxnSp>
+        <p:nvCxnSpPr>
+          <p:cNvPr id="67" name="Straight Arrow Connector 66">
+            <a:extLst>
+              <a:ext uri="{FF2B5EF4-FFF2-40B4-BE49-F238E27FC236}">
+                <a16:creationId xmlns:a16="http://schemas.microsoft.com/office/drawing/2014/main" id="{4E72346F-13D8-4F05-8BBC-DEC582131693}"/>
+              </a:ext>
+            </a:extLst>
+          </p:cNvPr>
+          <p:cNvCxnSpPr>
+            <a:cxnSpLocks/>
+          </p:cNvCxnSpPr>
+          <p:nvPr/>
+        </p:nvCxnSpPr>
+        <p:spPr>
+          <a:xfrm>
+            <a:off x="2347775" y="2437876"/>
+            <a:ext cx="2025122" cy="1422710"/>
+          </a:xfrm>
+          <a:prstGeom prst="straightConnector1">
+            <a:avLst/>
+          </a:prstGeom>
+          <a:ln w="38100">
+            <a:tailEnd type="triangle"/>
+          </a:ln>
+        </p:spPr>
+        <p:style>
+          <a:lnRef idx="1">
+            <a:schemeClr val="accent1"/>
+          </a:lnRef>
+          <a:fillRef idx="0">
+            <a:schemeClr val="accent1"/>
+          </a:fillRef>
+          <a:effectRef idx="0">
+            <a:schemeClr val="accent1"/>
+          </a:effectRef>
+          <a:fontRef idx="minor">
+            <a:schemeClr val="tx1"/>
+          </a:fontRef>
+        </p:style>
+      </p:cxnSp>
+      <p:cxnSp>
+        <p:nvCxnSpPr>
+          <p:cNvPr id="69" name="Straight Arrow Connector 68">
+            <a:extLst>
+              <a:ext uri="{FF2B5EF4-FFF2-40B4-BE49-F238E27FC236}">
+                <a16:creationId xmlns:a16="http://schemas.microsoft.com/office/drawing/2014/main" id="{8138BF2D-CF6E-4589-B721-E74AE246D859}"/>
+              </a:ext>
+            </a:extLst>
+          </p:cNvPr>
+          <p:cNvCxnSpPr>
+            <a:cxnSpLocks/>
+          </p:cNvCxnSpPr>
+          <p:nvPr/>
+        </p:nvCxnSpPr>
+        <p:spPr>
+          <a:xfrm flipV="1">
+            <a:off x="2330190" y="4205425"/>
+            <a:ext cx="834527" cy="1"/>
+          </a:xfrm>
+          <a:prstGeom prst="straightConnector1">
+            <a:avLst/>
+          </a:prstGeom>
+          <a:ln w="38100">
+            <a:solidFill>
+              <a:srgbClr val="FF9900"/>
+            </a:solidFill>
+            <a:prstDash val="solid"/>
+            <a:tailEnd type="triangle"/>
+          </a:ln>
+        </p:spPr>
+        <p:style>
+          <a:lnRef idx="1">
+            <a:schemeClr val="accent1"/>
+          </a:lnRef>
+          <a:fillRef idx="0">
+            <a:schemeClr val="accent1"/>
+          </a:fillRef>
+          <a:effectRef idx="0">
+            <a:schemeClr val="accent1"/>
+          </a:effectRef>
+          <a:fontRef idx="minor">
+            <a:schemeClr val="tx1"/>
+          </a:fontRef>
+        </p:style>
+      </p:cxnSp>
+      <p:cxnSp>
+        <p:nvCxnSpPr>
+          <p:cNvPr id="70" name="Straight Arrow Connector 69">
+            <a:extLst>
+              <a:ext uri="{FF2B5EF4-FFF2-40B4-BE49-F238E27FC236}">
+                <a16:creationId xmlns:a16="http://schemas.microsoft.com/office/drawing/2014/main" id="{7E0E1570-C313-4651-ABA0-01DB23A84D71}"/>
+              </a:ext>
+            </a:extLst>
+          </p:cNvPr>
+          <p:cNvCxnSpPr>
+            <a:cxnSpLocks/>
+          </p:cNvCxnSpPr>
+          <p:nvPr/>
+        </p:nvCxnSpPr>
+        <p:spPr>
+          <a:xfrm flipV="1">
+            <a:off x="2343431" y="2769993"/>
+            <a:ext cx="1951303" cy="1435434"/>
+          </a:xfrm>
+          <a:prstGeom prst="straightConnector1">
+            <a:avLst/>
+          </a:prstGeom>
+          <a:ln w="38100">
+            <a:solidFill>
+              <a:srgbClr val="FF9900"/>
+            </a:solidFill>
+            <a:prstDash val="solid"/>
+            <a:tailEnd type="triangle"/>
+          </a:ln>
+        </p:spPr>
+        <p:style>
+          <a:lnRef idx="1">
+            <a:schemeClr val="accent1"/>
+          </a:lnRef>
+          <a:fillRef idx="0">
+            <a:schemeClr val="accent1"/>
+          </a:fillRef>
+          <a:effectRef idx="0">
+            <a:schemeClr val="accent1"/>
+          </a:effectRef>
+          <a:fontRef idx="minor">
+            <a:schemeClr val="tx1"/>
+          </a:fontRef>
+        </p:style>
+      </p:cxnSp>
+      <p:cxnSp>
+        <p:nvCxnSpPr>
+          <p:cNvPr id="72" name="Straight Arrow Connector 71">
+            <a:extLst>
+              <a:ext uri="{FF2B5EF4-FFF2-40B4-BE49-F238E27FC236}">
+                <a16:creationId xmlns:a16="http://schemas.microsoft.com/office/drawing/2014/main" id="{5AC79266-0F7A-45E6-9B9E-18CDD6886EAA}"/>
+              </a:ext>
+            </a:extLst>
+          </p:cNvPr>
+          <p:cNvCxnSpPr>
+            <a:cxnSpLocks/>
+          </p:cNvCxnSpPr>
+          <p:nvPr/>
+        </p:nvCxnSpPr>
+        <p:spPr>
+          <a:xfrm flipV="1">
+            <a:off x="4837882" y="2446882"/>
+            <a:ext cx="834527" cy="1"/>
+          </a:xfrm>
+          <a:prstGeom prst="straightConnector1">
+            <a:avLst/>
+          </a:prstGeom>
+          <a:ln w="38100">
+            <a:tailEnd type="triangle"/>
+          </a:ln>
+        </p:spPr>
+        <p:style>
+          <a:lnRef idx="1">
+            <a:schemeClr val="accent1"/>
+          </a:lnRef>
+          <a:fillRef idx="0">
+            <a:schemeClr val="accent1"/>
+          </a:fillRef>
+          <a:effectRef idx="0">
+            <a:schemeClr val="accent1"/>
+          </a:effectRef>
+          <a:fontRef idx="minor">
+            <a:schemeClr val="tx1"/>
+          </a:fontRef>
+        </p:style>
+      </p:cxnSp>
+      <p:cxnSp>
+        <p:nvCxnSpPr>
+          <p:cNvPr id="73" name="Straight Arrow Connector 72">
+            <a:extLst>
+              <a:ext uri="{FF2B5EF4-FFF2-40B4-BE49-F238E27FC236}">
+                <a16:creationId xmlns:a16="http://schemas.microsoft.com/office/drawing/2014/main" id="{FD7544C0-7CC5-455E-A0D8-D7629B2D6D03}"/>
+              </a:ext>
+            </a:extLst>
+          </p:cNvPr>
+          <p:cNvCxnSpPr>
+            <a:cxnSpLocks/>
+          </p:cNvCxnSpPr>
+          <p:nvPr/>
+        </p:nvCxnSpPr>
+        <p:spPr>
+          <a:xfrm flipV="1">
+            <a:off x="4876674" y="4162314"/>
+            <a:ext cx="834527" cy="1"/>
+          </a:xfrm>
+          <a:prstGeom prst="straightConnector1">
+            <a:avLst/>
+          </a:prstGeom>
+          <a:ln w="38100">
+            <a:solidFill>
+              <a:srgbClr val="FF9900"/>
+            </a:solidFill>
+            <a:prstDash val="solid"/>
+            <a:tailEnd type="triangle"/>
+          </a:ln>
+        </p:spPr>
+        <p:style>
+          <a:lnRef idx="1">
+            <a:schemeClr val="accent1"/>
+          </a:lnRef>
+          <a:fillRef idx="0">
+            <a:schemeClr val="accent1"/>
+          </a:fillRef>
+          <a:effectRef idx="0">
+            <a:schemeClr val="accent1"/>
+          </a:effectRef>
+          <a:fontRef idx="minor">
+            <a:schemeClr val="tx1"/>
+          </a:fontRef>
+        </p:style>
+      </p:cxnSp>
+      <p:sp>
+        <p:nvSpPr>
+          <p:cNvPr id="74" name="Rectangle: Rounded Corners 73">
+            <a:extLst>
+              <a:ext uri="{FF2B5EF4-FFF2-40B4-BE49-F238E27FC236}">
+                <a16:creationId xmlns:a16="http://schemas.microsoft.com/office/drawing/2014/main" id="{DC8EBD5D-3AD4-4464-BDFC-C1E47FF110F5}"/>
+              </a:ext>
+            </a:extLst>
+          </p:cNvPr>
+          <p:cNvSpPr/>
+          <p:nvPr/>
+        </p:nvSpPr>
+        <p:spPr>
+          <a:xfrm>
+            <a:off x="5622728" y="2077107"/>
+            <a:ext cx="1912032" cy="802049"/>
+          </a:xfrm>
+          <a:prstGeom prst="roundRect">
+            <a:avLst/>
+          </a:prstGeom>
+          <a:solidFill>
+            <a:schemeClr val="accent2">
+              <a:lumMod val="20000"/>
+              <a:lumOff val="80000"/>
+            </a:schemeClr>
+          </a:solidFill>
+          <a:ln w="25400">
+            <a:solidFill>
+              <a:schemeClr val="accent2">
+                <a:lumMod val="75000"/>
+              </a:schemeClr>
+            </a:solidFill>
+          </a:ln>
+        </p:spPr>
+        <p:style>
+          <a:lnRef idx="2">
+            <a:schemeClr val="accent1">
+              <a:shade val="50000"/>
+            </a:schemeClr>
+          </a:lnRef>
+          <a:fillRef idx="1">
+            <a:schemeClr val="accent1"/>
+          </a:fillRef>
+          <a:effectRef idx="0">
+            <a:schemeClr val="accent1"/>
+          </a:effectRef>
+          <a:fontRef idx="minor">
+            <a:schemeClr val="lt1"/>
+          </a:fontRef>
+        </p:style>
+        <p:txBody>
+          <a:bodyPr rtlCol="0" anchor="ctr"/>
+          <a:lstStyle/>
+          <a:p>
+            <a:pPr algn="ctr"/>
+            <a:r>
+              <a:rPr lang="en-US" dirty="0">
+                <a:solidFill>
+                  <a:schemeClr val="tx1"/>
+                </a:solidFill>
+              </a:rPr>
+              <a:t>Tree Context Learning (CCL*)</a:t>
+            </a:r>
+          </a:p>
+        </p:txBody>
+      </p:sp>
+      <p:sp>
+        <p:nvSpPr>
+          <p:cNvPr id="76" name="Rectangle: Rounded Corners 75">
+            <a:extLst>
+              <a:ext uri="{FF2B5EF4-FFF2-40B4-BE49-F238E27FC236}">
+                <a16:creationId xmlns:a16="http://schemas.microsoft.com/office/drawing/2014/main" id="{C386EC99-0A50-48B9-8ECC-1F849C9F98E4}"/>
+              </a:ext>
+            </a:extLst>
+          </p:cNvPr>
+          <p:cNvSpPr/>
+          <p:nvPr/>
+        </p:nvSpPr>
+        <p:spPr>
+          <a:xfrm>
+            <a:off x="5672409" y="3710866"/>
+            <a:ext cx="1909735" cy="902896"/>
+          </a:xfrm>
+          <a:prstGeom prst="roundRect">
+            <a:avLst/>
+          </a:prstGeom>
+          <a:solidFill>
+            <a:schemeClr val="accent2">
+              <a:lumMod val="20000"/>
+              <a:lumOff val="80000"/>
+            </a:schemeClr>
+          </a:solidFill>
+          <a:ln w="25400">
+            <a:solidFill>
+              <a:schemeClr val="accent2">
+                <a:lumMod val="75000"/>
+              </a:schemeClr>
+            </a:solidFill>
+          </a:ln>
+        </p:spPr>
+        <p:style>
+          <a:lnRef idx="2">
+            <a:schemeClr val="accent1">
+              <a:shade val="50000"/>
+            </a:schemeClr>
+          </a:lnRef>
+          <a:fillRef idx="1">
+            <a:schemeClr val="accent1"/>
+          </a:fillRef>
+          <a:effectRef idx="0">
+            <a:schemeClr val="accent1"/>
+          </a:effectRef>
+          <a:fontRef idx="minor">
+            <a:schemeClr val="lt1"/>
+          </a:fontRef>
+        </p:style>
+        <p:txBody>
+          <a:bodyPr rtlCol="0" anchor="ctr"/>
+          <a:lstStyle/>
+          <a:p>
+            <a:pPr algn="ctr"/>
+            <a:r>
+              <a:rPr lang="en-US" dirty="0">
+                <a:solidFill>
+                  <a:schemeClr val="tx1"/>
+                </a:solidFill>
+              </a:rPr>
+              <a:t>Tree-based Transformation Learning (CTL*)</a:t>
+            </a:r>
+          </a:p>
+        </p:txBody>
+      </p:sp>
+      <p:cxnSp>
+        <p:nvCxnSpPr>
+          <p:cNvPr id="78" name="Straight Arrow Connector 77">
+            <a:extLst>
+              <a:ext uri="{FF2B5EF4-FFF2-40B4-BE49-F238E27FC236}">
+                <a16:creationId xmlns:a16="http://schemas.microsoft.com/office/drawing/2014/main" id="{E3DBCD60-308B-4BC6-A1C0-6B9F270C7BE1}"/>
+              </a:ext>
+            </a:extLst>
+          </p:cNvPr>
+          <p:cNvCxnSpPr>
+            <a:cxnSpLocks/>
+          </p:cNvCxnSpPr>
+          <p:nvPr/>
+        </p:nvCxnSpPr>
+        <p:spPr>
+          <a:xfrm flipV="1">
+            <a:off x="7534760" y="2480275"/>
+            <a:ext cx="352762" cy="1"/>
+          </a:xfrm>
+          <a:prstGeom prst="straightConnector1">
+            <a:avLst/>
+          </a:prstGeom>
+          <a:ln w="38100">
+            <a:tailEnd type="triangle"/>
+          </a:ln>
+        </p:spPr>
+        <p:style>
+          <a:lnRef idx="1">
+            <a:schemeClr val="accent1"/>
+          </a:lnRef>
+          <a:fillRef idx="0">
+            <a:schemeClr val="accent1"/>
+          </a:fillRef>
+          <a:effectRef idx="0">
+            <a:schemeClr val="accent1"/>
+          </a:effectRef>
+          <a:fontRef idx="minor">
+            <a:schemeClr val="tx1"/>
+          </a:fontRef>
+        </p:style>
+      </p:cxnSp>
+      <p:cxnSp>
+        <p:nvCxnSpPr>
+          <p:cNvPr id="81" name="Straight Arrow Connector 80">
+            <a:extLst>
+              <a:ext uri="{FF2B5EF4-FFF2-40B4-BE49-F238E27FC236}">
+                <a16:creationId xmlns:a16="http://schemas.microsoft.com/office/drawing/2014/main" id="{E939C42C-3443-43A6-A318-4D10312E7E1A}"/>
+              </a:ext>
+            </a:extLst>
+          </p:cNvPr>
+          <p:cNvCxnSpPr>
+            <a:cxnSpLocks/>
+          </p:cNvCxnSpPr>
+          <p:nvPr/>
+        </p:nvCxnSpPr>
+        <p:spPr>
+          <a:xfrm flipV="1">
+            <a:off x="7594429" y="4162315"/>
+            <a:ext cx="293093" cy="1"/>
+          </a:xfrm>
+          <a:prstGeom prst="straightConnector1">
+            <a:avLst/>
+          </a:prstGeom>
+          <a:ln w="38100">
+            <a:solidFill>
+              <a:srgbClr val="FF9900"/>
+            </a:solidFill>
+            <a:prstDash val="solid"/>
+            <a:tailEnd type="triangle"/>
+          </a:ln>
+        </p:spPr>
+        <p:style>
+          <a:lnRef idx="1">
+            <a:schemeClr val="accent1"/>
+          </a:lnRef>
+          <a:fillRef idx="0">
+            <a:schemeClr val="accent1"/>
+          </a:fillRef>
+          <a:effectRef idx="0">
+            <a:schemeClr val="accent1"/>
+          </a:effectRef>
+          <a:fontRef idx="minor">
+            <a:schemeClr val="tx1"/>
+          </a:fontRef>
+        </p:style>
+      </p:cxnSp>
+      <p:sp>
+        <p:nvSpPr>
+          <p:cNvPr id="83" name="TextBox 82">
+            <a:extLst>
+              <a:ext uri="{FF2B5EF4-FFF2-40B4-BE49-F238E27FC236}">
+                <a16:creationId xmlns:a16="http://schemas.microsoft.com/office/drawing/2014/main" id="{6F46ABBF-E73B-44AD-B1DC-303F32B67FD2}"/>
+              </a:ext>
+            </a:extLst>
+          </p:cNvPr>
+          <p:cNvSpPr txBox="1"/>
+          <p:nvPr/>
+        </p:nvSpPr>
+        <p:spPr>
+          <a:xfrm>
+            <a:off x="4948737" y="3074516"/>
+            <a:ext cx="1865704" cy="400110"/>
+          </a:xfrm>
+          <a:prstGeom prst="rect">
+            <a:avLst/>
+          </a:prstGeom>
+          <a:noFill/>
+        </p:spPr>
+        <p:txBody>
+          <a:bodyPr wrap="none" rtlCol="0">
+            <a:spAutoFit/>
+          </a:bodyPr>
+          <a:lstStyle/>
+          <a:p>
+            <a:r>
+              <a:rPr lang="en-US" sz="2000" dirty="0"/>
+              <a:t>Cross-stitch unit</a:t>
+            </a:r>
+          </a:p>
+        </p:txBody>
+      </p:sp>
+    </p:spTree>
+    <p:extLst>
+      <p:ext uri="{BB962C8B-B14F-4D97-AF65-F5344CB8AC3E}">
+        <p14:creationId xmlns:p14="http://schemas.microsoft.com/office/powerpoint/2010/main" val="2318333878"/>
+      </p:ext>
+    </p:extLst>
+  </p:cSld>
+  <p:clrMapOvr>
+    <a:masterClrMapping/>
+  </p:clrMapOvr>
+</p:sld>
+</file>
+
+<file path=ppt/slides/slide9.xml><?xml version="1.0" encoding="utf-8"?>
+<p:sld xmlns:a="http://schemas.openxmlformats.org/drawingml/2006/main" xmlns:r="http://schemas.openxmlformats.org/officeDocument/2006/relationships" xmlns:p="http://schemas.openxmlformats.org/presentationml/2006/main">
+  <p:cSld>
+    <p:spTree>
+      <p:nvGrpSpPr>
+        <p:cNvPr id="1" name=""/>
+        <p:cNvGrpSpPr/>
+        <p:nvPr/>
+      </p:nvGrpSpPr>
+      <p:grpSpPr>
+        <a:xfrm>
+          <a:off x="0" y="0"/>
+          <a:ext cx="0" cy="0"/>
+          <a:chOff x="0" y="0"/>
+          <a:chExt cx="0" cy="0"/>
+        </a:xfrm>
+      </p:grpSpPr>
+      <p:sp>
+        <p:nvSpPr>
+          <p:cNvPr id="5" name="Rectangle 4">
+            <a:extLst>
+              <a:ext uri="{FF2B5EF4-FFF2-40B4-BE49-F238E27FC236}">
+                <a16:creationId xmlns:a16="http://schemas.microsoft.com/office/drawing/2014/main" id="{9A93CA8F-BF8F-4C8D-B5F1-BEBA2694A845}"/>
+              </a:ext>
+            </a:extLst>
+          </p:cNvPr>
+          <p:cNvSpPr/>
+          <p:nvPr/>
+        </p:nvSpPr>
+        <p:spPr>
+          <a:xfrm>
+            <a:off x="3347517" y="2669180"/>
+            <a:ext cx="1838094" cy="1434810"/>
+          </a:xfrm>
+          <a:prstGeom prst="rect">
+            <a:avLst/>
+          </a:prstGeom>
+          <a:solidFill>
+            <a:schemeClr val="accent6">
+              <a:lumMod val="20000"/>
+              <a:lumOff val="80000"/>
+            </a:schemeClr>
+          </a:solidFill>
+          <a:ln>
+            <a:solidFill>
+              <a:schemeClr val="accent6">
+                <a:lumMod val="75000"/>
+              </a:schemeClr>
+            </a:solidFill>
+          </a:ln>
+        </p:spPr>
+        <p:style>
+          <a:lnRef idx="2">
+            <a:schemeClr val="accent1">
+              <a:shade val="50000"/>
+            </a:schemeClr>
+          </a:lnRef>
+          <a:fillRef idx="1">
+            <a:schemeClr val="accent1"/>
+          </a:fillRef>
+          <a:effectRef idx="0">
+            <a:schemeClr val="accent1"/>
+          </a:effectRef>
+          <a:fontRef idx="minor">
+            <a:schemeClr val="lt1"/>
+          </a:fontRef>
+        </p:style>
+        <p:txBody>
+          <a:bodyPr rtlCol="0" anchor="ctr"/>
+          <a:lstStyle/>
+          <a:p>
+            <a:pPr algn="ctr"/>
+            <a:endParaRPr lang="en-US" dirty="0">
+              <a:solidFill>
+                <a:schemeClr val="tx1"/>
+              </a:solidFill>
+            </a:endParaRPr>
+          </a:p>
+        </p:txBody>
+      </p:sp>
+      <p:sp>
+        <p:nvSpPr>
+          <p:cNvPr id="6" name="Rectangle 5">
+            <a:extLst>
+              <a:ext uri="{FF2B5EF4-FFF2-40B4-BE49-F238E27FC236}">
+                <a16:creationId xmlns:a16="http://schemas.microsoft.com/office/drawing/2014/main" id="{801540E7-B7B9-464E-A30A-B924FB0B0EAA}"/>
+              </a:ext>
+            </a:extLst>
+          </p:cNvPr>
+          <p:cNvSpPr/>
+          <p:nvPr/>
+        </p:nvSpPr>
+        <p:spPr>
+          <a:xfrm>
+            <a:off x="1546058" y="1015707"/>
+            <a:ext cx="5282332" cy="1476082"/>
+          </a:xfrm>
+          <a:prstGeom prst="rect">
+            <a:avLst/>
+          </a:prstGeom>
+          <a:noFill/>
+          <a:ln w="9525">
+            <a:prstDash val="dash"/>
+          </a:ln>
+        </p:spPr>
+        <p:style>
+          <a:lnRef idx="2">
+            <a:schemeClr val="accent1">
+              <a:shade val="50000"/>
+            </a:schemeClr>
+          </a:lnRef>
+          <a:fillRef idx="1">
+            <a:schemeClr val="accent1"/>
+          </a:fillRef>
+          <a:effectRef idx="0">
+            <a:schemeClr val="accent1"/>
+          </a:effectRef>
+          <a:fontRef idx="minor">
+            <a:schemeClr val="lt1"/>
+          </a:fontRef>
+        </p:style>
+        <p:txBody>
+          <a:bodyPr rtlCol="0" anchor="ctr"/>
+          <a:lstStyle/>
+          <a:p>
+            <a:pPr algn="ctr"/>
+            <a:endParaRPr lang="en-US"/>
+          </a:p>
+        </p:txBody>
+      </p:sp>
+      <p:grpSp>
+        <p:nvGrpSpPr>
+          <p:cNvPr id="7" name="Group 6">
+            <a:extLst>
+              <a:ext uri="{FF2B5EF4-FFF2-40B4-BE49-F238E27FC236}">
+                <a16:creationId xmlns:a16="http://schemas.microsoft.com/office/drawing/2014/main" id="{6B141AF6-E70E-45EA-A77E-6529C49F1E23}"/>
+              </a:ext>
+            </a:extLst>
+          </p:cNvPr>
+          <p:cNvGrpSpPr/>
+          <p:nvPr/>
+        </p:nvGrpSpPr>
+        <p:grpSpPr>
+          <a:xfrm>
+            <a:off x="3424352" y="2692772"/>
+            <a:ext cx="1684421" cy="645876"/>
+            <a:chOff x="5275847" y="1329489"/>
+            <a:chExt cx="1684421" cy="718248"/>
+          </a:xfrm>
+        </p:grpSpPr>
+        <p:sp>
+          <p:nvSpPr>
+            <p:cNvPr id="45" name="TextBox 44">
+              <a:extLst>
+                <a:ext uri="{FF2B5EF4-FFF2-40B4-BE49-F238E27FC236}">
+                  <a16:creationId xmlns:a16="http://schemas.microsoft.com/office/drawing/2014/main" id="{B6B01A55-2092-4DD5-B985-4C1FF2593078}"/>
+                </a:ext>
+              </a:extLst>
+            </p:cNvPr>
+            <p:cNvSpPr txBox="1"/>
+            <p:nvPr/>
+          </p:nvSpPr>
+          <p:spPr>
+            <a:xfrm flipH="1">
+              <a:off x="5333597" y="1329489"/>
+              <a:ext cx="1386039" cy="584775"/>
+            </a:xfrm>
+            <a:prstGeom prst="rect">
+              <a:avLst/>
+            </a:prstGeom>
+            <a:noFill/>
+          </p:spPr>
+          <p:txBody>
+            <a:bodyPr wrap="square" rtlCol="0">
+              <a:spAutoFit/>
+            </a:bodyPr>
+            <a:lstStyle/>
+            <a:p>
+              <a:r>
+                <a:rPr lang="el-GR" sz="3200" dirty="0"/>
+                <a:t>α</a:t>
+              </a:r>
+              <a:r>
+                <a:rPr lang="en-US" sz="3200" dirty="0"/>
+                <a:t>      </a:t>
+              </a:r>
+              <a:r>
+                <a:rPr lang="el-GR" sz="3200" dirty="0"/>
+                <a:t>α</a:t>
+              </a:r>
+              <a:endParaRPr lang="en-US" sz="3200" dirty="0"/>
+            </a:p>
+          </p:txBody>
+        </p:sp>
+        <p:sp>
+          <p:nvSpPr>
+            <p:cNvPr id="46" name="TextBox 45">
+              <a:extLst>
+                <a:ext uri="{FF2B5EF4-FFF2-40B4-BE49-F238E27FC236}">
+                  <a16:creationId xmlns:a16="http://schemas.microsoft.com/office/drawing/2014/main" id="{7E488901-8AAB-4A1E-8095-BF330FA0AF31}"/>
+                </a:ext>
+              </a:extLst>
+            </p:cNvPr>
+            <p:cNvSpPr txBox="1"/>
+            <p:nvPr/>
+          </p:nvSpPr>
+          <p:spPr>
+            <a:xfrm>
+              <a:off x="5588668" y="1678405"/>
+              <a:ext cx="579005" cy="369332"/>
+            </a:xfrm>
+            <a:prstGeom prst="rect">
+              <a:avLst/>
+            </a:prstGeom>
+            <a:noFill/>
+          </p:spPr>
+          <p:txBody>
+            <a:bodyPr wrap="none" rtlCol="0">
+              <a:spAutoFit/>
+            </a:bodyPr>
+            <a:lstStyle/>
+            <a:p>
+              <a:r>
+                <a:rPr lang="en-US" dirty="0"/>
+                <a:t>MM</a:t>
+              </a:r>
+            </a:p>
+          </p:txBody>
+        </p:sp>
+        <p:sp>
+          <p:nvSpPr>
+            <p:cNvPr id="47" name="TextBox 46">
+              <a:extLst>
+                <a:ext uri="{FF2B5EF4-FFF2-40B4-BE49-F238E27FC236}">
+                  <a16:creationId xmlns:a16="http://schemas.microsoft.com/office/drawing/2014/main" id="{3E8194AB-A5EA-4837-9365-2A765DD23CE5}"/>
+                </a:ext>
+              </a:extLst>
+            </p:cNvPr>
+            <p:cNvSpPr txBox="1"/>
+            <p:nvPr/>
+          </p:nvSpPr>
+          <p:spPr>
+            <a:xfrm>
+              <a:off x="6430133" y="1670747"/>
+              <a:ext cx="487634" cy="369332"/>
+            </a:xfrm>
+            <a:prstGeom prst="rect">
+              <a:avLst/>
+            </a:prstGeom>
+            <a:noFill/>
+          </p:spPr>
+          <p:txBody>
+            <a:bodyPr wrap="none" rtlCol="0">
+              <a:spAutoFit/>
+            </a:bodyPr>
+            <a:lstStyle/>
+            <a:p>
+              <a:r>
+                <a:rPr lang="en-US" dirty="0"/>
+                <a:t>SM</a:t>
+              </a:r>
+            </a:p>
+          </p:txBody>
+        </p:sp>
+        <p:sp>
+          <p:nvSpPr>
+            <p:cNvPr id="48" name="Rectangle 47">
+              <a:extLst>
+                <a:ext uri="{FF2B5EF4-FFF2-40B4-BE49-F238E27FC236}">
+                  <a16:creationId xmlns:a16="http://schemas.microsoft.com/office/drawing/2014/main" id="{5D3336F7-7B8B-4E13-B52C-C716A2493E6B}"/>
+                </a:ext>
+              </a:extLst>
+            </p:cNvPr>
+            <p:cNvSpPr/>
+            <p:nvPr/>
+          </p:nvSpPr>
+          <p:spPr>
+            <a:xfrm>
+              <a:off x="5275847" y="1383632"/>
+              <a:ext cx="1684421" cy="664105"/>
+            </a:xfrm>
+            <a:prstGeom prst="rect">
+              <a:avLst/>
+            </a:prstGeom>
+            <a:noFill/>
+            <a:ln>
+              <a:prstDash val="solid"/>
+            </a:ln>
+          </p:spPr>
+          <p:style>
+            <a:lnRef idx="2">
+              <a:schemeClr val="accent1">
+                <a:shade val="50000"/>
+              </a:schemeClr>
+            </a:lnRef>
+            <a:fillRef idx="1">
+              <a:schemeClr val="accent1"/>
+            </a:fillRef>
+            <a:effectRef idx="0">
+              <a:schemeClr val="accent1"/>
+            </a:effectRef>
+            <a:fontRef idx="minor">
+              <a:schemeClr val="lt1"/>
+            </a:fontRef>
+          </p:style>
+          <p:txBody>
+            <a:bodyPr rtlCol="0" anchor="ctr"/>
+            <a:lstStyle/>
+            <a:p>
+              <a:pPr algn="ctr"/>
+              <a:endParaRPr lang="en-US"/>
+            </a:p>
+          </p:txBody>
+        </p:sp>
+      </p:grpSp>
+      <p:grpSp>
+        <p:nvGrpSpPr>
+          <p:cNvPr id="8" name="Group 7">
+            <a:extLst>
+              <a:ext uri="{FF2B5EF4-FFF2-40B4-BE49-F238E27FC236}">
+                <a16:creationId xmlns:a16="http://schemas.microsoft.com/office/drawing/2014/main" id="{5F696B71-430A-4F40-BC1E-0C2A4C067328}"/>
+              </a:ext>
+            </a:extLst>
+          </p:cNvPr>
+          <p:cNvGrpSpPr/>
+          <p:nvPr/>
+        </p:nvGrpSpPr>
+        <p:grpSpPr>
+          <a:xfrm>
+            <a:off x="3424353" y="3410928"/>
+            <a:ext cx="1684421" cy="645876"/>
+            <a:chOff x="5300949" y="2047737"/>
+            <a:chExt cx="1684421" cy="718248"/>
+          </a:xfrm>
+        </p:grpSpPr>
+        <p:sp>
+          <p:nvSpPr>
+            <p:cNvPr id="41" name="TextBox 40">
+              <a:extLst>
+                <a:ext uri="{FF2B5EF4-FFF2-40B4-BE49-F238E27FC236}">
+                  <a16:creationId xmlns:a16="http://schemas.microsoft.com/office/drawing/2014/main" id="{E8998084-E24A-462F-9E39-A34EF13839F3}"/>
+                </a:ext>
+              </a:extLst>
+            </p:cNvPr>
+            <p:cNvSpPr txBox="1"/>
+            <p:nvPr/>
+          </p:nvSpPr>
+          <p:spPr>
+            <a:xfrm flipH="1">
+              <a:off x="5343662" y="2047737"/>
+              <a:ext cx="1386039" cy="584775"/>
+            </a:xfrm>
+            <a:prstGeom prst="rect">
+              <a:avLst/>
+            </a:prstGeom>
+            <a:noFill/>
+          </p:spPr>
+          <p:txBody>
+            <a:bodyPr wrap="square" rtlCol="0">
+              <a:spAutoFit/>
+            </a:bodyPr>
+            <a:lstStyle/>
+            <a:p>
+              <a:r>
+                <a:rPr lang="el-GR" sz="3200" dirty="0"/>
+                <a:t>α</a:t>
+              </a:r>
+              <a:r>
+                <a:rPr lang="en-US" sz="3200" dirty="0"/>
+                <a:t>      </a:t>
+              </a:r>
+              <a:r>
+                <a:rPr lang="el-GR" sz="3200" dirty="0"/>
+                <a:t>α</a:t>
+              </a:r>
+              <a:endParaRPr lang="en-US" sz="3200" dirty="0"/>
+            </a:p>
+          </p:txBody>
+        </p:sp>
+        <p:sp>
+          <p:nvSpPr>
+            <p:cNvPr id="42" name="TextBox 41">
+              <a:extLst>
+                <a:ext uri="{FF2B5EF4-FFF2-40B4-BE49-F238E27FC236}">
+                  <a16:creationId xmlns:a16="http://schemas.microsoft.com/office/drawing/2014/main" id="{1493D402-7515-418E-A985-D8412C422764}"/>
+                </a:ext>
+              </a:extLst>
+            </p:cNvPr>
+            <p:cNvSpPr txBox="1"/>
+            <p:nvPr/>
+          </p:nvSpPr>
+          <p:spPr>
+            <a:xfrm>
+              <a:off x="5588668" y="2396653"/>
+              <a:ext cx="396262" cy="369332"/>
+            </a:xfrm>
+            <a:prstGeom prst="rect">
+              <a:avLst/>
+            </a:prstGeom>
+            <a:noFill/>
+          </p:spPr>
+          <p:txBody>
+            <a:bodyPr wrap="none" rtlCol="0">
+              <a:spAutoFit/>
+            </a:bodyPr>
+            <a:lstStyle/>
+            <a:p>
+              <a:r>
+                <a:rPr lang="en-US" dirty="0"/>
+                <a:t>SS</a:t>
+              </a:r>
+            </a:p>
+          </p:txBody>
+        </p:sp>
+        <p:sp>
+          <p:nvSpPr>
+            <p:cNvPr id="43" name="TextBox 42">
+              <a:extLst>
+                <a:ext uri="{FF2B5EF4-FFF2-40B4-BE49-F238E27FC236}">
+                  <a16:creationId xmlns:a16="http://schemas.microsoft.com/office/drawing/2014/main" id="{512DFBF1-099E-467D-BB36-3A80719B6D30}"/>
+                </a:ext>
+              </a:extLst>
+            </p:cNvPr>
+            <p:cNvSpPr txBox="1"/>
+            <p:nvPr/>
+          </p:nvSpPr>
+          <p:spPr>
+            <a:xfrm>
+              <a:off x="6430133" y="2388995"/>
+              <a:ext cx="487634" cy="369332"/>
+            </a:xfrm>
+            <a:prstGeom prst="rect">
+              <a:avLst/>
+            </a:prstGeom>
+            <a:noFill/>
+          </p:spPr>
+          <p:txBody>
+            <a:bodyPr wrap="none" rtlCol="0">
+              <a:spAutoFit/>
+            </a:bodyPr>
+            <a:lstStyle/>
+            <a:p>
+              <a:r>
+                <a:rPr lang="en-US" dirty="0"/>
+                <a:t>MS</a:t>
+              </a:r>
+            </a:p>
+          </p:txBody>
+        </p:sp>
+        <p:sp>
+          <p:nvSpPr>
+            <p:cNvPr id="44" name="Rectangle 43">
+              <a:extLst>
+                <a:ext uri="{FF2B5EF4-FFF2-40B4-BE49-F238E27FC236}">
+                  <a16:creationId xmlns:a16="http://schemas.microsoft.com/office/drawing/2014/main" id="{5038DCAE-BC58-40A1-BCDB-5FF0AD5EA9DA}"/>
+                </a:ext>
+              </a:extLst>
+            </p:cNvPr>
+            <p:cNvSpPr/>
+            <p:nvPr/>
+          </p:nvSpPr>
+          <p:spPr>
+            <a:xfrm>
+              <a:off x="5300949" y="2101880"/>
+              <a:ext cx="1684421" cy="664105"/>
+            </a:xfrm>
+            <a:prstGeom prst="rect">
+              <a:avLst/>
+            </a:prstGeom>
+            <a:noFill/>
+            <a:ln>
+              <a:prstDash val="solid"/>
+            </a:ln>
+          </p:spPr>
+          <p:style>
+            <a:lnRef idx="2">
+              <a:schemeClr val="accent1">
+                <a:shade val="50000"/>
+              </a:schemeClr>
+            </a:lnRef>
+            <a:fillRef idx="1">
+              <a:schemeClr val="accent1"/>
+            </a:fillRef>
+            <a:effectRef idx="0">
+              <a:schemeClr val="accent1"/>
+            </a:effectRef>
+            <a:fontRef idx="minor">
+              <a:schemeClr val="lt1"/>
+            </a:fontRef>
+          </p:style>
+          <p:txBody>
+            <a:bodyPr rtlCol="0" anchor="ctr"/>
+            <a:lstStyle/>
+            <a:p>
+              <a:pPr algn="ctr"/>
+              <a:endParaRPr lang="en-US"/>
+            </a:p>
+          </p:txBody>
+        </p:sp>
+      </p:grpSp>
+      <p:sp>
+        <p:nvSpPr>
+          <p:cNvPr id="9" name="TextBox 8">
+            <a:extLst>
+              <a:ext uri="{FF2B5EF4-FFF2-40B4-BE49-F238E27FC236}">
+                <a16:creationId xmlns:a16="http://schemas.microsoft.com/office/drawing/2014/main" id="{6BA2C076-68ED-4DDE-AA84-698362837EAF}"/>
+              </a:ext>
+            </a:extLst>
+          </p:cNvPr>
+          <p:cNvSpPr txBox="1"/>
+          <p:nvPr/>
+        </p:nvSpPr>
+        <p:spPr>
+          <a:xfrm>
+            <a:off x="2723101" y="984612"/>
+            <a:ext cx="3104595" cy="332117"/>
+          </a:xfrm>
+          <a:prstGeom prst="rect">
+            <a:avLst/>
+          </a:prstGeom>
+          <a:noFill/>
+        </p:spPr>
+        <p:txBody>
+          <a:bodyPr wrap="square" rtlCol="0">
+            <a:spAutoFit/>
+          </a:bodyPr>
+          <a:lstStyle/>
+          <a:p>
+            <a:pPr algn="ctr"/>
+            <a:r>
+              <a:rPr lang="en-US" b="1" i="1" dirty="0"/>
+              <a:t>GCN-based </a:t>
+            </a:r>
+            <a:r>
+              <a:rPr lang="en-US" b="1" i="1" dirty="0" err="1"/>
+              <a:t>MethFL</a:t>
+            </a:r>
+            <a:endParaRPr lang="en-US" b="1" i="1" dirty="0"/>
+          </a:p>
+        </p:txBody>
+      </p:sp>
+      <p:sp>
+        <p:nvSpPr>
+          <p:cNvPr id="10" name="Rectangle: Rounded Corners 9">
+            <a:extLst>
+              <a:ext uri="{FF2B5EF4-FFF2-40B4-BE49-F238E27FC236}">
+                <a16:creationId xmlns:a16="http://schemas.microsoft.com/office/drawing/2014/main" id="{220C9E06-91FA-446F-98D6-E8B1109E9AED}"/>
+              </a:ext>
+            </a:extLst>
+          </p:cNvPr>
+          <p:cNvSpPr/>
+          <p:nvPr/>
+        </p:nvSpPr>
+        <p:spPr>
+          <a:xfrm>
+            <a:off x="2443234" y="1242529"/>
+            <a:ext cx="273678" cy="1141355"/>
+          </a:xfrm>
+          <a:prstGeom prst="roundRect">
+            <a:avLst/>
+          </a:prstGeom>
+          <a:solidFill>
+            <a:schemeClr val="accent5">
+              <a:lumMod val="40000"/>
+              <a:lumOff val="60000"/>
+            </a:schemeClr>
+          </a:solidFill>
+          <a:ln>
+            <a:solidFill>
+              <a:schemeClr val="accent5">
+                <a:lumMod val="75000"/>
+              </a:schemeClr>
+            </a:solidFill>
+          </a:ln>
+        </p:spPr>
+        <p:style>
+          <a:lnRef idx="2">
+            <a:schemeClr val="accent1">
+              <a:shade val="50000"/>
+            </a:schemeClr>
+          </a:lnRef>
+          <a:fillRef idx="1">
+            <a:schemeClr val="accent1"/>
+          </a:fillRef>
+          <a:effectRef idx="0">
+            <a:schemeClr val="accent1"/>
+          </a:effectRef>
+          <a:fontRef idx="minor">
+            <a:schemeClr val="lt1"/>
+          </a:fontRef>
+        </p:style>
+        <p:txBody>
+          <a:bodyPr rtlCol="0" anchor="ctr"/>
+          <a:lstStyle/>
+          <a:p>
+            <a:pPr algn="ctr"/>
+            <a:endParaRPr lang="en-US" dirty="0"/>
+          </a:p>
+        </p:txBody>
+      </p:sp>
+      <p:sp>
+        <p:nvSpPr>
+          <p:cNvPr id="11" name="Rectangle: Rounded Corners 10">
+            <a:extLst>
+              <a:ext uri="{FF2B5EF4-FFF2-40B4-BE49-F238E27FC236}">
+                <a16:creationId xmlns:a16="http://schemas.microsoft.com/office/drawing/2014/main" id="{6D753F41-C2A0-4016-BCD4-03AB41666476}"/>
+              </a:ext>
+            </a:extLst>
+          </p:cNvPr>
+          <p:cNvSpPr/>
+          <p:nvPr/>
+        </p:nvSpPr>
+        <p:spPr>
+          <a:xfrm>
+            <a:off x="1741619" y="1238153"/>
+            <a:ext cx="301228" cy="1138478"/>
+          </a:xfrm>
+          <a:prstGeom prst="roundRect">
+            <a:avLst/>
+          </a:prstGeom>
+          <a:solidFill>
+            <a:schemeClr val="accent2">
+              <a:lumMod val="60000"/>
+              <a:lumOff val="40000"/>
+            </a:schemeClr>
+          </a:solidFill>
+          <a:ln>
+            <a:solidFill>
+              <a:schemeClr val="accent2">
+                <a:lumMod val="75000"/>
+              </a:schemeClr>
+            </a:solidFill>
+          </a:ln>
+        </p:spPr>
+        <p:style>
+          <a:lnRef idx="2">
+            <a:schemeClr val="accent1">
+              <a:shade val="50000"/>
+            </a:schemeClr>
+          </a:lnRef>
+          <a:fillRef idx="1">
+            <a:schemeClr val="accent1"/>
+          </a:fillRef>
+          <a:effectRef idx="0">
+            <a:schemeClr val="accent1"/>
+          </a:effectRef>
+          <a:fontRef idx="minor">
+            <a:schemeClr val="lt1"/>
+          </a:fontRef>
+        </p:style>
+        <p:txBody>
+          <a:bodyPr rtlCol="0" anchor="ctr"/>
+          <a:lstStyle/>
+          <a:p>
+            <a:pPr algn="ctr"/>
+            <a:endParaRPr lang="en-US" dirty="0"/>
+          </a:p>
+        </p:txBody>
+      </p:sp>
+      <p:cxnSp>
+        <p:nvCxnSpPr>
+          <p:cNvPr id="12" name="Straight Arrow Connector 11">
+            <a:extLst>
+              <a:ext uri="{FF2B5EF4-FFF2-40B4-BE49-F238E27FC236}">
+                <a16:creationId xmlns:a16="http://schemas.microsoft.com/office/drawing/2014/main" id="{C972ECC2-72F8-4020-A1CC-9EEAFE9CF9F7}"/>
+              </a:ext>
+            </a:extLst>
+          </p:cNvPr>
+          <p:cNvCxnSpPr>
+            <a:cxnSpLocks/>
+          </p:cNvCxnSpPr>
+          <p:nvPr/>
+        </p:nvCxnSpPr>
+        <p:spPr>
+          <a:xfrm>
+            <a:off x="2042187" y="1807737"/>
+            <a:ext cx="400594" cy="0"/>
+          </a:xfrm>
+          <a:prstGeom prst="straightConnector1">
+            <a:avLst/>
+          </a:prstGeom>
+          <a:ln w="12700">
+            <a:tailEnd type="triangle"/>
+          </a:ln>
+        </p:spPr>
+        <p:style>
+          <a:lnRef idx="1">
+            <a:schemeClr val="accent1"/>
+          </a:lnRef>
+          <a:fillRef idx="0">
+            <a:schemeClr val="accent1"/>
+          </a:fillRef>
+          <a:effectRef idx="0">
+            <a:schemeClr val="accent1"/>
+          </a:effectRef>
+          <a:fontRef idx="minor">
+            <a:schemeClr val="tx1"/>
+          </a:fontRef>
+        </p:style>
+      </p:cxnSp>
+      <p:cxnSp>
+        <p:nvCxnSpPr>
+          <p:cNvPr id="13" name="Straight Arrow Connector 12">
+            <a:extLst>
+              <a:ext uri="{FF2B5EF4-FFF2-40B4-BE49-F238E27FC236}">
+                <a16:creationId xmlns:a16="http://schemas.microsoft.com/office/drawing/2014/main" id="{4FF16342-EA29-40D8-864B-D01DEBE63713}"/>
+              </a:ext>
+            </a:extLst>
+          </p:cNvPr>
+          <p:cNvCxnSpPr>
+            <a:cxnSpLocks/>
+          </p:cNvCxnSpPr>
+          <p:nvPr/>
+        </p:nvCxnSpPr>
+        <p:spPr>
+          <a:xfrm>
+            <a:off x="1343792" y="1802637"/>
+            <a:ext cx="400594" cy="0"/>
+          </a:xfrm>
+          <a:prstGeom prst="straightConnector1">
+            <a:avLst/>
+          </a:prstGeom>
+          <a:ln w="12700">
+            <a:tailEnd type="triangle"/>
+          </a:ln>
+        </p:spPr>
+        <p:style>
+          <a:lnRef idx="1">
+            <a:schemeClr val="accent1"/>
+          </a:lnRef>
+          <a:fillRef idx="0">
+            <a:schemeClr val="accent1"/>
+          </a:fillRef>
+          <a:effectRef idx="0">
+            <a:schemeClr val="accent1"/>
+          </a:effectRef>
+          <a:fontRef idx="minor">
+            <a:schemeClr val="tx1"/>
+          </a:fontRef>
+        </p:style>
+      </p:cxnSp>
+      <p:sp>
+        <p:nvSpPr>
+          <p:cNvPr id="14" name="Rectangle: Rounded Corners 13">
+            <a:extLst>
+              <a:ext uri="{FF2B5EF4-FFF2-40B4-BE49-F238E27FC236}">
+                <a16:creationId xmlns:a16="http://schemas.microsoft.com/office/drawing/2014/main" id="{3E42EF84-BB8E-44F6-8753-632C17F782C1}"/>
+              </a:ext>
+            </a:extLst>
+          </p:cNvPr>
+          <p:cNvSpPr/>
+          <p:nvPr/>
+        </p:nvSpPr>
+        <p:spPr>
+          <a:xfrm>
+            <a:off x="6385305" y="1249760"/>
+            <a:ext cx="273678" cy="1141355"/>
+          </a:xfrm>
+          <a:prstGeom prst="roundRect">
+            <a:avLst/>
+          </a:prstGeom>
+          <a:solidFill>
+            <a:schemeClr val="accent5">
+              <a:lumMod val="40000"/>
+              <a:lumOff val="60000"/>
+            </a:schemeClr>
+          </a:solidFill>
+          <a:ln>
+            <a:solidFill>
+              <a:schemeClr val="accent5">
+                <a:lumMod val="75000"/>
+              </a:schemeClr>
+            </a:solidFill>
+          </a:ln>
+        </p:spPr>
+        <p:style>
+          <a:lnRef idx="2">
+            <a:schemeClr val="accent1">
+              <a:shade val="50000"/>
+            </a:schemeClr>
+          </a:lnRef>
+          <a:fillRef idx="1">
+            <a:schemeClr val="accent1"/>
+          </a:fillRef>
+          <a:effectRef idx="0">
+            <a:schemeClr val="accent1"/>
+          </a:effectRef>
+          <a:fontRef idx="minor">
+            <a:schemeClr val="lt1"/>
+          </a:fontRef>
+        </p:style>
+        <p:txBody>
+          <a:bodyPr rtlCol="0" anchor="ctr"/>
+          <a:lstStyle/>
+          <a:p>
+            <a:pPr algn="ctr"/>
+            <a:endParaRPr lang="en-US" dirty="0"/>
+          </a:p>
+        </p:txBody>
+      </p:sp>
+      <p:sp>
+        <p:nvSpPr>
+          <p:cNvPr id="15" name="Rectangle: Rounded Corners 14">
+            <a:extLst>
+              <a:ext uri="{FF2B5EF4-FFF2-40B4-BE49-F238E27FC236}">
+                <a16:creationId xmlns:a16="http://schemas.microsoft.com/office/drawing/2014/main" id="{04B31C15-6AB0-4ADF-99C5-9264329A3B21}"/>
+              </a:ext>
+            </a:extLst>
+          </p:cNvPr>
+          <p:cNvSpPr/>
+          <p:nvPr/>
+        </p:nvSpPr>
+        <p:spPr>
+          <a:xfrm>
+            <a:off x="5683690" y="1245384"/>
+            <a:ext cx="301228" cy="1138478"/>
+          </a:xfrm>
+          <a:prstGeom prst="roundRect">
+            <a:avLst/>
+          </a:prstGeom>
+          <a:solidFill>
+            <a:schemeClr val="accent2">
+              <a:lumMod val="60000"/>
+              <a:lumOff val="40000"/>
+            </a:schemeClr>
+          </a:solidFill>
+          <a:ln>
+            <a:solidFill>
+              <a:schemeClr val="accent2">
+                <a:lumMod val="75000"/>
+              </a:schemeClr>
+            </a:solidFill>
+          </a:ln>
+        </p:spPr>
+        <p:style>
+          <a:lnRef idx="2">
+            <a:schemeClr val="accent1">
+              <a:shade val="50000"/>
+            </a:schemeClr>
+          </a:lnRef>
+          <a:fillRef idx="1">
+            <a:schemeClr val="accent1"/>
+          </a:fillRef>
+          <a:effectRef idx="0">
+            <a:schemeClr val="accent1"/>
+          </a:effectRef>
+          <a:fontRef idx="minor">
+            <a:schemeClr val="lt1"/>
+          </a:fontRef>
+        </p:style>
+        <p:txBody>
+          <a:bodyPr rtlCol="0" anchor="ctr"/>
+          <a:lstStyle/>
+          <a:p>
+            <a:pPr algn="ctr"/>
+            <a:endParaRPr lang="en-US" dirty="0"/>
+          </a:p>
+        </p:txBody>
+      </p:sp>
+      <p:cxnSp>
+        <p:nvCxnSpPr>
+          <p:cNvPr id="16" name="Straight Arrow Connector 15">
+            <a:extLst>
+              <a:ext uri="{FF2B5EF4-FFF2-40B4-BE49-F238E27FC236}">
+                <a16:creationId xmlns:a16="http://schemas.microsoft.com/office/drawing/2014/main" id="{2179F158-E0A0-45C6-BF42-B7506E5F08EF}"/>
+              </a:ext>
+            </a:extLst>
+          </p:cNvPr>
+          <p:cNvCxnSpPr>
+            <a:cxnSpLocks/>
+          </p:cNvCxnSpPr>
+          <p:nvPr/>
+        </p:nvCxnSpPr>
+        <p:spPr>
+          <a:xfrm>
+            <a:off x="5984258" y="1814967"/>
+            <a:ext cx="400594" cy="0"/>
+          </a:xfrm>
+          <a:prstGeom prst="straightConnector1">
+            <a:avLst/>
+          </a:prstGeom>
+          <a:ln w="12700">
+            <a:tailEnd type="triangle"/>
+          </a:ln>
+        </p:spPr>
+        <p:style>
+          <a:lnRef idx="1">
+            <a:schemeClr val="accent1"/>
+          </a:lnRef>
+          <a:fillRef idx="0">
+            <a:schemeClr val="accent1"/>
+          </a:fillRef>
+          <a:effectRef idx="0">
+            <a:schemeClr val="accent1"/>
+          </a:effectRef>
+          <a:fontRef idx="minor">
+            <a:schemeClr val="tx1"/>
+          </a:fontRef>
+        </p:style>
+      </p:cxnSp>
+      <p:sp>
+        <p:nvSpPr>
+          <p:cNvPr id="17" name="Rectangle 16">
+            <a:extLst>
+              <a:ext uri="{FF2B5EF4-FFF2-40B4-BE49-F238E27FC236}">
+                <a16:creationId xmlns:a16="http://schemas.microsoft.com/office/drawing/2014/main" id="{D623C07F-813A-405D-A70D-4E8B7ED1C258}"/>
+              </a:ext>
+            </a:extLst>
+          </p:cNvPr>
+          <p:cNvSpPr/>
+          <p:nvPr/>
+        </p:nvSpPr>
+        <p:spPr>
+          <a:xfrm>
+            <a:off x="1546058" y="4249421"/>
+            <a:ext cx="5282332" cy="1533135"/>
+          </a:xfrm>
+          <a:prstGeom prst="rect">
+            <a:avLst/>
+          </a:prstGeom>
+          <a:noFill/>
+          <a:ln w="9525">
+            <a:prstDash val="dash"/>
+          </a:ln>
+        </p:spPr>
+        <p:style>
+          <a:lnRef idx="2">
+            <a:schemeClr val="accent1">
+              <a:shade val="50000"/>
+            </a:schemeClr>
+          </a:lnRef>
+          <a:fillRef idx="1">
+            <a:schemeClr val="accent1"/>
+          </a:fillRef>
+          <a:effectRef idx="0">
+            <a:schemeClr val="accent1"/>
+          </a:effectRef>
+          <a:fontRef idx="minor">
+            <a:schemeClr val="lt1"/>
+          </a:fontRef>
+        </p:style>
+        <p:txBody>
+          <a:bodyPr rtlCol="0" anchor="ctr"/>
+          <a:lstStyle/>
+          <a:p>
+            <a:pPr algn="ctr"/>
+            <a:endParaRPr lang="en-US"/>
+          </a:p>
+        </p:txBody>
+      </p:sp>
+      <p:sp>
+        <p:nvSpPr>
+          <p:cNvPr id="18" name="TextBox 17">
+            <a:extLst>
+              <a:ext uri="{FF2B5EF4-FFF2-40B4-BE49-F238E27FC236}">
+                <a16:creationId xmlns:a16="http://schemas.microsoft.com/office/drawing/2014/main" id="{54795991-BDC4-4B2D-9349-BBE596F69D31}"/>
+              </a:ext>
+            </a:extLst>
+          </p:cNvPr>
+          <p:cNvSpPr txBox="1"/>
+          <p:nvPr/>
+        </p:nvSpPr>
+        <p:spPr>
+          <a:xfrm>
+            <a:off x="2759468" y="5450438"/>
+            <a:ext cx="3104595" cy="332117"/>
+          </a:xfrm>
+          <a:prstGeom prst="rect">
+            <a:avLst/>
+          </a:prstGeom>
+          <a:noFill/>
+        </p:spPr>
+        <p:txBody>
+          <a:bodyPr wrap="square" rtlCol="0">
+            <a:spAutoFit/>
+          </a:bodyPr>
+          <a:lstStyle/>
+          <a:p>
+            <a:pPr algn="ctr"/>
+            <a:r>
+              <a:rPr lang="en-US" b="1" i="1" dirty="0"/>
+              <a:t>GCN-based </a:t>
+            </a:r>
+            <a:r>
+              <a:rPr lang="en-US" b="1" i="1" dirty="0" err="1"/>
+              <a:t>StmtFL</a:t>
+            </a:r>
+            <a:endParaRPr lang="en-US" b="1" i="1" dirty="0"/>
+          </a:p>
+        </p:txBody>
+      </p:sp>
+      <p:sp>
+        <p:nvSpPr>
+          <p:cNvPr id="19" name="Rectangle: Rounded Corners 18">
+            <a:extLst>
+              <a:ext uri="{FF2B5EF4-FFF2-40B4-BE49-F238E27FC236}">
+                <a16:creationId xmlns:a16="http://schemas.microsoft.com/office/drawing/2014/main" id="{9D0687CA-6E08-43E0-83FC-13B7F9E38792}"/>
+              </a:ext>
+            </a:extLst>
+          </p:cNvPr>
+          <p:cNvSpPr/>
+          <p:nvPr/>
+        </p:nvSpPr>
+        <p:spPr>
+          <a:xfrm>
+            <a:off x="2443234" y="4357328"/>
+            <a:ext cx="273678" cy="1141355"/>
+          </a:xfrm>
+          <a:prstGeom prst="roundRect">
+            <a:avLst/>
+          </a:prstGeom>
+          <a:solidFill>
+            <a:schemeClr val="accent5">
+              <a:lumMod val="40000"/>
+              <a:lumOff val="60000"/>
+            </a:schemeClr>
+          </a:solidFill>
+          <a:ln>
+            <a:solidFill>
+              <a:schemeClr val="accent5">
+                <a:lumMod val="75000"/>
+              </a:schemeClr>
+            </a:solidFill>
+          </a:ln>
+        </p:spPr>
+        <p:style>
+          <a:lnRef idx="2">
+            <a:schemeClr val="accent1">
+              <a:shade val="50000"/>
+            </a:schemeClr>
+          </a:lnRef>
+          <a:fillRef idx="1">
+            <a:schemeClr val="accent1"/>
+          </a:fillRef>
+          <a:effectRef idx="0">
+            <a:schemeClr val="accent1"/>
+          </a:effectRef>
+          <a:fontRef idx="minor">
+            <a:schemeClr val="lt1"/>
+          </a:fontRef>
+        </p:style>
+        <p:txBody>
+          <a:bodyPr rtlCol="0" anchor="ctr"/>
+          <a:lstStyle/>
+          <a:p>
+            <a:pPr algn="ctr"/>
+            <a:endParaRPr lang="en-US" dirty="0"/>
+          </a:p>
+        </p:txBody>
+      </p:sp>
+      <p:sp>
+        <p:nvSpPr>
+          <p:cNvPr id="20" name="Rectangle: Rounded Corners 19">
+            <a:extLst>
+              <a:ext uri="{FF2B5EF4-FFF2-40B4-BE49-F238E27FC236}">
+                <a16:creationId xmlns:a16="http://schemas.microsoft.com/office/drawing/2014/main" id="{93797726-DC34-4B3B-9610-ECA5314BDD04}"/>
+              </a:ext>
+            </a:extLst>
+          </p:cNvPr>
+          <p:cNvSpPr/>
+          <p:nvPr/>
+        </p:nvSpPr>
+        <p:spPr>
+          <a:xfrm>
+            <a:off x="1741619" y="4352951"/>
+            <a:ext cx="301228" cy="1138478"/>
+          </a:xfrm>
+          <a:prstGeom prst="roundRect">
+            <a:avLst/>
+          </a:prstGeom>
+          <a:solidFill>
+            <a:schemeClr val="accent2">
+              <a:lumMod val="60000"/>
+              <a:lumOff val="40000"/>
+            </a:schemeClr>
+          </a:solidFill>
+          <a:ln>
+            <a:solidFill>
+              <a:schemeClr val="accent2">
+                <a:lumMod val="75000"/>
+              </a:schemeClr>
+            </a:solidFill>
+          </a:ln>
+        </p:spPr>
+        <p:style>
+          <a:lnRef idx="2">
+            <a:schemeClr val="accent1">
+              <a:shade val="50000"/>
+            </a:schemeClr>
+          </a:lnRef>
+          <a:fillRef idx="1">
+            <a:schemeClr val="accent1"/>
+          </a:fillRef>
+          <a:effectRef idx="0">
+            <a:schemeClr val="accent1"/>
+          </a:effectRef>
+          <a:fontRef idx="minor">
+            <a:schemeClr val="lt1"/>
+          </a:fontRef>
+        </p:style>
+        <p:txBody>
+          <a:bodyPr rtlCol="0" anchor="ctr"/>
+          <a:lstStyle/>
+          <a:p>
+            <a:pPr algn="ctr"/>
+            <a:endParaRPr lang="en-US" dirty="0"/>
+          </a:p>
+        </p:txBody>
+      </p:sp>
+      <p:cxnSp>
+        <p:nvCxnSpPr>
+          <p:cNvPr id="21" name="Straight Arrow Connector 20">
+            <a:extLst>
+              <a:ext uri="{FF2B5EF4-FFF2-40B4-BE49-F238E27FC236}">
+                <a16:creationId xmlns:a16="http://schemas.microsoft.com/office/drawing/2014/main" id="{7FFAEEA1-9051-45F9-8545-3EB313EE0E4E}"/>
+              </a:ext>
+            </a:extLst>
+          </p:cNvPr>
+          <p:cNvCxnSpPr>
+            <a:cxnSpLocks/>
+          </p:cNvCxnSpPr>
+          <p:nvPr/>
+        </p:nvCxnSpPr>
+        <p:spPr>
+          <a:xfrm>
+            <a:off x="2042187" y="4922535"/>
+            <a:ext cx="400594" cy="0"/>
+          </a:xfrm>
+          <a:prstGeom prst="straightConnector1">
+            <a:avLst/>
+          </a:prstGeom>
+          <a:ln w="12700">
+            <a:tailEnd type="triangle"/>
+          </a:ln>
+        </p:spPr>
+        <p:style>
+          <a:lnRef idx="1">
+            <a:schemeClr val="accent1"/>
+          </a:lnRef>
+          <a:fillRef idx="0">
+            <a:schemeClr val="accent1"/>
+          </a:fillRef>
+          <a:effectRef idx="0">
+            <a:schemeClr val="accent1"/>
+          </a:effectRef>
+          <a:fontRef idx="minor">
+            <a:schemeClr val="tx1"/>
+          </a:fontRef>
+        </p:style>
+      </p:cxnSp>
+      <p:cxnSp>
+        <p:nvCxnSpPr>
+          <p:cNvPr id="22" name="Straight Arrow Connector 21">
+            <a:extLst>
+              <a:ext uri="{FF2B5EF4-FFF2-40B4-BE49-F238E27FC236}">
+                <a16:creationId xmlns:a16="http://schemas.microsoft.com/office/drawing/2014/main" id="{88FDE02B-F612-4D36-88C7-C9788B1B90B8}"/>
+              </a:ext>
+            </a:extLst>
+          </p:cNvPr>
+          <p:cNvCxnSpPr>
+            <a:cxnSpLocks/>
+          </p:cNvCxnSpPr>
+          <p:nvPr/>
+        </p:nvCxnSpPr>
+        <p:spPr>
+          <a:xfrm>
+            <a:off x="1343792" y="4917435"/>
+            <a:ext cx="400594" cy="0"/>
+          </a:xfrm>
+          <a:prstGeom prst="straightConnector1">
+            <a:avLst/>
+          </a:prstGeom>
+          <a:ln w="12700">
+            <a:tailEnd type="triangle"/>
+          </a:ln>
+        </p:spPr>
+        <p:style>
+          <a:lnRef idx="1">
+            <a:schemeClr val="accent1"/>
+          </a:lnRef>
+          <a:fillRef idx="0">
+            <a:schemeClr val="accent1"/>
+          </a:fillRef>
+          <a:effectRef idx="0">
+            <a:schemeClr val="accent1"/>
+          </a:effectRef>
+          <a:fontRef idx="minor">
+            <a:schemeClr val="tx1"/>
+          </a:fontRef>
+        </p:style>
+      </p:cxnSp>
+      <p:sp>
+        <p:nvSpPr>
+          <p:cNvPr id="23" name="Rectangle: Rounded Corners 22">
+            <a:extLst>
+              <a:ext uri="{FF2B5EF4-FFF2-40B4-BE49-F238E27FC236}">
+                <a16:creationId xmlns:a16="http://schemas.microsoft.com/office/drawing/2014/main" id="{22B4F99A-1B21-46D4-B401-E661E2E8F29F}"/>
+              </a:ext>
+            </a:extLst>
+          </p:cNvPr>
+          <p:cNvSpPr/>
+          <p:nvPr/>
+        </p:nvSpPr>
+        <p:spPr>
+          <a:xfrm>
+            <a:off x="6385305" y="4364558"/>
+            <a:ext cx="273678" cy="1141355"/>
+          </a:xfrm>
+          <a:prstGeom prst="roundRect">
+            <a:avLst/>
+          </a:prstGeom>
+          <a:solidFill>
+            <a:schemeClr val="accent5">
+              <a:lumMod val="40000"/>
+              <a:lumOff val="60000"/>
+            </a:schemeClr>
+          </a:solidFill>
+          <a:ln>
+            <a:solidFill>
+              <a:schemeClr val="accent5">
+                <a:lumMod val="75000"/>
+              </a:schemeClr>
+            </a:solidFill>
+          </a:ln>
+        </p:spPr>
+        <p:style>
+          <a:lnRef idx="2">
+            <a:schemeClr val="accent1">
+              <a:shade val="50000"/>
+            </a:schemeClr>
+          </a:lnRef>
+          <a:fillRef idx="1">
+            <a:schemeClr val="accent1"/>
+          </a:fillRef>
+          <a:effectRef idx="0">
+            <a:schemeClr val="accent1"/>
+          </a:effectRef>
+          <a:fontRef idx="minor">
+            <a:schemeClr val="lt1"/>
+          </a:fontRef>
+        </p:style>
+        <p:txBody>
+          <a:bodyPr rtlCol="0" anchor="ctr"/>
+          <a:lstStyle/>
+          <a:p>
+            <a:pPr algn="ctr"/>
+            <a:endParaRPr lang="en-US" dirty="0"/>
+          </a:p>
+        </p:txBody>
+      </p:sp>
+      <p:sp>
+        <p:nvSpPr>
+          <p:cNvPr id="24" name="Rectangle: Rounded Corners 23">
+            <a:extLst>
+              <a:ext uri="{FF2B5EF4-FFF2-40B4-BE49-F238E27FC236}">
+                <a16:creationId xmlns:a16="http://schemas.microsoft.com/office/drawing/2014/main" id="{F8728BC9-C8D8-49A9-9081-6ADB13DDB63C}"/>
+              </a:ext>
+            </a:extLst>
+          </p:cNvPr>
+          <p:cNvSpPr/>
+          <p:nvPr/>
+        </p:nvSpPr>
+        <p:spPr>
+          <a:xfrm>
+            <a:off x="5683690" y="4360182"/>
+            <a:ext cx="301228" cy="1138478"/>
+          </a:xfrm>
+          <a:prstGeom prst="roundRect">
+            <a:avLst/>
+          </a:prstGeom>
+          <a:solidFill>
+            <a:schemeClr val="accent2">
+              <a:lumMod val="60000"/>
+              <a:lumOff val="40000"/>
+            </a:schemeClr>
+          </a:solidFill>
+          <a:ln>
+            <a:solidFill>
+              <a:schemeClr val="accent2">
+                <a:lumMod val="75000"/>
+              </a:schemeClr>
+            </a:solidFill>
+          </a:ln>
+        </p:spPr>
+        <p:style>
+          <a:lnRef idx="2">
+            <a:schemeClr val="accent1">
+              <a:shade val="50000"/>
+            </a:schemeClr>
+          </a:lnRef>
+          <a:fillRef idx="1">
+            <a:schemeClr val="accent1"/>
+          </a:fillRef>
+          <a:effectRef idx="0">
+            <a:schemeClr val="accent1"/>
+          </a:effectRef>
+          <a:fontRef idx="minor">
+            <a:schemeClr val="lt1"/>
+          </a:fontRef>
+        </p:style>
+        <p:txBody>
+          <a:bodyPr rtlCol="0" anchor="ctr"/>
+          <a:lstStyle/>
+          <a:p>
+            <a:pPr algn="ctr"/>
+            <a:endParaRPr lang="en-US" dirty="0"/>
+          </a:p>
+        </p:txBody>
+      </p:sp>
+      <p:cxnSp>
+        <p:nvCxnSpPr>
+          <p:cNvPr id="25" name="Straight Arrow Connector 24">
+            <a:extLst>
+              <a:ext uri="{FF2B5EF4-FFF2-40B4-BE49-F238E27FC236}">
+                <a16:creationId xmlns:a16="http://schemas.microsoft.com/office/drawing/2014/main" id="{E0A2C8B1-6FD2-43FC-A3EF-5DBE5DC00A2F}"/>
+              </a:ext>
+            </a:extLst>
+          </p:cNvPr>
+          <p:cNvCxnSpPr>
+            <a:cxnSpLocks/>
+          </p:cNvCxnSpPr>
+          <p:nvPr/>
+        </p:nvCxnSpPr>
+        <p:spPr>
+          <a:xfrm>
+            <a:off x="5984258" y="4929766"/>
+            <a:ext cx="400594" cy="0"/>
+          </a:xfrm>
+          <a:prstGeom prst="straightConnector1">
+            <a:avLst/>
+          </a:prstGeom>
+          <a:ln w="12700">
+            <a:tailEnd type="triangle"/>
+          </a:ln>
+        </p:spPr>
+        <p:style>
+          <a:lnRef idx="1">
+            <a:schemeClr val="accent1"/>
+          </a:lnRef>
+          <a:fillRef idx="0">
+            <a:schemeClr val="accent1"/>
+          </a:fillRef>
+          <a:effectRef idx="0">
+            <a:schemeClr val="accent1"/>
+          </a:effectRef>
+          <a:fontRef idx="minor">
+            <a:schemeClr val="tx1"/>
+          </a:fontRef>
+        </p:style>
+      </p:cxnSp>
+      <p:sp>
+        <p:nvSpPr>
+          <p:cNvPr id="26" name="TextBox 25">
+            <a:extLst>
+              <a:ext uri="{FF2B5EF4-FFF2-40B4-BE49-F238E27FC236}">
+                <a16:creationId xmlns:a16="http://schemas.microsoft.com/office/drawing/2014/main" id="{10B7918C-1F3D-4BB3-A0AF-A65C2F2C448A}"/>
+              </a:ext>
+            </a:extLst>
+          </p:cNvPr>
+          <p:cNvSpPr txBox="1"/>
+          <p:nvPr/>
+        </p:nvSpPr>
+        <p:spPr>
+          <a:xfrm>
+            <a:off x="1981333" y="3172590"/>
+            <a:ext cx="1278271" cy="581205"/>
+          </a:xfrm>
+          <a:prstGeom prst="rect">
+            <a:avLst/>
+          </a:prstGeom>
+          <a:noFill/>
+        </p:spPr>
+        <p:txBody>
+          <a:bodyPr wrap="square" rtlCol="0">
+            <a:spAutoFit/>
+          </a:bodyPr>
+          <a:lstStyle/>
+          <a:p>
+            <a:pPr algn="ctr"/>
+            <a:r>
+              <a:rPr lang="en-US" b="1" dirty="0"/>
+              <a:t>cross-stitch unit</a:t>
+            </a:r>
+          </a:p>
+        </p:txBody>
+      </p:sp>
+      <p:cxnSp>
+        <p:nvCxnSpPr>
+          <p:cNvPr id="27" name="Straight Arrow Connector 26">
+            <a:extLst>
+              <a:ext uri="{FF2B5EF4-FFF2-40B4-BE49-F238E27FC236}">
+                <a16:creationId xmlns:a16="http://schemas.microsoft.com/office/drawing/2014/main" id="{47F742E2-1EDA-4E58-BA4B-D2B49FD595FB}"/>
+              </a:ext>
+            </a:extLst>
+          </p:cNvPr>
+          <p:cNvCxnSpPr>
+            <a:cxnSpLocks/>
+            <a:stCxn id="10" idx="3"/>
+          </p:cNvCxnSpPr>
+          <p:nvPr/>
+        </p:nvCxnSpPr>
+        <p:spPr>
+          <a:xfrm>
+            <a:off x="2716912" y="1813208"/>
+            <a:ext cx="1792195" cy="1776146"/>
+          </a:xfrm>
+          <a:prstGeom prst="straightConnector1">
+            <a:avLst/>
+          </a:prstGeom>
+          <a:ln w="28575">
+            <a:solidFill>
+              <a:srgbClr val="FF0000"/>
+            </a:solidFill>
+            <a:tailEnd type="triangle"/>
+          </a:ln>
+        </p:spPr>
+        <p:style>
+          <a:lnRef idx="1">
+            <a:schemeClr val="accent2"/>
+          </a:lnRef>
+          <a:fillRef idx="0">
+            <a:schemeClr val="accent2"/>
+          </a:fillRef>
+          <a:effectRef idx="0">
+            <a:schemeClr val="accent2"/>
+          </a:effectRef>
+          <a:fontRef idx="minor">
+            <a:schemeClr val="tx1"/>
+          </a:fontRef>
+        </p:style>
+      </p:cxnSp>
+      <p:cxnSp>
+        <p:nvCxnSpPr>
+          <p:cNvPr id="28" name="Straight Arrow Connector 27">
+            <a:extLst>
+              <a:ext uri="{FF2B5EF4-FFF2-40B4-BE49-F238E27FC236}">
+                <a16:creationId xmlns:a16="http://schemas.microsoft.com/office/drawing/2014/main" id="{07976CB4-8DB9-4196-A979-60B204A192C4}"/>
+              </a:ext>
+            </a:extLst>
+          </p:cNvPr>
+          <p:cNvCxnSpPr>
+            <a:cxnSpLocks/>
+          </p:cNvCxnSpPr>
+          <p:nvPr/>
+        </p:nvCxnSpPr>
+        <p:spPr>
+          <a:xfrm>
+            <a:off x="2716459" y="1812355"/>
+            <a:ext cx="844888" cy="1227698"/>
+          </a:xfrm>
+          <a:prstGeom prst="straightConnector1">
+            <a:avLst/>
+          </a:prstGeom>
+          <a:ln w="28575">
+            <a:solidFill>
+              <a:srgbClr val="FF0000"/>
+            </a:solidFill>
+            <a:tailEnd type="triangle"/>
+          </a:ln>
+        </p:spPr>
+        <p:style>
+          <a:lnRef idx="1">
+            <a:schemeClr val="accent2"/>
+          </a:lnRef>
+          <a:fillRef idx="0">
+            <a:schemeClr val="accent2"/>
+          </a:fillRef>
+          <a:effectRef idx="0">
+            <a:schemeClr val="accent2"/>
+          </a:effectRef>
+          <a:fontRef idx="minor">
+            <a:schemeClr val="tx1"/>
+          </a:fontRef>
+        </p:style>
+      </p:cxnSp>
+      <p:cxnSp>
+        <p:nvCxnSpPr>
+          <p:cNvPr id="29" name="Straight Arrow Connector 28">
+            <a:extLst>
+              <a:ext uri="{FF2B5EF4-FFF2-40B4-BE49-F238E27FC236}">
+                <a16:creationId xmlns:a16="http://schemas.microsoft.com/office/drawing/2014/main" id="{E2722998-83CF-466B-8516-19B169CE3474}"/>
+              </a:ext>
+            </a:extLst>
+          </p:cNvPr>
+          <p:cNvCxnSpPr>
+            <a:cxnSpLocks/>
+          </p:cNvCxnSpPr>
+          <p:nvPr/>
+        </p:nvCxnSpPr>
+        <p:spPr>
+          <a:xfrm flipV="1">
+            <a:off x="2720359" y="3701157"/>
+            <a:ext cx="840988" cy="1235560"/>
+          </a:xfrm>
+          <a:prstGeom prst="straightConnector1">
+            <a:avLst/>
+          </a:prstGeom>
+          <a:ln w="28575">
+            <a:solidFill>
+              <a:srgbClr val="D0309E"/>
+            </a:solidFill>
+            <a:tailEnd type="triangle"/>
+          </a:ln>
+        </p:spPr>
+        <p:style>
+          <a:lnRef idx="1">
+            <a:schemeClr val="accent4"/>
+          </a:lnRef>
+          <a:fillRef idx="0">
+            <a:schemeClr val="accent4"/>
+          </a:fillRef>
+          <a:effectRef idx="0">
+            <a:schemeClr val="accent4"/>
+          </a:effectRef>
+          <a:fontRef idx="minor">
+            <a:schemeClr val="tx1"/>
+          </a:fontRef>
+        </p:style>
+      </p:cxnSp>
+      <p:cxnSp>
+        <p:nvCxnSpPr>
+          <p:cNvPr id="30" name="Straight Arrow Connector 29">
+            <a:extLst>
+              <a:ext uri="{FF2B5EF4-FFF2-40B4-BE49-F238E27FC236}">
+                <a16:creationId xmlns:a16="http://schemas.microsoft.com/office/drawing/2014/main" id="{EC977ABF-C6CD-4169-B2B4-38884E03AD8D}"/>
+              </a:ext>
+            </a:extLst>
+          </p:cNvPr>
+          <p:cNvCxnSpPr>
+            <a:cxnSpLocks/>
+            <a:stCxn id="19" idx="3"/>
+          </p:cNvCxnSpPr>
+          <p:nvPr/>
+        </p:nvCxnSpPr>
+        <p:spPr>
+          <a:xfrm flipV="1">
+            <a:off x="2716912" y="3134947"/>
+            <a:ext cx="1743388" cy="1793058"/>
+          </a:xfrm>
+          <a:prstGeom prst="straightConnector1">
+            <a:avLst/>
+          </a:prstGeom>
+          <a:ln w="28575">
+            <a:solidFill>
+              <a:srgbClr val="D0309E"/>
+            </a:solidFill>
+            <a:tailEnd type="triangle"/>
+          </a:ln>
+        </p:spPr>
+        <p:style>
+          <a:lnRef idx="1">
+            <a:schemeClr val="accent4"/>
+          </a:lnRef>
+          <a:fillRef idx="0">
+            <a:schemeClr val="accent4"/>
+          </a:fillRef>
+          <a:effectRef idx="0">
+            <a:schemeClr val="accent4"/>
+          </a:effectRef>
+          <a:fontRef idx="minor">
+            <a:schemeClr val="tx1"/>
+          </a:fontRef>
+        </p:style>
+      </p:cxnSp>
+      <p:cxnSp>
+        <p:nvCxnSpPr>
+          <p:cNvPr id="31" name="Straight Arrow Connector 30">
+            <a:extLst>
+              <a:ext uri="{FF2B5EF4-FFF2-40B4-BE49-F238E27FC236}">
+                <a16:creationId xmlns:a16="http://schemas.microsoft.com/office/drawing/2014/main" id="{ECCF1409-3B47-41FC-B943-501BC8A3097F}"/>
+              </a:ext>
+            </a:extLst>
+          </p:cNvPr>
+          <p:cNvCxnSpPr>
+            <a:endCxn id="15" idx="1"/>
+          </p:cNvCxnSpPr>
+          <p:nvPr/>
+        </p:nvCxnSpPr>
+        <p:spPr>
+          <a:xfrm flipV="1">
+            <a:off x="5108773" y="1814623"/>
+            <a:ext cx="574917" cy="1225431"/>
+          </a:xfrm>
+          <a:prstGeom prst="straightConnector1">
+            <a:avLst/>
+          </a:prstGeom>
+          <a:ln w="28575">
+            <a:solidFill>
+              <a:srgbClr val="7030A0"/>
+            </a:solidFill>
+            <a:tailEnd type="triangle"/>
+          </a:ln>
+        </p:spPr>
+        <p:style>
+          <a:lnRef idx="1">
+            <a:schemeClr val="accent6"/>
+          </a:lnRef>
+          <a:fillRef idx="0">
+            <a:schemeClr val="accent6"/>
+          </a:fillRef>
+          <a:effectRef idx="0">
+            <a:schemeClr val="accent6"/>
+          </a:effectRef>
+          <a:fontRef idx="minor">
+            <a:schemeClr val="tx1"/>
+          </a:fontRef>
+        </p:style>
+      </p:cxnSp>
+      <p:cxnSp>
+        <p:nvCxnSpPr>
+          <p:cNvPr id="32" name="Straight Arrow Connector 31">
+            <a:extLst>
+              <a:ext uri="{FF2B5EF4-FFF2-40B4-BE49-F238E27FC236}">
+                <a16:creationId xmlns:a16="http://schemas.microsoft.com/office/drawing/2014/main" id="{57BFAA94-A435-45CA-9DE2-78A03332FFAE}"/>
+              </a:ext>
+            </a:extLst>
+          </p:cNvPr>
+          <p:cNvCxnSpPr>
+            <a:cxnSpLocks/>
+            <a:endCxn id="24" idx="1"/>
+          </p:cNvCxnSpPr>
+          <p:nvPr/>
+        </p:nvCxnSpPr>
+        <p:spPr>
+          <a:xfrm>
+            <a:off x="5108773" y="3741603"/>
+            <a:ext cx="574917" cy="1187818"/>
+          </a:xfrm>
+          <a:prstGeom prst="straightConnector1">
+            <a:avLst/>
+          </a:prstGeom>
+          <a:ln w="28575">
+            <a:solidFill>
+              <a:srgbClr val="7030A0"/>
+            </a:solidFill>
+            <a:tailEnd type="triangle"/>
+          </a:ln>
+        </p:spPr>
+        <p:style>
+          <a:lnRef idx="1">
+            <a:schemeClr val="accent6"/>
+          </a:lnRef>
+          <a:fillRef idx="0">
+            <a:schemeClr val="accent6"/>
+          </a:fillRef>
+          <a:effectRef idx="0">
+            <a:schemeClr val="accent6"/>
+          </a:effectRef>
+          <a:fontRef idx="minor">
+            <a:schemeClr val="tx1"/>
+          </a:fontRef>
+        </p:style>
+      </p:cxnSp>
+      <p:sp>
+        <p:nvSpPr>
+          <p:cNvPr id="33" name="TextBox 32">
+            <a:extLst>
+              <a:ext uri="{FF2B5EF4-FFF2-40B4-BE49-F238E27FC236}">
+                <a16:creationId xmlns:a16="http://schemas.microsoft.com/office/drawing/2014/main" id="{14963ECB-AAE3-40B9-8B85-6555408AD871}"/>
+              </a:ext>
+            </a:extLst>
+          </p:cNvPr>
+          <p:cNvSpPr txBox="1"/>
+          <p:nvPr/>
+        </p:nvSpPr>
+        <p:spPr>
+          <a:xfrm>
+            <a:off x="1566770" y="956935"/>
+            <a:ext cx="876237" cy="332117"/>
+          </a:xfrm>
+          <a:prstGeom prst="rect">
+            <a:avLst/>
+          </a:prstGeom>
+          <a:noFill/>
+        </p:spPr>
+        <p:txBody>
+          <a:bodyPr wrap="square" rtlCol="0">
+            <a:spAutoFit/>
+          </a:bodyPr>
+          <a:lstStyle/>
+          <a:p>
+            <a:r>
+              <a:rPr lang="en-US" dirty="0"/>
+              <a:t>Conv</a:t>
+            </a:r>
+          </a:p>
+        </p:txBody>
+      </p:sp>
+      <p:sp>
+        <p:nvSpPr>
+          <p:cNvPr id="34" name="TextBox 33">
+            <a:extLst>
+              <a:ext uri="{FF2B5EF4-FFF2-40B4-BE49-F238E27FC236}">
+                <a16:creationId xmlns:a16="http://schemas.microsoft.com/office/drawing/2014/main" id="{F66C7225-319D-48E1-A642-4A3B269B95FE}"/>
+              </a:ext>
+            </a:extLst>
+          </p:cNvPr>
+          <p:cNvSpPr txBox="1"/>
+          <p:nvPr/>
+        </p:nvSpPr>
+        <p:spPr>
+          <a:xfrm>
+            <a:off x="2238408" y="953437"/>
+            <a:ext cx="876237" cy="332117"/>
+          </a:xfrm>
+          <a:prstGeom prst="rect">
+            <a:avLst/>
+          </a:prstGeom>
+          <a:noFill/>
+        </p:spPr>
+        <p:txBody>
+          <a:bodyPr wrap="square" rtlCol="0">
+            <a:spAutoFit/>
+          </a:bodyPr>
+          <a:lstStyle/>
+          <a:p>
+            <a:r>
+              <a:rPr lang="en-US" dirty="0"/>
+              <a:t>ReLU</a:t>
+            </a:r>
+          </a:p>
+        </p:txBody>
+      </p:sp>
+      <p:sp>
+        <p:nvSpPr>
+          <p:cNvPr id="35" name="TextBox 34">
+            <a:extLst>
+              <a:ext uri="{FF2B5EF4-FFF2-40B4-BE49-F238E27FC236}">
+                <a16:creationId xmlns:a16="http://schemas.microsoft.com/office/drawing/2014/main" id="{05C23A0A-BC64-44D3-99B0-454346716D9A}"/>
+              </a:ext>
+            </a:extLst>
+          </p:cNvPr>
+          <p:cNvSpPr txBox="1"/>
+          <p:nvPr/>
+        </p:nvSpPr>
+        <p:spPr>
+          <a:xfrm>
+            <a:off x="1590785" y="5467104"/>
+            <a:ext cx="876237" cy="332117"/>
+          </a:xfrm>
+          <a:prstGeom prst="rect">
+            <a:avLst/>
+          </a:prstGeom>
+          <a:noFill/>
+        </p:spPr>
+        <p:txBody>
+          <a:bodyPr wrap="square" rtlCol="0">
+            <a:spAutoFit/>
+          </a:bodyPr>
+          <a:lstStyle/>
+          <a:p>
+            <a:r>
+              <a:rPr lang="en-US" dirty="0"/>
+              <a:t>Conv</a:t>
+            </a:r>
+          </a:p>
+        </p:txBody>
+      </p:sp>
+      <p:sp>
+        <p:nvSpPr>
+          <p:cNvPr id="36" name="TextBox 35">
+            <a:extLst>
+              <a:ext uri="{FF2B5EF4-FFF2-40B4-BE49-F238E27FC236}">
+                <a16:creationId xmlns:a16="http://schemas.microsoft.com/office/drawing/2014/main" id="{CE2623FF-6ABB-482F-B877-16160E0B96EA}"/>
+              </a:ext>
+            </a:extLst>
+          </p:cNvPr>
+          <p:cNvSpPr txBox="1"/>
+          <p:nvPr/>
+        </p:nvSpPr>
+        <p:spPr>
+          <a:xfrm>
+            <a:off x="2262666" y="5460088"/>
+            <a:ext cx="876237" cy="332117"/>
+          </a:xfrm>
+          <a:prstGeom prst="rect">
+            <a:avLst/>
+          </a:prstGeom>
+          <a:noFill/>
+        </p:spPr>
+        <p:txBody>
+          <a:bodyPr wrap="square" rtlCol="0">
+            <a:spAutoFit/>
+          </a:bodyPr>
+          <a:lstStyle/>
+          <a:p>
+            <a:r>
+              <a:rPr lang="en-US" dirty="0"/>
+              <a:t>ReLU</a:t>
+            </a:r>
+          </a:p>
+        </p:txBody>
+      </p:sp>
+      <p:sp>
+        <p:nvSpPr>
+          <p:cNvPr id="37" name="TextBox 36">
+            <a:extLst>
+              <a:ext uri="{FF2B5EF4-FFF2-40B4-BE49-F238E27FC236}">
+                <a16:creationId xmlns:a16="http://schemas.microsoft.com/office/drawing/2014/main" id="{34AB0869-C4F3-4D28-96A0-CC828EE909E4}"/>
+              </a:ext>
+            </a:extLst>
+          </p:cNvPr>
+          <p:cNvSpPr txBox="1"/>
+          <p:nvPr/>
+        </p:nvSpPr>
+        <p:spPr>
+          <a:xfrm>
+            <a:off x="5468189" y="953437"/>
+            <a:ext cx="876237" cy="332117"/>
+          </a:xfrm>
+          <a:prstGeom prst="rect">
+            <a:avLst/>
+          </a:prstGeom>
+          <a:noFill/>
+        </p:spPr>
+        <p:txBody>
+          <a:bodyPr wrap="square" rtlCol="0">
+            <a:spAutoFit/>
+          </a:bodyPr>
+          <a:lstStyle/>
+          <a:p>
+            <a:r>
+              <a:rPr lang="en-US" dirty="0"/>
+              <a:t>Conv</a:t>
+            </a:r>
+          </a:p>
+        </p:txBody>
+      </p:sp>
+      <p:sp>
+        <p:nvSpPr>
+          <p:cNvPr id="38" name="TextBox 37">
+            <a:extLst>
+              <a:ext uri="{FF2B5EF4-FFF2-40B4-BE49-F238E27FC236}">
+                <a16:creationId xmlns:a16="http://schemas.microsoft.com/office/drawing/2014/main" id="{A379F794-3459-40C5-9DD9-3108CFDF1D40}"/>
+              </a:ext>
+            </a:extLst>
+          </p:cNvPr>
+          <p:cNvSpPr txBox="1"/>
+          <p:nvPr/>
+        </p:nvSpPr>
+        <p:spPr>
+          <a:xfrm>
+            <a:off x="6171667" y="956644"/>
+            <a:ext cx="876237" cy="332117"/>
+          </a:xfrm>
+          <a:prstGeom prst="rect">
+            <a:avLst/>
+          </a:prstGeom>
+          <a:noFill/>
+        </p:spPr>
+        <p:txBody>
+          <a:bodyPr wrap="square" rtlCol="0">
+            <a:spAutoFit/>
+          </a:bodyPr>
+          <a:lstStyle/>
+          <a:p>
+            <a:r>
+              <a:rPr lang="en-US" dirty="0"/>
+              <a:t>ReLU</a:t>
+            </a:r>
+          </a:p>
+        </p:txBody>
+      </p:sp>
+      <p:sp>
+        <p:nvSpPr>
+          <p:cNvPr id="39" name="TextBox 38">
+            <a:extLst>
+              <a:ext uri="{FF2B5EF4-FFF2-40B4-BE49-F238E27FC236}">
+                <a16:creationId xmlns:a16="http://schemas.microsoft.com/office/drawing/2014/main" id="{FA5ED13D-00DA-480E-800A-1B7D666C7E35}"/>
+              </a:ext>
+            </a:extLst>
+          </p:cNvPr>
+          <p:cNvSpPr txBox="1"/>
+          <p:nvPr/>
+        </p:nvSpPr>
+        <p:spPr>
+          <a:xfrm>
+            <a:off x="5515758" y="5467104"/>
+            <a:ext cx="876237" cy="332117"/>
+          </a:xfrm>
+          <a:prstGeom prst="rect">
+            <a:avLst/>
+          </a:prstGeom>
+          <a:noFill/>
+        </p:spPr>
+        <p:txBody>
+          <a:bodyPr wrap="square" rtlCol="0">
+            <a:spAutoFit/>
+          </a:bodyPr>
+          <a:lstStyle/>
+          <a:p>
+            <a:r>
+              <a:rPr lang="en-US" dirty="0"/>
+              <a:t>Conv</a:t>
+            </a:r>
+          </a:p>
+        </p:txBody>
+      </p:sp>
+      <p:sp>
+        <p:nvSpPr>
+          <p:cNvPr id="40" name="TextBox 39">
+            <a:extLst>
+              <a:ext uri="{FF2B5EF4-FFF2-40B4-BE49-F238E27FC236}">
+                <a16:creationId xmlns:a16="http://schemas.microsoft.com/office/drawing/2014/main" id="{0994648C-8E5E-494D-AB19-5F75EEADD3EF}"/>
+              </a:ext>
+            </a:extLst>
+          </p:cNvPr>
+          <p:cNvSpPr txBox="1"/>
+          <p:nvPr/>
+        </p:nvSpPr>
+        <p:spPr>
+          <a:xfrm>
+            <a:off x="6184555" y="5458771"/>
+            <a:ext cx="876237" cy="332117"/>
+          </a:xfrm>
+          <a:prstGeom prst="rect">
+            <a:avLst/>
+          </a:prstGeom>
+          <a:noFill/>
+        </p:spPr>
+        <p:txBody>
+          <a:bodyPr wrap="square" rtlCol="0">
+            <a:spAutoFit/>
+          </a:bodyPr>
+          <a:lstStyle/>
+          <a:p>
+            <a:r>
+              <a:rPr lang="en-US" dirty="0"/>
+              <a:t>ReLU</a:t>
+            </a:r>
+          </a:p>
+        </p:txBody>
+      </p:sp>
+    </p:spTree>
+    <p:extLst>
+      <p:ext uri="{BB962C8B-B14F-4D97-AF65-F5344CB8AC3E}">
+        <p14:creationId xmlns:p14="http://schemas.microsoft.com/office/powerpoint/2010/main" val="762818231"/>
+      </p:ext>
+    </p:extLst>
+  </p:cSld>
+  <p:clrMapOvr>
+    <a:masterClrMapping/>
+  </p:clrMapOvr>
+</p:sld>
+</file>
+
 <file path=ppt/theme/theme1.xml><?xml version="1.0" encoding="utf-8"?>
 <a:theme xmlns:a="http://schemas.openxmlformats.org/drawingml/2006/main" name="Office Theme">
   <a:themeElements>

</xml_diff>

<commit_message>
first draft of patch generation
</commit_message>
<xml_diff>
--- a/Figures.pptx
+++ b/Figures.pptx
@@ -16001,7 +16001,7 @@
         </p:nvSpPr>
         <p:spPr>
           <a:xfrm>
-            <a:off x="1698368" y="2126062"/>
+            <a:off x="3703950" y="5558269"/>
             <a:ext cx="1010177" cy="319446"/>
           </a:xfrm>
           <a:prstGeom prst="rect">
@@ -16442,7 +16442,7 @@
         </p:nvSpPr>
         <p:spPr>
           <a:xfrm>
-            <a:off x="6337400" y="2782164"/>
+            <a:off x="6354329" y="2715484"/>
             <a:ext cx="450764" cy="369332"/>
           </a:xfrm>
           <a:prstGeom prst="rect">
@@ -17960,7 +17960,7 @@
         </p:nvSpPr>
         <p:spPr>
           <a:xfrm>
-            <a:off x="3749706" y="5573583"/>
+            <a:off x="2756475" y="5541855"/>
             <a:ext cx="862993" cy="319446"/>
           </a:xfrm>
           <a:prstGeom prst="rect">
@@ -17986,6 +17986,138 @@
           </a:p>
         </p:txBody>
       </p:sp>
+      <p:cxnSp>
+        <p:nvCxnSpPr>
+          <p:cNvPr id="3" name="Connector: Elbow 2">
+            <a:extLst>
+              <a:ext uri="{FF2B5EF4-FFF2-40B4-BE49-F238E27FC236}">
+                <a16:creationId xmlns:a16="http://schemas.microsoft.com/office/drawing/2014/main" id="{7E5F730B-8B71-4F21-871F-C7418A3213FF}"/>
+              </a:ext>
+            </a:extLst>
+          </p:cNvPr>
+          <p:cNvCxnSpPr>
+            <a:cxnSpLocks/>
+            <a:endCxn id="27" idx="0"/>
+          </p:cNvCxnSpPr>
+          <p:nvPr/>
+        </p:nvCxnSpPr>
+        <p:spPr>
+          <a:xfrm flipV="1">
+            <a:off x="1716814" y="2342116"/>
+            <a:ext cx="3482951" cy="424896"/>
+          </a:xfrm>
+          <a:prstGeom prst="bentConnector4">
+            <a:avLst>
+              <a:gd name="adj1" fmla="val 16797"/>
+              <a:gd name="adj2" fmla="val 153801"/>
+            </a:avLst>
+          </a:prstGeom>
+          <a:ln w="28575">
+            <a:solidFill>
+              <a:schemeClr val="tx1"/>
+            </a:solidFill>
+            <a:tailEnd type="triangle"/>
+          </a:ln>
+        </p:spPr>
+        <p:style>
+          <a:lnRef idx="1">
+            <a:schemeClr val="accent1"/>
+          </a:lnRef>
+          <a:fillRef idx="0">
+            <a:schemeClr val="accent1"/>
+          </a:fillRef>
+          <a:effectRef idx="0">
+            <a:schemeClr val="accent1"/>
+          </a:effectRef>
+          <a:fontRef idx="minor">
+            <a:schemeClr val="tx1"/>
+          </a:fontRef>
+        </p:style>
+      </p:cxnSp>
+      <p:cxnSp>
+        <p:nvCxnSpPr>
+          <p:cNvPr id="43" name="Connector: Elbow 42">
+            <a:extLst>
+              <a:ext uri="{FF2B5EF4-FFF2-40B4-BE49-F238E27FC236}">
+                <a16:creationId xmlns:a16="http://schemas.microsoft.com/office/drawing/2014/main" id="{58BE8BC0-B681-4D9F-8805-2931A613E370}"/>
+              </a:ext>
+            </a:extLst>
+          </p:cNvPr>
+          <p:cNvCxnSpPr>
+            <a:cxnSpLocks/>
+          </p:cNvCxnSpPr>
+          <p:nvPr/>
+        </p:nvCxnSpPr>
+        <p:spPr>
+          <a:xfrm rot="10800000" flipV="1">
+            <a:off x="1750539" y="2296356"/>
+            <a:ext cx="2974701" cy="611376"/>
+          </a:xfrm>
+          <a:prstGeom prst="bentConnector3">
+            <a:avLst>
+              <a:gd name="adj1" fmla="val 75874"/>
+            </a:avLst>
+          </a:prstGeom>
+          <a:ln w="28575">
+            <a:tailEnd type="triangle"/>
+          </a:ln>
+        </p:spPr>
+        <p:style>
+          <a:lnRef idx="1">
+            <a:schemeClr val="dk1"/>
+          </a:lnRef>
+          <a:fillRef idx="0">
+            <a:schemeClr val="dk1"/>
+          </a:fillRef>
+          <a:effectRef idx="0">
+            <a:schemeClr val="dk1"/>
+          </a:effectRef>
+          <a:fontRef idx="minor">
+            <a:schemeClr val="tx1"/>
+          </a:fontRef>
+        </p:style>
+      </p:cxnSp>
+      <p:cxnSp>
+        <p:nvCxnSpPr>
+          <p:cNvPr id="85" name="Straight Connector 84">
+            <a:extLst>
+              <a:ext uri="{FF2B5EF4-FFF2-40B4-BE49-F238E27FC236}">
+                <a16:creationId xmlns:a16="http://schemas.microsoft.com/office/drawing/2014/main" id="{C7D87520-152D-44E1-9F0A-6BA44F5EDCDC}"/>
+              </a:ext>
+            </a:extLst>
+          </p:cNvPr>
+          <p:cNvCxnSpPr/>
+          <p:nvPr/>
+        </p:nvCxnSpPr>
+        <p:spPr>
+          <a:xfrm>
+            <a:off x="4714127" y="2300305"/>
+            <a:ext cx="0" cy="938639"/>
+          </a:xfrm>
+          <a:prstGeom prst="line">
+            <a:avLst/>
+          </a:prstGeom>
+          <a:ln w="28575">
+            <a:solidFill>
+              <a:schemeClr val="tx1"/>
+            </a:solidFill>
+          </a:ln>
+        </p:spPr>
+        <p:style>
+          <a:lnRef idx="1">
+            <a:schemeClr val="accent1"/>
+          </a:lnRef>
+          <a:fillRef idx="0">
+            <a:schemeClr val="accent1"/>
+          </a:fillRef>
+          <a:effectRef idx="0">
+            <a:schemeClr val="accent1"/>
+          </a:effectRef>
+          <a:fontRef idx="minor">
+            <a:schemeClr val="tx1"/>
+          </a:fontRef>
+        </p:style>
+      </p:cxnSp>
     </p:spTree>
     <p:extLst>
       <p:ext uri="{BB962C8B-B14F-4D97-AF65-F5344CB8AC3E}">

</xml_diff>

<commit_message>
done with dual learning
</commit_message>
<xml_diff>
--- a/Figures.pptx
+++ b/Figures.pptx
@@ -11671,7 +11671,7 @@
         </p:nvSpPr>
         <p:spPr>
           <a:xfrm>
-            <a:off x="5813819" y="3573148"/>
+            <a:off x="3489770" y="3593853"/>
             <a:ext cx="1805762" cy="319446"/>
           </a:xfrm>
           <a:prstGeom prst="rect">
@@ -12144,9 +12144,9 @@
         <p:grpSpPr>
           <a:xfrm>
             <a:off x="2823823" y="1996420"/>
-            <a:ext cx="1926943" cy="1423462"/>
+            <a:ext cx="1681717" cy="1361907"/>
             <a:chOff x="1007963" y="2368948"/>
-            <a:chExt cx="1926943" cy="1423462"/>
+            <a:chExt cx="1681717" cy="1361907"/>
           </a:xfrm>
         </p:grpSpPr>
         <p:grpSp>
@@ -12726,7 +12726,7 @@
           <p:spPr>
             <a:xfrm>
               <a:off x="1703149" y="2368948"/>
-              <a:ext cx="502894" cy="369332"/>
+              <a:ext cx="502894" cy="307777"/>
             </a:xfrm>
             <a:prstGeom prst="rect">
               <a:avLst/>
@@ -12740,7 +12740,7 @@
             <a:lstStyle/>
             <a:p>
               <a:r>
-                <a:rPr lang="en-US" dirty="0"/>
+                <a:rPr lang="en-US" sz="1400" dirty="0"/>
                 <a:t>V1</a:t>
               </a:r>
             </a:p>
@@ -12760,8 +12760,8 @@
           </p:nvSpPr>
           <p:spPr>
             <a:xfrm>
-              <a:off x="1305051" y="2999378"/>
-              <a:ext cx="502894" cy="369332"/>
+              <a:off x="1015964" y="3149735"/>
+              <a:ext cx="502894" cy="307777"/>
             </a:xfrm>
             <a:prstGeom prst="rect">
               <a:avLst/>
@@ -12775,7 +12775,7 @@
             <a:lstStyle/>
             <a:p>
               <a:r>
-                <a:rPr lang="en-US" dirty="0"/>
+                <a:rPr lang="en-US" sz="1400" dirty="0"/>
                 <a:t>V2</a:t>
               </a:r>
             </a:p>
@@ -12795,8 +12795,8 @@
           </p:nvSpPr>
           <p:spPr>
             <a:xfrm>
-              <a:off x="2057412" y="2822581"/>
-              <a:ext cx="502894" cy="369332"/>
+              <a:off x="1850443" y="2719262"/>
+              <a:ext cx="502894" cy="307777"/>
             </a:xfrm>
             <a:prstGeom prst="rect">
               <a:avLst/>
@@ -12810,7 +12810,7 @@
             <a:lstStyle/>
             <a:p>
               <a:r>
-                <a:rPr lang="en-US" dirty="0"/>
+                <a:rPr lang="en-US" sz="1400" dirty="0"/>
                 <a:t>V3</a:t>
               </a:r>
             </a:p>
@@ -12831,7 +12831,7 @@
           <p:spPr>
             <a:xfrm>
               <a:off x="1703149" y="3423078"/>
-              <a:ext cx="502894" cy="369332"/>
+              <a:ext cx="502894" cy="307777"/>
             </a:xfrm>
             <a:prstGeom prst="rect">
               <a:avLst/>
@@ -12845,7 +12845,7 @@
             <a:lstStyle/>
             <a:p>
               <a:r>
-                <a:rPr lang="en-US" dirty="0"/>
+                <a:rPr lang="en-US" sz="1400" dirty="0"/>
                 <a:t>V4</a:t>
               </a:r>
             </a:p>
@@ -12865,8 +12865,8 @@
           </p:nvSpPr>
           <p:spPr>
             <a:xfrm>
-              <a:off x="2432012" y="3378092"/>
-              <a:ext cx="502894" cy="369332"/>
+              <a:off x="2186786" y="3207427"/>
+              <a:ext cx="502894" cy="307777"/>
             </a:xfrm>
             <a:prstGeom prst="rect">
               <a:avLst/>
@@ -12880,7 +12880,7 @@
             <a:lstStyle/>
             <a:p>
               <a:r>
-                <a:rPr lang="en-US" dirty="0"/>
+                <a:rPr lang="en-US" sz="1400" dirty="0"/>
                 <a:t>V5</a:t>
               </a:r>
             </a:p>
@@ -13497,8 +13497,8 @@
         </p:nvSpPr>
         <p:spPr>
           <a:xfrm>
-            <a:off x="3889757" y="4020837"/>
-            <a:ext cx="502894" cy="369332"/>
+            <a:off x="3783868" y="3917537"/>
+            <a:ext cx="502894" cy="307777"/>
           </a:xfrm>
           <a:prstGeom prst="rect">
             <a:avLst/>
@@ -13512,7 +13512,7 @@
           <a:lstStyle/>
           <a:p>
             <a:r>
-              <a:rPr lang="en-US" dirty="0"/>
+              <a:rPr lang="en-US" sz="1400" dirty="0"/>
               <a:t>V3</a:t>
             </a:r>
           </a:p>
@@ -13533,7 +13533,7 @@
         <p:spPr>
           <a:xfrm>
             <a:off x="3471473" y="4724499"/>
-            <a:ext cx="502894" cy="369332"/>
+            <a:ext cx="502894" cy="307777"/>
           </a:xfrm>
           <a:prstGeom prst="rect">
             <a:avLst/>
@@ -13547,7 +13547,7 @@
           <a:lstStyle/>
           <a:p>
             <a:r>
-              <a:rPr lang="en-US" dirty="0"/>
+              <a:rPr lang="en-US" sz="1400" dirty="0"/>
               <a:t>V4</a:t>
             </a:r>
           </a:p>
@@ -13567,8 +13567,8 @@
         </p:nvSpPr>
         <p:spPr>
           <a:xfrm>
-            <a:off x="4188169" y="4757296"/>
-            <a:ext cx="502894" cy="369332"/>
+            <a:off x="4002320" y="4760367"/>
+            <a:ext cx="502894" cy="307777"/>
           </a:xfrm>
           <a:prstGeom prst="rect">
             <a:avLst/>
@@ -13582,7 +13582,7 @@
           <a:lstStyle/>
           <a:p>
             <a:r>
-              <a:rPr lang="en-US" dirty="0"/>
+              <a:rPr lang="en-US" sz="1400" dirty="0"/>
               <a:t>V5</a:t>
             </a:r>
           </a:p>
@@ -14650,7 +14650,7 @@
         </p:nvSpPr>
         <p:spPr>
           <a:xfrm>
-            <a:off x="7559903" y="5019233"/>
+            <a:off x="7455264" y="5050257"/>
             <a:ext cx="1485900" cy="369332"/>
           </a:xfrm>
           <a:prstGeom prst="rect">
@@ -14954,6 +14954,402 @@
                   </a:solidFill>
                 </a:rPr>
                 <a:t>S</a:t>
+              </a:r>
+            </a:p>
+          </p:txBody>
+        </p:sp>
+      </p:grpSp>
+      <p:grpSp>
+        <p:nvGrpSpPr>
+          <p:cNvPr id="4" name="Group 3">
+            <a:extLst>
+              <a:ext uri="{FF2B5EF4-FFF2-40B4-BE49-F238E27FC236}">
+                <a16:creationId xmlns:a16="http://schemas.microsoft.com/office/drawing/2014/main" id="{2B7439CC-497C-4245-8F31-E6EC106A8D09}"/>
+              </a:ext>
+            </a:extLst>
+          </p:cNvPr>
+          <p:cNvGrpSpPr/>
+          <p:nvPr/>
+        </p:nvGrpSpPr>
+        <p:grpSpPr>
+          <a:xfrm>
+            <a:off x="5248398" y="2538765"/>
+            <a:ext cx="569857" cy="584697"/>
+            <a:chOff x="5251742" y="1103166"/>
+            <a:chExt cx="569857" cy="584697"/>
+          </a:xfrm>
+        </p:grpSpPr>
+        <p:sp>
+          <p:nvSpPr>
+            <p:cNvPr id="86" name="TextBox 85">
+              <a:extLst>
+                <a:ext uri="{FF2B5EF4-FFF2-40B4-BE49-F238E27FC236}">
+                  <a16:creationId xmlns:a16="http://schemas.microsoft.com/office/drawing/2014/main" id="{99227265-8F7C-45ED-9E2C-4C96932C8962}"/>
+                </a:ext>
+              </a:extLst>
+            </p:cNvPr>
+            <p:cNvSpPr txBox="1"/>
+            <p:nvPr/>
+          </p:nvSpPr>
+          <p:spPr>
+            <a:xfrm>
+              <a:off x="5251742" y="1103166"/>
+              <a:ext cx="385287" cy="523220"/>
+            </a:xfrm>
+            <a:prstGeom prst="rect">
+              <a:avLst/>
+            </a:prstGeom>
+            <a:noFill/>
+          </p:spPr>
+          <p:txBody>
+            <a:bodyPr wrap="square" rtlCol="0">
+              <a:spAutoFit/>
+            </a:bodyPr>
+            <a:lstStyle/>
+            <a:p>
+              <a:r>
+                <a:rPr lang="en-US" sz="2800" i="1" dirty="0">
+                  <a:solidFill>
+                    <a:srgbClr val="7030A0"/>
+                  </a:solidFill>
+                </a:rPr>
+                <a:t>U</a:t>
+              </a:r>
+            </a:p>
+          </p:txBody>
+        </p:sp>
+        <p:sp>
+          <p:nvSpPr>
+            <p:cNvPr id="87" name="TextBox 86">
+              <a:extLst>
+                <a:ext uri="{FF2B5EF4-FFF2-40B4-BE49-F238E27FC236}">
+                  <a16:creationId xmlns:a16="http://schemas.microsoft.com/office/drawing/2014/main" id="{3F2FDA8E-9F43-441F-822C-FB6A942EC207}"/>
+                </a:ext>
+              </a:extLst>
+            </p:cNvPr>
+            <p:cNvSpPr txBox="1"/>
+            <p:nvPr/>
+          </p:nvSpPr>
+          <p:spPr>
+            <a:xfrm>
+              <a:off x="5436312" y="1318531"/>
+              <a:ext cx="385287" cy="369332"/>
+            </a:xfrm>
+            <a:prstGeom prst="rect">
+              <a:avLst/>
+            </a:prstGeom>
+            <a:noFill/>
+          </p:spPr>
+          <p:txBody>
+            <a:bodyPr wrap="square" rtlCol="0">
+              <a:spAutoFit/>
+            </a:bodyPr>
+            <a:lstStyle/>
+            <a:p>
+              <a:r>
+                <a:rPr lang="en-US" i="1" dirty="0">
+                  <a:solidFill>
+                    <a:srgbClr val="7030A0"/>
+                  </a:solidFill>
+                </a:rPr>
+                <a:t>C</a:t>
+              </a:r>
+            </a:p>
+          </p:txBody>
+        </p:sp>
+      </p:grpSp>
+      <p:grpSp>
+        <p:nvGrpSpPr>
+          <p:cNvPr id="90" name="Group 89">
+            <a:extLst>
+              <a:ext uri="{FF2B5EF4-FFF2-40B4-BE49-F238E27FC236}">
+                <a16:creationId xmlns:a16="http://schemas.microsoft.com/office/drawing/2014/main" id="{F40ECD64-434A-4645-B0BA-44C167FFAE39}"/>
+              </a:ext>
+            </a:extLst>
+          </p:cNvPr>
+          <p:cNvGrpSpPr/>
+          <p:nvPr/>
+        </p:nvGrpSpPr>
+        <p:grpSpPr>
+          <a:xfrm>
+            <a:off x="5251742" y="4415972"/>
+            <a:ext cx="569857" cy="584697"/>
+            <a:chOff x="5251742" y="1103166"/>
+            <a:chExt cx="569857" cy="584697"/>
+          </a:xfrm>
+        </p:grpSpPr>
+        <p:sp>
+          <p:nvSpPr>
+            <p:cNvPr id="91" name="TextBox 90">
+              <a:extLst>
+                <a:ext uri="{FF2B5EF4-FFF2-40B4-BE49-F238E27FC236}">
+                  <a16:creationId xmlns:a16="http://schemas.microsoft.com/office/drawing/2014/main" id="{B7961FC1-D040-4C0F-9C6D-5ED1FA868097}"/>
+                </a:ext>
+              </a:extLst>
+            </p:cNvPr>
+            <p:cNvSpPr txBox="1"/>
+            <p:nvPr/>
+          </p:nvSpPr>
+          <p:spPr>
+            <a:xfrm>
+              <a:off x="5251742" y="1103166"/>
+              <a:ext cx="385287" cy="523220"/>
+            </a:xfrm>
+            <a:prstGeom prst="rect">
+              <a:avLst/>
+            </a:prstGeom>
+            <a:noFill/>
+          </p:spPr>
+          <p:txBody>
+            <a:bodyPr wrap="square" rtlCol="0">
+              <a:spAutoFit/>
+            </a:bodyPr>
+            <a:lstStyle/>
+            <a:p>
+              <a:r>
+                <a:rPr lang="en-US" sz="2800" i="1" dirty="0">
+                  <a:solidFill>
+                    <a:srgbClr val="7030A0"/>
+                  </a:solidFill>
+                </a:rPr>
+                <a:t>U</a:t>
+              </a:r>
+            </a:p>
+          </p:txBody>
+        </p:sp>
+        <p:sp>
+          <p:nvSpPr>
+            <p:cNvPr id="92" name="TextBox 91">
+              <a:extLst>
+                <a:ext uri="{FF2B5EF4-FFF2-40B4-BE49-F238E27FC236}">
+                  <a16:creationId xmlns:a16="http://schemas.microsoft.com/office/drawing/2014/main" id="{6A51200C-E6B2-4424-B33D-8A5264395FC3}"/>
+                </a:ext>
+              </a:extLst>
+            </p:cNvPr>
+            <p:cNvSpPr txBox="1"/>
+            <p:nvPr/>
+          </p:nvSpPr>
+          <p:spPr>
+            <a:xfrm>
+              <a:off x="5436312" y="1318531"/>
+              <a:ext cx="385287" cy="369332"/>
+            </a:xfrm>
+            <a:prstGeom prst="rect">
+              <a:avLst/>
+            </a:prstGeom>
+            <a:noFill/>
+          </p:spPr>
+          <p:txBody>
+            <a:bodyPr wrap="square" rtlCol="0">
+              <a:spAutoFit/>
+            </a:bodyPr>
+            <a:lstStyle/>
+            <a:p>
+              <a:r>
+                <a:rPr lang="en-US" i="1" dirty="0">
+                  <a:solidFill>
+                    <a:srgbClr val="7030A0"/>
+                  </a:solidFill>
+                </a:rPr>
+                <a:t>T</a:t>
+              </a:r>
+            </a:p>
+          </p:txBody>
+        </p:sp>
+      </p:grpSp>
+      <p:grpSp>
+        <p:nvGrpSpPr>
+          <p:cNvPr id="93" name="Group 92">
+            <a:extLst>
+              <a:ext uri="{FF2B5EF4-FFF2-40B4-BE49-F238E27FC236}">
+                <a16:creationId xmlns:a16="http://schemas.microsoft.com/office/drawing/2014/main" id="{6D1CD882-191A-4F62-BDCA-77F2F93DE1E5}"/>
+              </a:ext>
+            </a:extLst>
+          </p:cNvPr>
+          <p:cNvGrpSpPr/>
+          <p:nvPr/>
+        </p:nvGrpSpPr>
+        <p:grpSpPr>
+          <a:xfrm>
+            <a:off x="5893947" y="3235216"/>
+            <a:ext cx="530098" cy="589422"/>
+            <a:chOff x="5251742" y="1103166"/>
+            <a:chExt cx="530098" cy="589422"/>
+          </a:xfrm>
+        </p:grpSpPr>
+        <p:sp>
+          <p:nvSpPr>
+            <p:cNvPr id="94" name="TextBox 93">
+              <a:extLst>
+                <a:ext uri="{FF2B5EF4-FFF2-40B4-BE49-F238E27FC236}">
+                  <a16:creationId xmlns:a16="http://schemas.microsoft.com/office/drawing/2014/main" id="{96EC687F-371E-424C-8039-C2BBA54F47FB}"/>
+                </a:ext>
+              </a:extLst>
+            </p:cNvPr>
+            <p:cNvSpPr txBox="1"/>
+            <p:nvPr/>
+          </p:nvSpPr>
+          <p:spPr>
+            <a:xfrm>
+              <a:off x="5251742" y="1103166"/>
+              <a:ext cx="385287" cy="523220"/>
+            </a:xfrm>
+            <a:prstGeom prst="rect">
+              <a:avLst/>
+            </a:prstGeom>
+            <a:noFill/>
+          </p:spPr>
+          <p:txBody>
+            <a:bodyPr wrap="square" rtlCol="0">
+              <a:spAutoFit/>
+            </a:bodyPr>
+            <a:lstStyle/>
+            <a:p>
+              <a:r>
+                <a:rPr lang="en-US" sz="2800" i="1" dirty="0">
+                  <a:solidFill>
+                    <a:srgbClr val="7030A0"/>
+                  </a:solidFill>
+                </a:rPr>
+                <a:t>x</a:t>
+              </a:r>
+            </a:p>
+          </p:txBody>
+        </p:sp>
+        <p:sp>
+          <p:nvSpPr>
+            <p:cNvPr id="98" name="TextBox 97">
+              <a:extLst>
+                <a:ext uri="{FF2B5EF4-FFF2-40B4-BE49-F238E27FC236}">
+                  <a16:creationId xmlns:a16="http://schemas.microsoft.com/office/drawing/2014/main" id="{0182F0A7-2697-4EC7-A557-A94BEA0FC976}"/>
+                </a:ext>
+              </a:extLst>
+            </p:cNvPr>
+            <p:cNvSpPr txBox="1"/>
+            <p:nvPr/>
+          </p:nvSpPr>
+          <p:spPr>
+            <a:xfrm>
+              <a:off x="5396553" y="1323256"/>
+              <a:ext cx="385287" cy="369332"/>
+            </a:xfrm>
+            <a:prstGeom prst="rect">
+              <a:avLst/>
+            </a:prstGeom>
+            <a:noFill/>
+          </p:spPr>
+          <p:txBody>
+            <a:bodyPr wrap="square" rtlCol="0">
+              <a:spAutoFit/>
+            </a:bodyPr>
+            <a:lstStyle/>
+            <a:p>
+              <a:r>
+                <a:rPr lang="en-US" i="1" dirty="0">
+                  <a:solidFill>
+                    <a:srgbClr val="7030A0"/>
+                  </a:solidFill>
+                </a:rPr>
+                <a:t>C</a:t>
+              </a:r>
+            </a:p>
+          </p:txBody>
+        </p:sp>
+      </p:grpSp>
+      <p:grpSp>
+        <p:nvGrpSpPr>
+          <p:cNvPr id="99" name="Group 98">
+            <a:extLst>
+              <a:ext uri="{FF2B5EF4-FFF2-40B4-BE49-F238E27FC236}">
+                <a16:creationId xmlns:a16="http://schemas.microsoft.com/office/drawing/2014/main" id="{556DC1DA-D2CA-48F8-9DEF-A7BC619A58DF}"/>
+              </a:ext>
+            </a:extLst>
+          </p:cNvPr>
+          <p:cNvGrpSpPr/>
+          <p:nvPr/>
+        </p:nvGrpSpPr>
+        <p:grpSpPr>
+          <a:xfrm>
+            <a:off x="5896141" y="3610442"/>
+            <a:ext cx="530098" cy="589422"/>
+            <a:chOff x="5251742" y="1103166"/>
+            <a:chExt cx="530098" cy="589422"/>
+          </a:xfrm>
+        </p:grpSpPr>
+        <p:sp>
+          <p:nvSpPr>
+            <p:cNvPr id="100" name="TextBox 99">
+              <a:extLst>
+                <a:ext uri="{FF2B5EF4-FFF2-40B4-BE49-F238E27FC236}">
+                  <a16:creationId xmlns:a16="http://schemas.microsoft.com/office/drawing/2014/main" id="{CCE46D4C-61A7-4857-B677-AB5C170B879B}"/>
+                </a:ext>
+              </a:extLst>
+            </p:cNvPr>
+            <p:cNvSpPr txBox="1"/>
+            <p:nvPr/>
+          </p:nvSpPr>
+          <p:spPr>
+            <a:xfrm>
+              <a:off x="5251742" y="1103166"/>
+              <a:ext cx="385287" cy="523220"/>
+            </a:xfrm>
+            <a:prstGeom prst="rect">
+              <a:avLst/>
+            </a:prstGeom>
+            <a:noFill/>
+          </p:spPr>
+          <p:txBody>
+            <a:bodyPr wrap="square" rtlCol="0">
+              <a:spAutoFit/>
+            </a:bodyPr>
+            <a:lstStyle/>
+            <a:p>
+              <a:r>
+                <a:rPr lang="en-US" sz="2800" i="1" dirty="0">
+                  <a:solidFill>
+                    <a:srgbClr val="7030A0"/>
+                  </a:solidFill>
+                </a:rPr>
+                <a:t>x</a:t>
+              </a:r>
+            </a:p>
+          </p:txBody>
+        </p:sp>
+        <p:sp>
+          <p:nvSpPr>
+            <p:cNvPr id="101" name="TextBox 100">
+              <a:extLst>
+                <a:ext uri="{FF2B5EF4-FFF2-40B4-BE49-F238E27FC236}">
+                  <a16:creationId xmlns:a16="http://schemas.microsoft.com/office/drawing/2014/main" id="{1E98CDCA-C78B-4595-ACF4-AEF2C602B65B}"/>
+                </a:ext>
+              </a:extLst>
+            </p:cNvPr>
+            <p:cNvSpPr txBox="1"/>
+            <p:nvPr/>
+          </p:nvSpPr>
+          <p:spPr>
+            <a:xfrm>
+              <a:off x="5396553" y="1323256"/>
+              <a:ext cx="385287" cy="369332"/>
+            </a:xfrm>
+            <a:prstGeom prst="rect">
+              <a:avLst/>
+            </a:prstGeom>
+            <a:noFill/>
+          </p:spPr>
+          <p:txBody>
+            <a:bodyPr wrap="square" rtlCol="0">
+              <a:spAutoFit/>
+            </a:bodyPr>
+            <a:lstStyle/>
+            <a:p>
+              <a:r>
+                <a:rPr lang="en-US" i="1" dirty="0">
+                  <a:solidFill>
+                    <a:srgbClr val="7030A0"/>
+                  </a:solidFill>
+                </a:rPr>
+                <a:t>T</a:t>
               </a:r>
             </a:p>
           </p:txBody>

</xml_diff>

<commit_message>
done with step 3 beam search
</commit_message>
<xml_diff>
--- a/Figures.pptx
+++ b/Figures.pptx
@@ -16840,7 +16840,7 @@
         </p:nvSpPr>
         <p:spPr>
           <a:xfrm>
-            <a:off x="6354329" y="2715484"/>
+            <a:off x="6389927" y="2798456"/>
             <a:ext cx="450764" cy="369332"/>
           </a:xfrm>
           <a:prstGeom prst="rect">
@@ -17225,7 +17225,7 @@
         </p:nvSpPr>
         <p:spPr>
           <a:xfrm>
-            <a:off x="1611344" y="4122964"/>
+            <a:off x="1657966" y="4133247"/>
             <a:ext cx="450764" cy="369332"/>
           </a:xfrm>
           <a:prstGeom prst="rect">
@@ -18516,6 +18516,288 @@
           </a:fontRef>
         </p:style>
       </p:cxnSp>
+      <p:grpSp>
+        <p:nvGrpSpPr>
+          <p:cNvPr id="80" name="Group 79">
+            <a:extLst>
+              <a:ext uri="{FF2B5EF4-FFF2-40B4-BE49-F238E27FC236}">
+                <a16:creationId xmlns:a16="http://schemas.microsoft.com/office/drawing/2014/main" id="{6623BD1C-F227-4CD8-956C-7EFE97BBA014}"/>
+              </a:ext>
+            </a:extLst>
+          </p:cNvPr>
+          <p:cNvGrpSpPr/>
+          <p:nvPr/>
+        </p:nvGrpSpPr>
+        <p:grpSpPr>
+          <a:xfrm>
+            <a:off x="6917027" y="2563217"/>
+            <a:ext cx="599169" cy="607202"/>
+            <a:chOff x="6313108" y="4870309"/>
+            <a:chExt cx="599169" cy="607202"/>
+          </a:xfrm>
+        </p:grpSpPr>
+        <p:sp>
+          <p:nvSpPr>
+            <p:cNvPr id="81" name="TextBox 80">
+              <a:extLst>
+                <a:ext uri="{FF2B5EF4-FFF2-40B4-BE49-F238E27FC236}">
+                  <a16:creationId xmlns:a16="http://schemas.microsoft.com/office/drawing/2014/main" id="{C2DA8EC8-1E6C-4DCD-8DB3-289AEFFDA005}"/>
+                </a:ext>
+              </a:extLst>
+            </p:cNvPr>
+            <p:cNvSpPr txBox="1"/>
+            <p:nvPr/>
+          </p:nvSpPr>
+          <p:spPr>
+            <a:xfrm>
+              <a:off x="6313108" y="4924017"/>
+              <a:ext cx="385287" cy="523220"/>
+            </a:xfrm>
+            <a:prstGeom prst="rect">
+              <a:avLst/>
+            </a:prstGeom>
+            <a:noFill/>
+          </p:spPr>
+          <p:txBody>
+            <a:bodyPr wrap="square" rtlCol="0">
+              <a:spAutoFit/>
+            </a:bodyPr>
+            <a:lstStyle/>
+            <a:p>
+              <a:r>
+                <a:rPr lang="en-US" sz="2800" i="1" dirty="0">
+                  <a:solidFill>
+                    <a:schemeClr val="accent6">
+                      <a:lumMod val="75000"/>
+                    </a:schemeClr>
+                  </a:solidFill>
+                </a:rPr>
+                <a:t>T</a:t>
+              </a:r>
+            </a:p>
+          </p:txBody>
+        </p:sp>
+        <p:sp>
+          <p:nvSpPr>
+            <p:cNvPr id="82" name="TextBox 81">
+              <a:extLst>
+                <a:ext uri="{FF2B5EF4-FFF2-40B4-BE49-F238E27FC236}">
+                  <a16:creationId xmlns:a16="http://schemas.microsoft.com/office/drawing/2014/main" id="{05DDE0C0-9473-4E14-BAA3-236A0F4D98DF}"/>
+                </a:ext>
+              </a:extLst>
+            </p:cNvPr>
+            <p:cNvSpPr txBox="1"/>
+            <p:nvPr/>
+          </p:nvSpPr>
+          <p:spPr>
+            <a:xfrm>
+              <a:off x="6437764" y="5108179"/>
+              <a:ext cx="385287" cy="369332"/>
+            </a:xfrm>
+            <a:prstGeom prst="rect">
+              <a:avLst/>
+            </a:prstGeom>
+            <a:noFill/>
+          </p:spPr>
+          <p:txBody>
+            <a:bodyPr wrap="square" rtlCol="0">
+              <a:spAutoFit/>
+            </a:bodyPr>
+            <a:lstStyle/>
+            <a:p>
+              <a:r>
+                <a:rPr lang="en-US" i="1" dirty="0">
+                  <a:solidFill>
+                    <a:schemeClr val="accent6">
+                      <a:lumMod val="75000"/>
+                    </a:schemeClr>
+                  </a:solidFill>
+                </a:rPr>
+                <a:t>1</a:t>
+              </a:r>
+            </a:p>
+          </p:txBody>
+        </p:sp>
+        <p:sp>
+          <p:nvSpPr>
+            <p:cNvPr id="84" name="TextBox 83">
+              <a:extLst>
+                <a:ext uri="{FF2B5EF4-FFF2-40B4-BE49-F238E27FC236}">
+                  <a16:creationId xmlns:a16="http://schemas.microsoft.com/office/drawing/2014/main" id="{3CA119DC-1475-4FBA-8447-54F2ECBF9E99}"/>
+                </a:ext>
+              </a:extLst>
+            </p:cNvPr>
+            <p:cNvSpPr txBox="1"/>
+            <p:nvPr/>
+          </p:nvSpPr>
+          <p:spPr>
+            <a:xfrm>
+              <a:off x="6526990" y="4870309"/>
+              <a:ext cx="385287" cy="338554"/>
+            </a:xfrm>
+            <a:prstGeom prst="rect">
+              <a:avLst/>
+            </a:prstGeom>
+            <a:noFill/>
+          </p:spPr>
+          <p:txBody>
+            <a:bodyPr wrap="square" rtlCol="0">
+              <a:spAutoFit/>
+            </a:bodyPr>
+            <a:lstStyle/>
+            <a:p>
+              <a:endParaRPr lang="en-US" sz="1600" i="1" dirty="0">
+                <a:solidFill>
+                  <a:schemeClr val="accent6">
+                    <a:lumMod val="75000"/>
+                  </a:schemeClr>
+                </a:solidFill>
+              </a:endParaRPr>
+            </a:p>
+          </p:txBody>
+        </p:sp>
+      </p:grpSp>
+      <p:grpSp>
+        <p:nvGrpSpPr>
+          <p:cNvPr id="86" name="Group 85">
+            <a:extLst>
+              <a:ext uri="{FF2B5EF4-FFF2-40B4-BE49-F238E27FC236}">
+                <a16:creationId xmlns:a16="http://schemas.microsoft.com/office/drawing/2014/main" id="{EB9E5CFE-63C4-407B-8A56-677C7D5B90E2}"/>
+              </a:ext>
+            </a:extLst>
+          </p:cNvPr>
+          <p:cNvGrpSpPr/>
+          <p:nvPr/>
+        </p:nvGrpSpPr>
+        <p:grpSpPr>
+          <a:xfrm>
+            <a:off x="6971468" y="3935193"/>
+            <a:ext cx="599169" cy="607202"/>
+            <a:chOff x="6313108" y="4870309"/>
+            <a:chExt cx="599169" cy="607202"/>
+          </a:xfrm>
+        </p:grpSpPr>
+        <p:sp>
+          <p:nvSpPr>
+            <p:cNvPr id="87" name="TextBox 86">
+              <a:extLst>
+                <a:ext uri="{FF2B5EF4-FFF2-40B4-BE49-F238E27FC236}">
+                  <a16:creationId xmlns:a16="http://schemas.microsoft.com/office/drawing/2014/main" id="{66963ABE-B0F0-4859-89BB-3F96DCC0A7F2}"/>
+                </a:ext>
+              </a:extLst>
+            </p:cNvPr>
+            <p:cNvSpPr txBox="1"/>
+            <p:nvPr/>
+          </p:nvSpPr>
+          <p:spPr>
+            <a:xfrm>
+              <a:off x="6313108" y="4924017"/>
+              <a:ext cx="385287" cy="523220"/>
+            </a:xfrm>
+            <a:prstGeom prst="rect">
+              <a:avLst/>
+            </a:prstGeom>
+            <a:noFill/>
+          </p:spPr>
+          <p:txBody>
+            <a:bodyPr wrap="square" rtlCol="0">
+              <a:spAutoFit/>
+            </a:bodyPr>
+            <a:lstStyle/>
+            <a:p>
+              <a:r>
+                <a:rPr lang="en-US" sz="2800" i="1" dirty="0">
+                  <a:solidFill>
+                    <a:schemeClr val="accent6">
+                      <a:lumMod val="75000"/>
+                    </a:schemeClr>
+                  </a:solidFill>
+                </a:rPr>
+                <a:t>T</a:t>
+              </a:r>
+            </a:p>
+          </p:txBody>
+        </p:sp>
+        <p:sp>
+          <p:nvSpPr>
+            <p:cNvPr id="88" name="TextBox 87">
+              <a:extLst>
+                <a:ext uri="{FF2B5EF4-FFF2-40B4-BE49-F238E27FC236}">
+                  <a16:creationId xmlns:a16="http://schemas.microsoft.com/office/drawing/2014/main" id="{F34DBE78-B110-493B-96A0-BB7FE0241094}"/>
+                </a:ext>
+              </a:extLst>
+            </p:cNvPr>
+            <p:cNvSpPr txBox="1"/>
+            <p:nvPr/>
+          </p:nvSpPr>
+          <p:spPr>
+            <a:xfrm>
+              <a:off x="6437764" y="5108179"/>
+              <a:ext cx="385287" cy="369332"/>
+            </a:xfrm>
+            <a:prstGeom prst="rect">
+              <a:avLst/>
+            </a:prstGeom>
+            <a:noFill/>
+          </p:spPr>
+          <p:txBody>
+            <a:bodyPr wrap="square" rtlCol="0">
+              <a:spAutoFit/>
+            </a:bodyPr>
+            <a:lstStyle/>
+            <a:p>
+              <a:r>
+                <a:rPr lang="en-US" i="1" dirty="0">
+                  <a:solidFill>
+                    <a:schemeClr val="accent6">
+                      <a:lumMod val="75000"/>
+                    </a:schemeClr>
+                  </a:solidFill>
+                </a:rPr>
+                <a:t>2</a:t>
+              </a:r>
+            </a:p>
+          </p:txBody>
+        </p:sp>
+        <p:sp>
+          <p:nvSpPr>
+            <p:cNvPr id="91" name="TextBox 90">
+              <a:extLst>
+                <a:ext uri="{FF2B5EF4-FFF2-40B4-BE49-F238E27FC236}">
+                  <a16:creationId xmlns:a16="http://schemas.microsoft.com/office/drawing/2014/main" id="{CA83C556-1B18-400B-8537-242DBEB10D0D}"/>
+                </a:ext>
+              </a:extLst>
+            </p:cNvPr>
+            <p:cNvSpPr txBox="1"/>
+            <p:nvPr/>
+          </p:nvSpPr>
+          <p:spPr>
+            <a:xfrm>
+              <a:off x="6526990" y="4870309"/>
+              <a:ext cx="385287" cy="338554"/>
+            </a:xfrm>
+            <a:prstGeom prst="rect">
+              <a:avLst/>
+            </a:prstGeom>
+            <a:noFill/>
+          </p:spPr>
+          <p:txBody>
+            <a:bodyPr wrap="square" rtlCol="0">
+              <a:spAutoFit/>
+            </a:bodyPr>
+            <a:lstStyle/>
+            <a:p>
+              <a:endParaRPr lang="en-US" sz="1600" i="1" dirty="0">
+                <a:solidFill>
+                  <a:schemeClr val="accent6">
+                    <a:lumMod val="75000"/>
+                  </a:schemeClr>
+                </a:solidFill>
+              </a:endParaRPr>
+            </a:p>
+          </p:txBody>
+        </p:sp>
+      </p:grpSp>
     </p:spTree>
     <p:extLst>
       <p:ext uri="{BB962C8B-B14F-4D97-AF65-F5344CB8AC3E}">

</xml_diff>

<commit_message>
fixing Figure 5 up to cross-stitch unit
</commit_message>
<xml_diff>
--- a/Figures.pptx
+++ b/Figures.pptx
@@ -214,7 +214,7 @@
           <a:p>
             <a:fld id="{75754C70-6453-4EC1-893C-AA2644B807D6}" type="datetimeFigureOut">
               <a:rPr lang="en-US" smtClean="0"/>
-              <a:t>3/3/2022</a:t>
+              <a:t>3/4/2022</a:t>
             </a:fld>
             <a:endParaRPr lang="en-US" dirty="0"/>
           </a:p>
@@ -628,7 +628,7 @@
           <a:p>
             <a:fld id="{FF5E1AB6-45CD-421A-B6C0-E4D4EAFC2CDC}" type="datetimeFigureOut">
               <a:rPr lang="en-US" smtClean="0"/>
-              <a:t>3/3/2022</a:t>
+              <a:t>3/4/2022</a:t>
             </a:fld>
             <a:endParaRPr lang="en-US" dirty="0"/>
           </a:p>
@@ -826,7 +826,7 @@
           <a:p>
             <a:fld id="{FF5E1AB6-45CD-421A-B6C0-E4D4EAFC2CDC}" type="datetimeFigureOut">
               <a:rPr lang="en-US" smtClean="0"/>
-              <a:t>3/3/2022</a:t>
+              <a:t>3/4/2022</a:t>
             </a:fld>
             <a:endParaRPr lang="en-US" dirty="0"/>
           </a:p>
@@ -1034,7 +1034,7 @@
           <a:p>
             <a:fld id="{FF5E1AB6-45CD-421A-B6C0-E4D4EAFC2CDC}" type="datetimeFigureOut">
               <a:rPr lang="en-US" smtClean="0"/>
-              <a:t>3/3/2022</a:t>
+              <a:t>3/4/2022</a:t>
             </a:fld>
             <a:endParaRPr lang="en-US" dirty="0"/>
           </a:p>
@@ -1232,7 +1232,7 @@
           <a:p>
             <a:fld id="{FF5E1AB6-45CD-421A-B6C0-E4D4EAFC2CDC}" type="datetimeFigureOut">
               <a:rPr lang="en-US" smtClean="0"/>
-              <a:t>3/3/2022</a:t>
+              <a:t>3/4/2022</a:t>
             </a:fld>
             <a:endParaRPr lang="en-US" dirty="0"/>
           </a:p>
@@ -1507,7 +1507,7 @@
           <a:p>
             <a:fld id="{FF5E1AB6-45CD-421A-B6C0-E4D4EAFC2CDC}" type="datetimeFigureOut">
               <a:rPr lang="en-US" smtClean="0"/>
-              <a:t>3/3/2022</a:t>
+              <a:t>3/4/2022</a:t>
             </a:fld>
             <a:endParaRPr lang="en-US" dirty="0"/>
           </a:p>
@@ -1772,7 +1772,7 @@
           <a:p>
             <a:fld id="{FF5E1AB6-45CD-421A-B6C0-E4D4EAFC2CDC}" type="datetimeFigureOut">
               <a:rPr lang="en-US" smtClean="0"/>
-              <a:t>3/3/2022</a:t>
+              <a:t>3/4/2022</a:t>
             </a:fld>
             <a:endParaRPr lang="en-US" dirty="0"/>
           </a:p>
@@ -2184,7 +2184,7 @@
           <a:p>
             <a:fld id="{FF5E1AB6-45CD-421A-B6C0-E4D4EAFC2CDC}" type="datetimeFigureOut">
               <a:rPr lang="en-US" smtClean="0"/>
-              <a:t>3/3/2022</a:t>
+              <a:t>3/4/2022</a:t>
             </a:fld>
             <a:endParaRPr lang="en-US" dirty="0"/>
           </a:p>
@@ -2325,7 +2325,7 @@
           <a:p>
             <a:fld id="{FF5E1AB6-45CD-421A-B6C0-E4D4EAFC2CDC}" type="datetimeFigureOut">
               <a:rPr lang="en-US" smtClean="0"/>
-              <a:t>3/3/2022</a:t>
+              <a:t>3/4/2022</a:t>
             </a:fld>
             <a:endParaRPr lang="en-US" dirty="0"/>
           </a:p>
@@ -2438,7 +2438,7 @@
           <a:p>
             <a:fld id="{FF5E1AB6-45CD-421A-B6C0-E4D4EAFC2CDC}" type="datetimeFigureOut">
               <a:rPr lang="en-US" smtClean="0"/>
-              <a:t>3/3/2022</a:t>
+              <a:t>3/4/2022</a:t>
             </a:fld>
             <a:endParaRPr lang="en-US" dirty="0"/>
           </a:p>
@@ -2749,7 +2749,7 @@
           <a:p>
             <a:fld id="{FF5E1AB6-45CD-421A-B6C0-E4D4EAFC2CDC}" type="datetimeFigureOut">
               <a:rPr lang="en-US" smtClean="0"/>
-              <a:t>3/3/2022</a:t>
+              <a:t>3/4/2022</a:t>
             </a:fld>
             <a:endParaRPr lang="en-US" dirty="0"/>
           </a:p>
@@ -3037,7 +3037,7 @@
           <a:p>
             <a:fld id="{FF5E1AB6-45CD-421A-B6C0-E4D4EAFC2CDC}" type="datetimeFigureOut">
               <a:rPr lang="en-US" smtClean="0"/>
-              <a:t>3/3/2022</a:t>
+              <a:t>3/4/2022</a:t>
             </a:fld>
             <a:endParaRPr lang="en-US" dirty="0"/>
           </a:p>
@@ -3278,7 +3278,7 @@
           <a:p>
             <a:fld id="{FF5E1AB6-45CD-421A-B6C0-E4D4EAFC2CDC}" type="datetimeFigureOut">
               <a:rPr lang="en-US" smtClean="0"/>
-              <a:t>3/3/2022</a:t>
+              <a:t>3/4/2022</a:t>
             </a:fld>
             <a:endParaRPr lang="en-US" dirty="0"/>
           </a:p>
@@ -15359,6 +15359,202 @@
           </p:txBody>
         </p:sp>
       </p:grpSp>
+      <p:sp>
+        <p:nvSpPr>
+          <p:cNvPr id="5" name="Rectangle 4">
+            <a:extLst>
+              <a:ext uri="{FF2B5EF4-FFF2-40B4-BE49-F238E27FC236}">
+                <a16:creationId xmlns:a16="http://schemas.microsoft.com/office/drawing/2014/main" id="{2B5E0F9A-1E33-45B3-A9D4-71DD3115FFAA}"/>
+              </a:ext>
+            </a:extLst>
+          </p:cNvPr>
+          <p:cNvSpPr/>
+          <p:nvPr/>
+        </p:nvSpPr>
+        <p:spPr>
+          <a:xfrm>
+            <a:off x="4820968" y="2100994"/>
+            <a:ext cx="2208934" cy="1345567"/>
+          </a:xfrm>
+          <a:prstGeom prst="rect">
+            <a:avLst/>
+          </a:prstGeom>
+          <a:noFill/>
+          <a:ln w="12700">
+            <a:prstDash val="dash"/>
+          </a:ln>
+        </p:spPr>
+        <p:style>
+          <a:lnRef idx="2">
+            <a:schemeClr val="accent1">
+              <a:shade val="50000"/>
+            </a:schemeClr>
+          </a:lnRef>
+          <a:fillRef idx="1">
+            <a:schemeClr val="accent1"/>
+          </a:fillRef>
+          <a:effectRef idx="0">
+            <a:schemeClr val="accent1"/>
+          </a:effectRef>
+          <a:fontRef idx="minor">
+            <a:schemeClr val="lt1"/>
+          </a:fontRef>
+        </p:style>
+        <p:txBody>
+          <a:bodyPr rtlCol="0" anchor="ctr"/>
+          <a:lstStyle/>
+          <a:p>
+            <a:pPr algn="ctr"/>
+            <a:endParaRPr lang="en-US" dirty="0">
+              <a:ln>
+                <a:solidFill>
+                  <a:schemeClr val="tx1"/>
+                </a:solidFill>
+                <a:prstDash val="dash"/>
+              </a:ln>
+              <a:noFill/>
+            </a:endParaRPr>
+          </a:p>
+        </p:txBody>
+      </p:sp>
+      <p:sp>
+        <p:nvSpPr>
+          <p:cNvPr id="102" name="Rectangle 101">
+            <a:extLst>
+              <a:ext uri="{FF2B5EF4-FFF2-40B4-BE49-F238E27FC236}">
+                <a16:creationId xmlns:a16="http://schemas.microsoft.com/office/drawing/2014/main" id="{2704B107-3D11-49DE-8991-4E0B645D5C36}"/>
+              </a:ext>
+            </a:extLst>
+          </p:cNvPr>
+          <p:cNvSpPr/>
+          <p:nvPr/>
+        </p:nvSpPr>
+        <p:spPr>
+          <a:xfrm>
+            <a:off x="4816719" y="4015544"/>
+            <a:ext cx="2208934" cy="1345567"/>
+          </a:xfrm>
+          <a:prstGeom prst="rect">
+            <a:avLst/>
+          </a:prstGeom>
+          <a:noFill/>
+          <a:ln w="12700">
+            <a:prstDash val="dash"/>
+          </a:ln>
+        </p:spPr>
+        <p:style>
+          <a:lnRef idx="2">
+            <a:schemeClr val="accent1">
+              <a:shade val="50000"/>
+            </a:schemeClr>
+          </a:lnRef>
+          <a:fillRef idx="1">
+            <a:schemeClr val="accent1"/>
+          </a:fillRef>
+          <a:effectRef idx="0">
+            <a:schemeClr val="accent1"/>
+          </a:effectRef>
+          <a:fontRef idx="minor">
+            <a:schemeClr val="lt1"/>
+          </a:fontRef>
+        </p:style>
+        <p:txBody>
+          <a:bodyPr rtlCol="0" anchor="ctr"/>
+          <a:lstStyle/>
+          <a:p>
+            <a:pPr algn="ctr"/>
+            <a:endParaRPr lang="en-US" dirty="0">
+              <a:ln>
+                <a:solidFill>
+                  <a:schemeClr val="tx1"/>
+                </a:solidFill>
+                <a:prstDash val="dash"/>
+              </a:ln>
+              <a:noFill/>
+            </a:endParaRPr>
+          </a:p>
+        </p:txBody>
+      </p:sp>
+      <p:sp>
+        <p:nvSpPr>
+          <p:cNvPr id="127" name="TextBox 126">
+            <a:extLst>
+              <a:ext uri="{FF2B5EF4-FFF2-40B4-BE49-F238E27FC236}">
+                <a16:creationId xmlns:a16="http://schemas.microsoft.com/office/drawing/2014/main" id="{C4DCA4D9-351A-42E9-8C88-9884843D5463}"/>
+              </a:ext>
+            </a:extLst>
+          </p:cNvPr>
+          <p:cNvSpPr txBox="1"/>
+          <p:nvPr/>
+        </p:nvSpPr>
+        <p:spPr>
+          <a:xfrm>
+            <a:off x="6577233" y="3424121"/>
+            <a:ext cx="528510" cy="319446"/>
+          </a:xfrm>
+          <a:prstGeom prst="rect">
+            <a:avLst/>
+          </a:prstGeom>
+          <a:noFill/>
+        </p:spPr>
+        <p:txBody>
+          <a:bodyPr wrap="square" rtlCol="0">
+            <a:spAutoFit/>
+          </a:bodyPr>
+          <a:lstStyle/>
+          <a:p>
+            <a:pPr algn="ctr">
+              <a:lnSpc>
+                <a:spcPct val="80000"/>
+              </a:lnSpc>
+            </a:pPr>
+            <a:r>
+              <a:rPr lang="en-US" b="1" dirty="0"/>
+              <a:t>CCL</a:t>
+            </a:r>
+          </a:p>
+        </p:txBody>
+      </p:sp>
+      <p:sp>
+        <p:nvSpPr>
+          <p:cNvPr id="130" name="TextBox 129">
+            <a:extLst>
+              <a:ext uri="{FF2B5EF4-FFF2-40B4-BE49-F238E27FC236}">
+                <a16:creationId xmlns:a16="http://schemas.microsoft.com/office/drawing/2014/main" id="{8AE3B94E-56A6-4A3C-A9C9-1058323CFC6A}"/>
+              </a:ext>
+            </a:extLst>
+          </p:cNvPr>
+          <p:cNvSpPr txBox="1"/>
+          <p:nvPr/>
+        </p:nvSpPr>
+        <p:spPr>
+          <a:xfrm>
+            <a:off x="6557730" y="3764082"/>
+            <a:ext cx="528510" cy="319446"/>
+          </a:xfrm>
+          <a:prstGeom prst="rect">
+            <a:avLst/>
+          </a:prstGeom>
+          <a:noFill/>
+        </p:spPr>
+        <p:txBody>
+          <a:bodyPr wrap="square" rtlCol="0">
+            <a:spAutoFit/>
+          </a:bodyPr>
+          <a:lstStyle/>
+          <a:p>
+            <a:pPr algn="ctr">
+              <a:lnSpc>
+                <a:spcPct val="80000"/>
+              </a:lnSpc>
+            </a:pPr>
+            <a:r>
+              <a:rPr lang="en-US" b="1" dirty="0"/>
+              <a:t>CTL</a:t>
+            </a:r>
+          </a:p>
+        </p:txBody>
+      </p:sp>
     </p:spTree>
     <p:extLst>
       <p:ext uri="{BB962C8B-B14F-4D97-AF65-F5344CB8AC3E}">

</xml_diff>

<commit_message>
new overview with new figures
</commit_message>
<xml_diff>
--- a/Figures.pptx
+++ b/Figures.pptx
@@ -214,7 +214,7 @@
           <a:p>
             <a:fld id="{75754C70-6453-4EC1-893C-AA2644B807D6}" type="datetimeFigureOut">
               <a:rPr lang="en-US" smtClean="0"/>
-              <a:t>3/4/2022</a:t>
+              <a:t>7/20/2022</a:t>
             </a:fld>
             <a:endParaRPr lang="en-US" dirty="0"/>
           </a:p>
@@ -628,7 +628,7 @@
           <a:p>
             <a:fld id="{FF5E1AB6-45CD-421A-B6C0-E4D4EAFC2CDC}" type="datetimeFigureOut">
               <a:rPr lang="en-US" smtClean="0"/>
-              <a:t>3/4/2022</a:t>
+              <a:t>7/20/2022</a:t>
             </a:fld>
             <a:endParaRPr lang="en-US" dirty="0"/>
           </a:p>
@@ -826,7 +826,7 @@
           <a:p>
             <a:fld id="{FF5E1AB6-45CD-421A-B6C0-E4D4EAFC2CDC}" type="datetimeFigureOut">
               <a:rPr lang="en-US" smtClean="0"/>
-              <a:t>3/4/2022</a:t>
+              <a:t>7/20/2022</a:t>
             </a:fld>
             <a:endParaRPr lang="en-US" dirty="0"/>
           </a:p>
@@ -1034,7 +1034,7 @@
           <a:p>
             <a:fld id="{FF5E1AB6-45CD-421A-B6C0-E4D4EAFC2CDC}" type="datetimeFigureOut">
               <a:rPr lang="en-US" smtClean="0"/>
-              <a:t>3/4/2022</a:t>
+              <a:t>7/20/2022</a:t>
             </a:fld>
             <a:endParaRPr lang="en-US" dirty="0"/>
           </a:p>
@@ -1232,7 +1232,7 @@
           <a:p>
             <a:fld id="{FF5E1AB6-45CD-421A-B6C0-E4D4EAFC2CDC}" type="datetimeFigureOut">
               <a:rPr lang="en-US" smtClean="0"/>
-              <a:t>3/4/2022</a:t>
+              <a:t>7/20/2022</a:t>
             </a:fld>
             <a:endParaRPr lang="en-US" dirty="0"/>
           </a:p>
@@ -1507,7 +1507,7 @@
           <a:p>
             <a:fld id="{FF5E1AB6-45CD-421A-B6C0-E4D4EAFC2CDC}" type="datetimeFigureOut">
               <a:rPr lang="en-US" smtClean="0"/>
-              <a:t>3/4/2022</a:t>
+              <a:t>7/20/2022</a:t>
             </a:fld>
             <a:endParaRPr lang="en-US" dirty="0"/>
           </a:p>
@@ -1772,7 +1772,7 @@
           <a:p>
             <a:fld id="{FF5E1AB6-45CD-421A-B6C0-E4D4EAFC2CDC}" type="datetimeFigureOut">
               <a:rPr lang="en-US" smtClean="0"/>
-              <a:t>3/4/2022</a:t>
+              <a:t>7/20/2022</a:t>
             </a:fld>
             <a:endParaRPr lang="en-US" dirty="0"/>
           </a:p>
@@ -2184,7 +2184,7 @@
           <a:p>
             <a:fld id="{FF5E1AB6-45CD-421A-B6C0-E4D4EAFC2CDC}" type="datetimeFigureOut">
               <a:rPr lang="en-US" smtClean="0"/>
-              <a:t>3/4/2022</a:t>
+              <a:t>7/20/2022</a:t>
             </a:fld>
             <a:endParaRPr lang="en-US" dirty="0"/>
           </a:p>
@@ -2325,7 +2325,7 @@
           <a:p>
             <a:fld id="{FF5E1AB6-45CD-421A-B6C0-E4D4EAFC2CDC}" type="datetimeFigureOut">
               <a:rPr lang="en-US" smtClean="0"/>
-              <a:t>3/4/2022</a:t>
+              <a:t>7/20/2022</a:t>
             </a:fld>
             <a:endParaRPr lang="en-US" dirty="0"/>
           </a:p>
@@ -2438,7 +2438,7 @@
           <a:p>
             <a:fld id="{FF5E1AB6-45CD-421A-B6C0-E4D4EAFC2CDC}" type="datetimeFigureOut">
               <a:rPr lang="en-US" smtClean="0"/>
-              <a:t>3/4/2022</a:t>
+              <a:t>7/20/2022</a:t>
             </a:fld>
             <a:endParaRPr lang="en-US" dirty="0"/>
           </a:p>
@@ -2749,7 +2749,7 @@
           <a:p>
             <a:fld id="{FF5E1AB6-45CD-421A-B6C0-E4D4EAFC2CDC}" type="datetimeFigureOut">
               <a:rPr lang="en-US" smtClean="0"/>
-              <a:t>3/4/2022</a:t>
+              <a:t>7/20/2022</a:t>
             </a:fld>
             <a:endParaRPr lang="en-US" dirty="0"/>
           </a:p>
@@ -3037,7 +3037,7 @@
           <a:p>
             <a:fld id="{FF5E1AB6-45CD-421A-B6C0-E4D4EAFC2CDC}" type="datetimeFigureOut">
               <a:rPr lang="en-US" smtClean="0"/>
-              <a:t>3/4/2022</a:t>
+              <a:t>7/20/2022</a:t>
             </a:fld>
             <a:endParaRPr lang="en-US" dirty="0"/>
           </a:p>
@@ -3278,7 +3278,7 @@
           <a:p>
             <a:fld id="{FF5E1AB6-45CD-421A-B6C0-E4D4EAFC2CDC}" type="datetimeFigureOut">
               <a:rPr lang="en-US" smtClean="0"/>
-              <a:t>3/4/2022</a:t>
+              <a:t>7/20/2022</a:t>
             </a:fld>
             <a:endParaRPr lang="en-US" dirty="0"/>
           </a:p>
@@ -30993,7 +30993,7 @@
           <a:lstStyle/>
           <a:p>
             <a:r>
-              <a:rPr lang="en-US" dirty="0"/>
+              <a:rPr lang="en-US" b="1" i="1" dirty="0"/>
               <a:t>Buggy subtree</a:t>
             </a:r>
           </a:p>
@@ -32208,7 +32208,7 @@
         </p:nvSpPr>
         <p:spPr>
           <a:xfrm>
-            <a:off x="3095627" y="1640355"/>
+            <a:off x="2950653" y="1893360"/>
             <a:ext cx="550168" cy="369332"/>
           </a:xfrm>
           <a:prstGeom prst="rect">
@@ -32223,7 +32223,7 @@
           <a:lstStyle/>
           <a:p>
             <a:r>
-              <a:rPr lang="en-US" dirty="0"/>
+              <a:rPr lang="en-US" b="1" i="1" dirty="0"/>
               <a:t>AST</a:t>
             </a:r>
           </a:p>
@@ -32747,8 +32747,9 @@
           </a:bodyPr>
           <a:lstStyle/>
           <a:p>
+            <a:pPr algn="ctr"/>
             <a:r>
-              <a:rPr lang="en-US" dirty="0"/>
+              <a:rPr lang="en-US" b="1" i="1" dirty="0"/>
               <a:t>Fixed AST</a:t>
             </a:r>
           </a:p>
@@ -33229,7 +33230,7 @@
           <a:lstStyle/>
           <a:p>
             <a:r>
-              <a:rPr lang="en-US" dirty="0"/>
+              <a:rPr lang="en-US" b="1" i="1" dirty="0"/>
               <a:t>Fixed subtree</a:t>
             </a:r>
           </a:p>
@@ -34479,6 +34480,41 @@
           </p:txBody>
         </p:sp>
       </p:grpSp>
+      <p:sp>
+        <p:nvSpPr>
+          <p:cNvPr id="92" name="TextBox 91">
+            <a:extLst>
+              <a:ext uri="{FF2B5EF4-FFF2-40B4-BE49-F238E27FC236}">
+                <a16:creationId xmlns:a16="http://schemas.microsoft.com/office/drawing/2014/main" id="{D08A1456-8C22-FD33-EA4A-ADB6C78529F4}"/>
+              </a:ext>
+            </a:extLst>
+          </p:cNvPr>
+          <p:cNvSpPr txBox="1"/>
+          <p:nvPr/>
+        </p:nvSpPr>
+        <p:spPr>
+          <a:xfrm>
+            <a:off x="2870187" y="1630116"/>
+            <a:ext cx="796945" cy="369332"/>
+          </a:xfrm>
+          <a:prstGeom prst="rect">
+            <a:avLst/>
+          </a:prstGeom>
+          <a:noFill/>
+        </p:spPr>
+        <p:txBody>
+          <a:bodyPr wrap="square" rtlCol="0">
+            <a:spAutoFit/>
+          </a:bodyPr>
+          <a:lstStyle/>
+          <a:p>
+            <a:r>
+              <a:rPr lang="en-US" b="1" i="1" dirty="0"/>
+              <a:t>Buggy</a:t>
+            </a:r>
+          </a:p>
+        </p:txBody>
+      </p:sp>
     </p:spTree>
     <p:extLst>
       <p:ext uri="{BB962C8B-B14F-4D97-AF65-F5344CB8AC3E}">
@@ -34818,7 +34854,7 @@
           <a:lstStyle/>
           <a:p>
             <a:r>
-              <a:rPr lang="en-US" dirty="0"/>
+              <a:rPr lang="en-US" b="1" i="1" dirty="0"/>
               <a:t>Buggy subtree</a:t>
             </a:r>
           </a:p>
@@ -35341,41 +35377,6 @@
           </a:fontRef>
         </p:style>
       </p:cxnSp>
-      <p:sp>
-        <p:nvSpPr>
-          <p:cNvPr id="39" name="TextBox 38">
-            <a:extLst>
-              <a:ext uri="{FF2B5EF4-FFF2-40B4-BE49-F238E27FC236}">
-                <a16:creationId xmlns:a16="http://schemas.microsoft.com/office/drawing/2014/main" id="{DFF9EEFC-8DFB-4D04-BF39-56044C2D8B85}"/>
-              </a:ext>
-            </a:extLst>
-          </p:cNvPr>
-          <p:cNvSpPr txBox="1"/>
-          <p:nvPr/>
-        </p:nvSpPr>
-        <p:spPr>
-          <a:xfrm>
-            <a:off x="3669148" y="2166492"/>
-            <a:ext cx="1299257" cy="369332"/>
-          </a:xfrm>
-          <a:prstGeom prst="rect">
-            <a:avLst/>
-          </a:prstGeom>
-          <a:noFill/>
-        </p:spPr>
-        <p:txBody>
-          <a:bodyPr wrap="square" rtlCol="0">
-            <a:spAutoFit/>
-          </a:bodyPr>
-          <a:lstStyle/>
-          <a:p>
-            <a:r>
-              <a:rPr lang="en-US" dirty="0"/>
-              <a:t>AST</a:t>
-            </a:r>
-          </a:p>
-        </p:txBody>
-      </p:sp>
       <p:grpSp>
         <p:nvGrpSpPr>
           <p:cNvPr id="54" name="Group 53">
@@ -36014,7 +36015,7 @@
           <a:lstStyle/>
           <a:p>
             <a:r>
-              <a:rPr lang="en-US" dirty="0"/>
+              <a:rPr lang="en-US" b="1" i="1" dirty="0"/>
               <a:t>Fixed subtree</a:t>
             </a:r>
           </a:p>
@@ -36680,12 +36681,53 @@
           </a:p>
         </p:txBody>
       </p:sp>
+      <p:cxnSp>
+        <p:nvCxnSpPr>
+          <p:cNvPr id="72" name="Straight Arrow Connector 71">
+            <a:extLst>
+              <a:ext uri="{FF2B5EF4-FFF2-40B4-BE49-F238E27FC236}">
+                <a16:creationId xmlns:a16="http://schemas.microsoft.com/office/drawing/2014/main" id="{8FA94F06-6391-4DF0-9171-142960DFD580}"/>
+              </a:ext>
+            </a:extLst>
+          </p:cNvPr>
+          <p:cNvCxnSpPr>
+            <a:cxnSpLocks/>
+          </p:cNvCxnSpPr>
+          <p:nvPr/>
+        </p:nvCxnSpPr>
+        <p:spPr>
+          <a:xfrm flipV="1">
+            <a:off x="8247554" y="3054346"/>
+            <a:ext cx="0" cy="641166"/>
+          </a:xfrm>
+          <a:prstGeom prst="straightConnector1">
+            <a:avLst/>
+          </a:prstGeom>
+          <a:ln w="25400">
+            <a:tailEnd type="triangle"/>
+          </a:ln>
+        </p:spPr>
+        <p:style>
+          <a:lnRef idx="1">
+            <a:schemeClr val="accent1"/>
+          </a:lnRef>
+          <a:fillRef idx="0">
+            <a:schemeClr val="accent1"/>
+          </a:fillRef>
+          <a:effectRef idx="0">
+            <a:schemeClr val="accent1"/>
+          </a:effectRef>
+          <a:fontRef idx="minor">
+            <a:schemeClr val="tx1"/>
+          </a:fontRef>
+        </p:style>
+      </p:cxnSp>
       <p:sp>
         <p:nvSpPr>
-          <p:cNvPr id="71" name="Rectangle: Rounded Corners 70">
-            <a:extLst>
-              <a:ext uri="{FF2B5EF4-FFF2-40B4-BE49-F238E27FC236}">
-                <a16:creationId xmlns:a16="http://schemas.microsoft.com/office/drawing/2014/main" id="{3A8B981C-4F7B-40A6-97A3-2A364A7E7E6A}"/>
+          <p:cNvPr id="60" name="Rectangle: Rounded Corners 59">
+            <a:extLst>
+              <a:ext uri="{FF2B5EF4-FFF2-40B4-BE49-F238E27FC236}">
+                <a16:creationId xmlns:a16="http://schemas.microsoft.com/office/drawing/2014/main" id="{B517782D-D81F-78A1-0D90-BEE09FF83D59}"/>
               </a:ext>
             </a:extLst>
           </p:cNvPr>
@@ -36694,8 +36736,8 @@
         </p:nvSpPr>
         <p:spPr>
           <a:xfrm>
-            <a:off x="2301156" y="2819930"/>
-            <a:ext cx="1074087" cy="875582"/>
+            <a:off x="2282161" y="2803323"/>
+            <a:ext cx="1112824" cy="875582"/>
           </a:xfrm>
           <a:prstGeom prst="roundRect">
             <a:avLst/>
@@ -36746,47 +36788,76 @@
           </a:p>
         </p:txBody>
       </p:sp>
-      <p:cxnSp>
-        <p:nvCxnSpPr>
-          <p:cNvPr id="72" name="Straight Arrow Connector 71">
-            <a:extLst>
-              <a:ext uri="{FF2B5EF4-FFF2-40B4-BE49-F238E27FC236}">
-                <a16:creationId xmlns:a16="http://schemas.microsoft.com/office/drawing/2014/main" id="{8FA94F06-6391-4DF0-9171-142960DFD580}"/>
-              </a:ext>
-            </a:extLst>
-          </p:cNvPr>
-          <p:cNvCxnSpPr>
-            <a:cxnSpLocks/>
-          </p:cNvCxnSpPr>
+      <p:sp>
+        <p:nvSpPr>
+          <p:cNvPr id="61" name="TextBox 60">
+            <a:extLst>
+              <a:ext uri="{FF2B5EF4-FFF2-40B4-BE49-F238E27FC236}">
+                <a16:creationId xmlns:a16="http://schemas.microsoft.com/office/drawing/2014/main" id="{AC42BDA2-D07E-D29E-BF63-85B6AC9B6A04}"/>
+              </a:ext>
+            </a:extLst>
+          </p:cNvPr>
+          <p:cNvSpPr txBox="1"/>
           <p:nvPr/>
-        </p:nvCxnSpPr>
+        </p:nvSpPr>
         <p:spPr>
-          <a:xfrm flipV="1">
-            <a:off x="8247554" y="3054346"/>
-            <a:ext cx="0" cy="641166"/>
-          </a:xfrm>
-          <a:prstGeom prst="straightConnector1">
+          <a:xfrm>
+            <a:off x="3336824" y="2189945"/>
+            <a:ext cx="796945" cy="369332"/>
+          </a:xfrm>
+          <a:prstGeom prst="rect">
             <a:avLst/>
           </a:prstGeom>
-          <a:ln w="25400">
-            <a:tailEnd type="triangle"/>
-          </a:ln>
+          <a:noFill/>
         </p:spPr>
-        <p:style>
-          <a:lnRef idx="1">
-            <a:schemeClr val="accent1"/>
-          </a:lnRef>
-          <a:fillRef idx="0">
-            <a:schemeClr val="accent1"/>
-          </a:fillRef>
-          <a:effectRef idx="0">
-            <a:schemeClr val="accent1"/>
-          </a:effectRef>
-          <a:fontRef idx="minor">
-            <a:schemeClr val="tx1"/>
-          </a:fontRef>
-        </p:style>
-      </p:cxnSp>
+        <p:txBody>
+          <a:bodyPr wrap="square" rtlCol="0">
+            <a:spAutoFit/>
+          </a:bodyPr>
+          <a:lstStyle/>
+          <a:p>
+            <a:r>
+              <a:rPr lang="en-US" b="1" i="1" dirty="0"/>
+              <a:t>Buggy</a:t>
+            </a:r>
+          </a:p>
+        </p:txBody>
+      </p:sp>
+      <p:sp>
+        <p:nvSpPr>
+          <p:cNvPr id="62" name="TextBox 61">
+            <a:extLst>
+              <a:ext uri="{FF2B5EF4-FFF2-40B4-BE49-F238E27FC236}">
+                <a16:creationId xmlns:a16="http://schemas.microsoft.com/office/drawing/2014/main" id="{D8EEDA56-6588-D5DB-8F6E-2B7FF4C0C79C}"/>
+              </a:ext>
+            </a:extLst>
+          </p:cNvPr>
+          <p:cNvSpPr txBox="1"/>
+          <p:nvPr/>
+        </p:nvSpPr>
+        <p:spPr>
+          <a:xfrm>
+            <a:off x="3447539" y="2449761"/>
+            <a:ext cx="550168" cy="369332"/>
+          </a:xfrm>
+          <a:prstGeom prst="rect">
+            <a:avLst/>
+          </a:prstGeom>
+          <a:noFill/>
+        </p:spPr>
+        <p:txBody>
+          <a:bodyPr wrap="square" rtlCol="0">
+            <a:spAutoFit/>
+          </a:bodyPr>
+          <a:lstStyle/>
+          <a:p>
+            <a:r>
+              <a:rPr lang="en-US" b="1" i="1" dirty="0"/>
+              <a:t>AST</a:t>
+            </a:r>
+          </a:p>
+        </p:txBody>
+      </p:sp>
     </p:spTree>
     <p:extLst>
       <p:ext uri="{BB962C8B-B14F-4D97-AF65-F5344CB8AC3E}">

</xml_diff>